<commit_message>
-tooltips: wertempfehlungen angepasst -präsentation: hinweis eingefügt --> statistiken sollten eingefügt werden! -konzept für programmvorführung erstellt
</commit_message>
<xml_diff>
--- a/Ants/src/doku/präsentation.pptx
+++ b/Ants/src/doku/präsentation.pptx
@@ -5,7 +5,7 @@
     <p:sldMasterId id="2147483648" r:id="rId1"/>
   </p:sldMasterIdLst>
   <p:notesMasterIdLst>
-    <p:notesMasterId r:id="rId17"/>
+    <p:notesMasterId r:id="rId18"/>
   </p:notesMasterIdLst>
   <p:sldIdLst>
     <p:sldId id="256" r:id="rId2"/>
@@ -16,13 +16,14 @@
     <p:sldId id="260" r:id="rId7"/>
     <p:sldId id="262" r:id="rId8"/>
     <p:sldId id="263" r:id="rId9"/>
-    <p:sldId id="264" r:id="rId10"/>
-    <p:sldId id="265" r:id="rId11"/>
-    <p:sldId id="266" r:id="rId12"/>
-    <p:sldId id="267" r:id="rId13"/>
-    <p:sldId id="268" r:id="rId14"/>
-    <p:sldId id="269" r:id="rId15"/>
-    <p:sldId id="270" r:id="rId16"/>
+    <p:sldId id="271" r:id="rId10"/>
+    <p:sldId id="264" r:id="rId11"/>
+    <p:sldId id="265" r:id="rId12"/>
+    <p:sldId id="266" r:id="rId13"/>
+    <p:sldId id="267" r:id="rId14"/>
+    <p:sldId id="268" r:id="rId15"/>
+    <p:sldId id="269" r:id="rId16"/>
+    <p:sldId id="270" r:id="rId17"/>
   </p:sldIdLst>
   <p:sldSz cx="9144000" cy="6858000" type="screen4x3"/>
   <p:notesSz cx="6858000" cy="9144000"/>
@@ -3339,6 +3340,13 @@
         </dgm:presLayoutVars>
       </dgm:prSet>
       <dgm:spPr/>
+      <dgm:t>
+        <a:bodyPr/>
+        <a:lstStyle/>
+        <a:p>
+          <a:endParaRPr lang="de-DE"/>
+        </a:p>
+      </dgm:t>
     </dgm:pt>
     <dgm:pt modelId="{3B6357E2-2136-4C1B-A3B7-FAD46FB7B144}" type="pres">
       <dgm:prSet presAssocID="{A3F99CC9-0C12-44A1-996D-C43A4D12A105}" presName="sibTrans" presStyleCnt="0"/>
@@ -3389,6 +3397,13 @@
         </dgm:presLayoutVars>
       </dgm:prSet>
       <dgm:spPr/>
+      <dgm:t>
+        <a:bodyPr/>
+        <a:lstStyle/>
+        <a:p>
+          <a:endParaRPr lang="de-DE"/>
+        </a:p>
+      </dgm:t>
     </dgm:pt>
     <dgm:pt modelId="{3B4DCFBD-099B-4C7C-A6C5-2ACE602B3D74}" type="pres">
       <dgm:prSet presAssocID="{AB0BC416-C84A-4F21-8D64-81C629C402D6}" presName="sibTrans" presStyleCnt="0"/>
@@ -3411,17 +3426,17 @@
     </dgm:pt>
   </dgm:ptLst>
   <dgm:cxnLst>
+    <dgm:cxn modelId="{EF9A0B30-0B47-4AEF-8448-AB109076148D}" srcId="{01D1C30B-2460-4322-80D6-442229F783E1}" destId="{678A2CAA-1DD6-41DF-B5B5-8816B6BF4317}" srcOrd="0" destOrd="0" parTransId="{764D9FBD-88BF-4C1C-932B-FCD32B8080A0}" sibTransId="{A3F99CC9-0C12-44A1-996D-C43A4D12A105}"/>
+    <dgm:cxn modelId="{ACF298C9-3C5A-476E-9A5F-8DB93E974FE9}" type="presOf" srcId="{FB72E141-CCD4-451E-9A8F-C67D547F6738}" destId="{B29DB7A5-8058-4AAF-99BE-D4BDED894278}" srcOrd="0" destOrd="0" presId="urn:microsoft.com/office/officeart/2005/8/layout/hProcess9"/>
     <dgm:cxn modelId="{5AD3619C-66A1-4718-85BE-CB4340AEB419}" srcId="{01D1C30B-2460-4322-80D6-442229F783E1}" destId="{D302C04F-6E02-48FD-969D-C6B82BC92DE8}" srcOrd="2" destOrd="0" parTransId="{CF718BF8-CE99-4BBC-AD5B-11897B3AC104}" sibTransId="{6E977A6F-64EF-4806-9EF0-079FCFB6234C}"/>
-    <dgm:cxn modelId="{ACF298C9-3C5A-476E-9A5F-8DB93E974FE9}" type="presOf" srcId="{FB72E141-CCD4-451E-9A8F-C67D547F6738}" destId="{B29DB7A5-8058-4AAF-99BE-D4BDED894278}" srcOrd="0" destOrd="0" presId="urn:microsoft.com/office/officeart/2005/8/layout/hProcess9"/>
+    <dgm:cxn modelId="{CE0E0010-AF05-435B-9C69-0819DB75C539}" srcId="{01D1C30B-2460-4322-80D6-442229F783E1}" destId="{E1D74B36-9274-424F-B8BA-300ADE0B1F65}" srcOrd="4" destOrd="0" parTransId="{26292465-10AF-4262-AFAF-1609938878E5}" sibTransId="{16BC77B2-78BE-4C23-ADD6-924A8750D0E6}"/>
+    <dgm:cxn modelId="{59F451E3-504B-4D9D-AC26-E7D3AE1C6702}" type="presOf" srcId="{8F57C93B-917C-4867-AABD-F37CBBEF50EA}" destId="{B66C4496-2C6A-4F20-9F33-227414C8F036}" srcOrd="0" destOrd="0" presId="urn:microsoft.com/office/officeart/2005/8/layout/hProcess9"/>
+    <dgm:cxn modelId="{226E5C1D-1C16-4A44-B6D2-9BF3D28F69C7}" type="presOf" srcId="{01D1C30B-2460-4322-80D6-442229F783E1}" destId="{E0FA5666-4C4B-4817-A342-68DA5E526D20}" srcOrd="0" destOrd="0" presId="urn:microsoft.com/office/officeart/2005/8/layout/hProcess9"/>
+    <dgm:cxn modelId="{A90365FA-194D-4E17-88D5-EA01F070608A}" type="presOf" srcId="{678A2CAA-1DD6-41DF-B5B5-8816B6BF4317}" destId="{99BF229C-C840-497A-8B2A-02E716FEEB1C}" srcOrd="0" destOrd="0" presId="urn:microsoft.com/office/officeart/2005/8/layout/hProcess9"/>
+    <dgm:cxn modelId="{6F8A828C-C3A3-4A89-B025-5BD03020F428}" srcId="{01D1C30B-2460-4322-80D6-442229F783E1}" destId="{FB72E141-CCD4-451E-9A8F-C67D547F6738}" srcOrd="3" destOrd="0" parTransId="{DF6A790F-F88A-4084-BEDA-8E83009A5D33}" sibTransId="{AB0BC416-C84A-4F21-8D64-81C629C402D6}"/>
+    <dgm:cxn modelId="{2E51F406-924D-49E7-898A-14E63C31FD06}" type="presOf" srcId="{D302C04F-6E02-48FD-969D-C6B82BC92DE8}" destId="{E49DE35E-CA4D-4646-80FE-B334B899D84F}" srcOrd="0" destOrd="0" presId="urn:microsoft.com/office/officeart/2005/8/layout/hProcess9"/>
     <dgm:cxn modelId="{6B15CF21-C197-4124-9D1B-DFCFF883FE1B}" type="presOf" srcId="{E1D74B36-9274-424F-B8BA-300ADE0B1F65}" destId="{ECBC5E03-1983-4EA1-AD90-F1AC851B0A84}" srcOrd="0" destOrd="0" presId="urn:microsoft.com/office/officeart/2005/8/layout/hProcess9"/>
-    <dgm:cxn modelId="{226E5C1D-1C16-4A44-B6D2-9BF3D28F69C7}" type="presOf" srcId="{01D1C30B-2460-4322-80D6-442229F783E1}" destId="{E0FA5666-4C4B-4817-A342-68DA5E526D20}" srcOrd="0" destOrd="0" presId="urn:microsoft.com/office/officeart/2005/8/layout/hProcess9"/>
-    <dgm:cxn modelId="{CE0E0010-AF05-435B-9C69-0819DB75C539}" srcId="{01D1C30B-2460-4322-80D6-442229F783E1}" destId="{E1D74B36-9274-424F-B8BA-300ADE0B1F65}" srcOrd="4" destOrd="0" parTransId="{26292465-10AF-4262-AFAF-1609938878E5}" sibTransId="{16BC77B2-78BE-4C23-ADD6-924A8750D0E6}"/>
-    <dgm:cxn modelId="{6F8A828C-C3A3-4A89-B025-5BD03020F428}" srcId="{01D1C30B-2460-4322-80D6-442229F783E1}" destId="{FB72E141-CCD4-451E-9A8F-C67D547F6738}" srcOrd="3" destOrd="0" parTransId="{DF6A790F-F88A-4084-BEDA-8E83009A5D33}" sibTransId="{AB0BC416-C84A-4F21-8D64-81C629C402D6}"/>
-    <dgm:cxn modelId="{EF9A0B30-0B47-4AEF-8448-AB109076148D}" srcId="{01D1C30B-2460-4322-80D6-442229F783E1}" destId="{678A2CAA-1DD6-41DF-B5B5-8816B6BF4317}" srcOrd="0" destOrd="0" parTransId="{764D9FBD-88BF-4C1C-932B-FCD32B8080A0}" sibTransId="{A3F99CC9-0C12-44A1-996D-C43A4D12A105}"/>
     <dgm:cxn modelId="{E4A1E94D-1492-4430-92C6-A9BAB4134184}" srcId="{01D1C30B-2460-4322-80D6-442229F783E1}" destId="{8F57C93B-917C-4867-AABD-F37CBBEF50EA}" srcOrd="1" destOrd="0" parTransId="{792D4605-0EDB-4822-8639-60F8CE3EEF98}" sibTransId="{C16F71EB-491C-4BE7-A3EC-974C8833BD2A}"/>
-    <dgm:cxn modelId="{59F451E3-504B-4D9D-AC26-E7D3AE1C6702}" type="presOf" srcId="{8F57C93B-917C-4867-AABD-F37CBBEF50EA}" destId="{B66C4496-2C6A-4F20-9F33-227414C8F036}" srcOrd="0" destOrd="0" presId="urn:microsoft.com/office/officeart/2005/8/layout/hProcess9"/>
-    <dgm:cxn modelId="{2E51F406-924D-49E7-898A-14E63C31FD06}" type="presOf" srcId="{D302C04F-6E02-48FD-969D-C6B82BC92DE8}" destId="{E49DE35E-CA4D-4646-80FE-B334B899D84F}" srcOrd="0" destOrd="0" presId="urn:microsoft.com/office/officeart/2005/8/layout/hProcess9"/>
-    <dgm:cxn modelId="{A90365FA-194D-4E17-88D5-EA01F070608A}" type="presOf" srcId="{678A2CAA-1DD6-41DF-B5B5-8816B6BF4317}" destId="{99BF229C-C840-497A-8B2A-02E716FEEB1C}" srcOrd="0" destOrd="0" presId="urn:microsoft.com/office/officeart/2005/8/layout/hProcess9"/>
     <dgm:cxn modelId="{FF4B8EC1-C92B-455B-90E4-71B32EF4FD20}" type="presParOf" srcId="{E0FA5666-4C4B-4817-A342-68DA5E526D20}" destId="{AFDB3424-2BC9-4622-80BD-8DB9DE6694F6}" srcOrd="0" destOrd="0" presId="urn:microsoft.com/office/officeart/2005/8/layout/hProcess9"/>
     <dgm:cxn modelId="{46D8EE0C-5A02-452E-A6CE-40B50F5E1C08}" type="presParOf" srcId="{E0FA5666-4C4B-4817-A342-68DA5E526D20}" destId="{F3C635FF-AA25-4670-9625-46AA08075B2A}" srcOrd="1" destOrd="0" presId="urn:microsoft.com/office/officeart/2005/8/layout/hProcess9"/>
     <dgm:cxn modelId="{0AC714DA-F45B-495D-8B54-4E9F9B6E1C4D}" type="presParOf" srcId="{F3C635FF-AA25-4670-9625-46AA08075B2A}" destId="{99BF229C-C840-497A-8B2A-02E716FEEB1C}" srcOrd="0" destOrd="0" presId="urn:microsoft.com/office/officeart/2005/8/layout/hProcess9"/>
@@ -3659,6 +3674,13 @@
         </dgm:presLayoutVars>
       </dgm:prSet>
       <dgm:spPr/>
+      <dgm:t>
+        <a:bodyPr/>
+        <a:lstStyle/>
+        <a:p>
+          <a:endParaRPr lang="de-DE"/>
+        </a:p>
+      </dgm:t>
     </dgm:pt>
     <dgm:pt modelId="{111AD116-9F33-4DB3-897F-E139AE3B2194}" type="pres">
       <dgm:prSet presAssocID="{D28561E2-5533-40FE-91CA-E61ED97EEA5D}" presName="node" presStyleLbl="node1" presStyleIdx="0" presStyleCnt="5">
@@ -3667,6 +3689,13 @@
         </dgm:presLayoutVars>
       </dgm:prSet>
       <dgm:spPr/>
+      <dgm:t>
+        <a:bodyPr/>
+        <a:lstStyle/>
+        <a:p>
+          <a:endParaRPr lang="de-DE"/>
+        </a:p>
+      </dgm:t>
     </dgm:pt>
     <dgm:pt modelId="{B82607C6-D64F-4A71-B019-3AEB44CD45DF}" type="pres">
       <dgm:prSet presAssocID="{D28561E2-5533-40FE-91CA-E61ED97EEA5D}" presName="spNode" presStyleCnt="0"/>
@@ -3675,6 +3704,13 @@
     <dgm:pt modelId="{20D8D24C-A97F-424A-A62B-5063243D4492}" type="pres">
       <dgm:prSet presAssocID="{F00B4D94-79E0-42F6-B8AE-8CCE68352B40}" presName="sibTrans" presStyleLbl="sibTrans1D1" presStyleIdx="0" presStyleCnt="5"/>
       <dgm:spPr/>
+      <dgm:t>
+        <a:bodyPr/>
+        <a:lstStyle/>
+        <a:p>
+          <a:endParaRPr lang="de-DE"/>
+        </a:p>
+      </dgm:t>
     </dgm:pt>
     <dgm:pt modelId="{D1074C16-B5FE-4BF3-AEC1-40E3483EE0D9}" type="pres">
       <dgm:prSet presAssocID="{03E20AE5-DEC1-494F-95A6-E734852A4B6A}" presName="node" presStyleLbl="node1" presStyleIdx="1" presStyleCnt="5">
@@ -3683,6 +3719,13 @@
         </dgm:presLayoutVars>
       </dgm:prSet>
       <dgm:spPr/>
+      <dgm:t>
+        <a:bodyPr/>
+        <a:lstStyle/>
+        <a:p>
+          <a:endParaRPr lang="de-DE"/>
+        </a:p>
+      </dgm:t>
     </dgm:pt>
     <dgm:pt modelId="{FF6940DD-A290-408D-B08B-0CFD32170B77}" type="pres">
       <dgm:prSet presAssocID="{03E20AE5-DEC1-494F-95A6-E734852A4B6A}" presName="spNode" presStyleCnt="0"/>
@@ -3691,6 +3734,13 @@
     <dgm:pt modelId="{8B836E20-A7A6-4E67-9969-45A4119B346D}" type="pres">
       <dgm:prSet presAssocID="{12DC27DD-E976-432E-8456-5E6163D5F808}" presName="sibTrans" presStyleLbl="sibTrans1D1" presStyleIdx="1" presStyleCnt="5"/>
       <dgm:spPr/>
+      <dgm:t>
+        <a:bodyPr/>
+        <a:lstStyle/>
+        <a:p>
+          <a:endParaRPr lang="de-DE"/>
+        </a:p>
+      </dgm:t>
     </dgm:pt>
     <dgm:pt modelId="{178530D2-4FCE-41F1-AF5F-EA8CDD964178}" type="pres">
       <dgm:prSet presAssocID="{6DD6EDCB-D4DC-49EE-9B5F-D63B0DDA0909}" presName="node" presStyleLbl="node1" presStyleIdx="2" presStyleCnt="5">
@@ -3699,6 +3749,13 @@
         </dgm:presLayoutVars>
       </dgm:prSet>
       <dgm:spPr/>
+      <dgm:t>
+        <a:bodyPr/>
+        <a:lstStyle/>
+        <a:p>
+          <a:endParaRPr lang="de-DE"/>
+        </a:p>
+      </dgm:t>
     </dgm:pt>
     <dgm:pt modelId="{13C6F153-BC4A-4CF6-97DD-0E8089401E2E}" type="pres">
       <dgm:prSet presAssocID="{6DD6EDCB-D4DC-49EE-9B5F-D63B0DDA0909}" presName="spNode" presStyleCnt="0"/>
@@ -3707,6 +3764,13 @@
     <dgm:pt modelId="{348F9949-C606-46F2-9E9B-1C528A96627C}" type="pres">
       <dgm:prSet presAssocID="{125E4328-53C3-42E9-A191-4A880BC259DB}" presName="sibTrans" presStyleLbl="sibTrans1D1" presStyleIdx="2" presStyleCnt="5"/>
       <dgm:spPr/>
+      <dgm:t>
+        <a:bodyPr/>
+        <a:lstStyle/>
+        <a:p>
+          <a:endParaRPr lang="de-DE"/>
+        </a:p>
+      </dgm:t>
     </dgm:pt>
     <dgm:pt modelId="{F2E5C2E7-346A-4467-B291-9F731A23AC8E}" type="pres">
       <dgm:prSet presAssocID="{FAD17EE2-2257-4EE2-8FE0-5FA2DF94F37B}" presName="node" presStyleLbl="node1" presStyleIdx="3" presStyleCnt="5">
@@ -3715,6 +3779,13 @@
         </dgm:presLayoutVars>
       </dgm:prSet>
       <dgm:spPr/>
+      <dgm:t>
+        <a:bodyPr/>
+        <a:lstStyle/>
+        <a:p>
+          <a:endParaRPr lang="de-DE"/>
+        </a:p>
+      </dgm:t>
     </dgm:pt>
     <dgm:pt modelId="{F4EAAFE7-754C-407F-A1F1-7E96EA3B6742}" type="pres">
       <dgm:prSet presAssocID="{FAD17EE2-2257-4EE2-8FE0-5FA2DF94F37B}" presName="spNode" presStyleCnt="0"/>
@@ -3723,6 +3794,13 @@
     <dgm:pt modelId="{8C3B52D2-6613-465D-BED8-BC53EAECCBC2}" type="pres">
       <dgm:prSet presAssocID="{94E9AE90-5555-47C4-AF40-CC7191C6A80D}" presName="sibTrans" presStyleLbl="sibTrans1D1" presStyleIdx="3" presStyleCnt="5"/>
       <dgm:spPr/>
+      <dgm:t>
+        <a:bodyPr/>
+        <a:lstStyle/>
+        <a:p>
+          <a:endParaRPr lang="de-DE"/>
+        </a:p>
+      </dgm:t>
     </dgm:pt>
     <dgm:pt modelId="{A0038FD9-A7D8-454E-8433-A18035755D11}" type="pres">
       <dgm:prSet presAssocID="{70CABBA4-41EB-4EDA-9457-0EA7EFE76EA1}" presName="node" presStyleLbl="node1" presStyleIdx="4" presStyleCnt="5">
@@ -3731,6 +3809,13 @@
         </dgm:presLayoutVars>
       </dgm:prSet>
       <dgm:spPr/>
+      <dgm:t>
+        <a:bodyPr/>
+        <a:lstStyle/>
+        <a:p>
+          <a:endParaRPr lang="de-DE"/>
+        </a:p>
+      </dgm:t>
     </dgm:pt>
     <dgm:pt modelId="{09C951C4-24BF-4B90-9A30-DE3CFEDB504E}" type="pres">
       <dgm:prSet presAssocID="{70CABBA4-41EB-4EDA-9457-0EA7EFE76EA1}" presName="spNode" presStyleCnt="0"/>
@@ -3739,25 +3824,32 @@
     <dgm:pt modelId="{06194EC1-AFFF-4C28-B41A-CDF648616285}" type="pres">
       <dgm:prSet presAssocID="{BA1A0C0E-DA41-4EEF-B2E1-6D253BF0889D}" presName="sibTrans" presStyleLbl="sibTrans1D1" presStyleIdx="4" presStyleCnt="5"/>
       <dgm:spPr/>
+      <dgm:t>
+        <a:bodyPr/>
+        <a:lstStyle/>
+        <a:p>
+          <a:endParaRPr lang="de-DE"/>
+        </a:p>
+      </dgm:t>
     </dgm:pt>
   </dgm:ptLst>
   <dgm:cxnLst>
-    <dgm:cxn modelId="{1649A35D-3ECF-45EB-9E54-18DEFA03464E}" srcId="{2F6A1A3A-B1E5-4551-87E2-C92A6FBE999D}" destId="{6DD6EDCB-D4DC-49EE-9B5F-D63B0DDA0909}" srcOrd="2" destOrd="0" parTransId="{8B86C0E3-01FC-4A20-BA8C-32F1A99AC1CF}" sibTransId="{125E4328-53C3-42E9-A191-4A880BC259DB}"/>
-    <dgm:cxn modelId="{7E6FDA3D-7B8A-45B2-9B1F-B15040D117A4}" type="presOf" srcId="{2F6A1A3A-B1E5-4551-87E2-C92A6FBE999D}" destId="{E4959498-6FA1-427B-9318-5AF836D1F9B8}" srcOrd="0" destOrd="0" presId="urn:microsoft.com/office/officeart/2005/8/layout/cycle5"/>
-    <dgm:cxn modelId="{79413A0C-DBF5-42D4-8976-B5ADF49E542D}" type="presOf" srcId="{D28561E2-5533-40FE-91CA-E61ED97EEA5D}" destId="{111AD116-9F33-4DB3-897F-E139AE3B2194}" srcOrd="0" destOrd="0" presId="urn:microsoft.com/office/officeart/2005/8/layout/cycle5"/>
-    <dgm:cxn modelId="{37E4FD31-5BBB-4BB7-9861-B8137E54C172}" type="presOf" srcId="{BA1A0C0E-DA41-4EEF-B2E1-6D253BF0889D}" destId="{06194EC1-AFFF-4C28-B41A-CDF648616285}" srcOrd="0" destOrd="0" presId="urn:microsoft.com/office/officeart/2005/8/layout/cycle5"/>
-    <dgm:cxn modelId="{8BB63D55-FA36-4388-A0A9-64B36E9D49BA}" type="presOf" srcId="{FAD17EE2-2257-4EE2-8FE0-5FA2DF94F37B}" destId="{F2E5C2E7-346A-4467-B291-9F731A23AC8E}" srcOrd="0" destOrd="0" presId="urn:microsoft.com/office/officeart/2005/8/layout/cycle5"/>
-    <dgm:cxn modelId="{2F0BE3E9-A15E-455D-A706-727DC5D8CC25}" srcId="{2F6A1A3A-B1E5-4551-87E2-C92A6FBE999D}" destId="{03E20AE5-DEC1-494F-95A6-E734852A4B6A}" srcOrd="1" destOrd="0" parTransId="{6FC855EB-7A93-41AA-BF1A-ADB272577AE5}" sibTransId="{12DC27DD-E976-432E-8456-5E6163D5F808}"/>
-    <dgm:cxn modelId="{3C099E65-9DA9-47FF-826B-9B4E1E67452C}" type="presOf" srcId="{70CABBA4-41EB-4EDA-9457-0EA7EFE76EA1}" destId="{A0038FD9-A7D8-454E-8433-A18035755D11}" srcOrd="0" destOrd="0" presId="urn:microsoft.com/office/officeart/2005/8/layout/cycle5"/>
-    <dgm:cxn modelId="{3812CAE8-1901-4043-AD07-1AC0EFFEC534}" type="presOf" srcId="{03E20AE5-DEC1-494F-95A6-E734852A4B6A}" destId="{D1074C16-B5FE-4BF3-AEC1-40E3483EE0D9}" srcOrd="0" destOrd="0" presId="urn:microsoft.com/office/officeart/2005/8/layout/cycle5"/>
-    <dgm:cxn modelId="{FD34A772-A003-497B-9131-4217E4AD5A3D}" type="presOf" srcId="{94E9AE90-5555-47C4-AF40-CC7191C6A80D}" destId="{8C3B52D2-6613-465D-BED8-BC53EAECCBC2}" srcOrd="0" destOrd="0" presId="urn:microsoft.com/office/officeart/2005/8/layout/cycle5"/>
-    <dgm:cxn modelId="{C4474C39-FC86-46CA-AA8F-0E08FFF8C13D}" type="presOf" srcId="{6DD6EDCB-D4DC-49EE-9B5F-D63B0DDA0909}" destId="{178530D2-4FCE-41F1-AF5F-EA8CDD964178}" srcOrd="0" destOrd="0" presId="urn:microsoft.com/office/officeart/2005/8/layout/cycle5"/>
-    <dgm:cxn modelId="{458B2C65-A611-4F24-9BE2-AD36BFFC48BB}" type="presOf" srcId="{F00B4D94-79E0-42F6-B8AE-8CCE68352B40}" destId="{20D8D24C-A97F-424A-A62B-5063243D4492}" srcOrd="0" destOrd="0" presId="urn:microsoft.com/office/officeart/2005/8/layout/cycle5"/>
     <dgm:cxn modelId="{AB20FC99-8B52-4EF8-A3F6-21E6221F109D}" srcId="{2F6A1A3A-B1E5-4551-87E2-C92A6FBE999D}" destId="{70CABBA4-41EB-4EDA-9457-0EA7EFE76EA1}" srcOrd="4" destOrd="0" parTransId="{B9EC5B4C-3AB2-4543-A57F-BD5D764C45C2}" sibTransId="{BA1A0C0E-DA41-4EEF-B2E1-6D253BF0889D}"/>
     <dgm:cxn modelId="{C68629BC-26B6-4728-B7E7-3A3F13DDB2CB}" srcId="{2F6A1A3A-B1E5-4551-87E2-C92A6FBE999D}" destId="{D28561E2-5533-40FE-91CA-E61ED97EEA5D}" srcOrd="0" destOrd="0" parTransId="{4E59CA23-9E85-408D-BED4-80D2A8E2CC1A}" sibTransId="{F00B4D94-79E0-42F6-B8AE-8CCE68352B40}"/>
+    <dgm:cxn modelId="{79413A0C-DBF5-42D4-8976-B5ADF49E542D}" type="presOf" srcId="{D28561E2-5533-40FE-91CA-E61ED97EEA5D}" destId="{111AD116-9F33-4DB3-897F-E139AE3B2194}" srcOrd="0" destOrd="0" presId="urn:microsoft.com/office/officeart/2005/8/layout/cycle5"/>
+    <dgm:cxn modelId="{2F0BE3E9-A15E-455D-A706-727DC5D8CC25}" srcId="{2F6A1A3A-B1E5-4551-87E2-C92A6FBE999D}" destId="{03E20AE5-DEC1-494F-95A6-E734852A4B6A}" srcOrd="1" destOrd="0" parTransId="{6FC855EB-7A93-41AA-BF1A-ADB272577AE5}" sibTransId="{12DC27DD-E976-432E-8456-5E6163D5F808}"/>
+    <dgm:cxn modelId="{7E6FDA3D-7B8A-45B2-9B1F-B15040D117A4}" type="presOf" srcId="{2F6A1A3A-B1E5-4551-87E2-C92A6FBE999D}" destId="{E4959498-6FA1-427B-9318-5AF836D1F9B8}" srcOrd="0" destOrd="0" presId="urn:microsoft.com/office/officeart/2005/8/layout/cycle5"/>
+    <dgm:cxn modelId="{8BB63D55-FA36-4388-A0A9-64B36E9D49BA}" type="presOf" srcId="{FAD17EE2-2257-4EE2-8FE0-5FA2DF94F37B}" destId="{F2E5C2E7-346A-4467-B291-9F731A23AC8E}" srcOrd="0" destOrd="0" presId="urn:microsoft.com/office/officeart/2005/8/layout/cycle5"/>
+    <dgm:cxn modelId="{3812CAE8-1901-4043-AD07-1AC0EFFEC534}" type="presOf" srcId="{03E20AE5-DEC1-494F-95A6-E734852A4B6A}" destId="{D1074C16-B5FE-4BF3-AEC1-40E3483EE0D9}" srcOrd="0" destOrd="0" presId="urn:microsoft.com/office/officeart/2005/8/layout/cycle5"/>
+    <dgm:cxn modelId="{1649A35D-3ECF-45EB-9E54-18DEFA03464E}" srcId="{2F6A1A3A-B1E5-4551-87E2-C92A6FBE999D}" destId="{6DD6EDCB-D4DC-49EE-9B5F-D63B0DDA0909}" srcOrd="2" destOrd="0" parTransId="{8B86C0E3-01FC-4A20-BA8C-32F1A99AC1CF}" sibTransId="{125E4328-53C3-42E9-A191-4A880BC259DB}"/>
+    <dgm:cxn modelId="{37E4FD31-5BBB-4BB7-9861-B8137E54C172}" type="presOf" srcId="{BA1A0C0E-DA41-4EEF-B2E1-6D253BF0889D}" destId="{06194EC1-AFFF-4C28-B41A-CDF648616285}" srcOrd="0" destOrd="0" presId="urn:microsoft.com/office/officeart/2005/8/layout/cycle5"/>
+    <dgm:cxn modelId="{458B2C65-A611-4F24-9BE2-AD36BFFC48BB}" type="presOf" srcId="{F00B4D94-79E0-42F6-B8AE-8CCE68352B40}" destId="{20D8D24C-A97F-424A-A62B-5063243D4492}" srcOrd="0" destOrd="0" presId="urn:microsoft.com/office/officeart/2005/8/layout/cycle5"/>
+    <dgm:cxn modelId="{3CCDBEC4-E0DA-494C-8584-E5E009C972F4}" srcId="{2F6A1A3A-B1E5-4551-87E2-C92A6FBE999D}" destId="{FAD17EE2-2257-4EE2-8FE0-5FA2DF94F37B}" srcOrd="3" destOrd="0" parTransId="{DD8EBC43-F733-4D58-87E8-8302FC505EED}" sibTransId="{94E9AE90-5555-47C4-AF40-CC7191C6A80D}"/>
+    <dgm:cxn modelId="{FD34A772-A003-497B-9131-4217E4AD5A3D}" type="presOf" srcId="{94E9AE90-5555-47C4-AF40-CC7191C6A80D}" destId="{8C3B52D2-6613-465D-BED8-BC53EAECCBC2}" srcOrd="0" destOrd="0" presId="urn:microsoft.com/office/officeart/2005/8/layout/cycle5"/>
+    <dgm:cxn modelId="{3C099E65-9DA9-47FF-826B-9B4E1E67452C}" type="presOf" srcId="{70CABBA4-41EB-4EDA-9457-0EA7EFE76EA1}" destId="{A0038FD9-A7D8-454E-8433-A18035755D11}" srcOrd="0" destOrd="0" presId="urn:microsoft.com/office/officeart/2005/8/layout/cycle5"/>
+    <dgm:cxn modelId="{CD4D2034-3A2D-410C-B4A5-68AB00BDAF33}" type="presOf" srcId="{12DC27DD-E976-432E-8456-5E6163D5F808}" destId="{8B836E20-A7A6-4E67-9969-45A4119B346D}" srcOrd="0" destOrd="0" presId="urn:microsoft.com/office/officeart/2005/8/layout/cycle5"/>
     <dgm:cxn modelId="{BACD8616-629C-45E2-BD32-97CB04A4AC31}" type="presOf" srcId="{125E4328-53C3-42E9-A191-4A880BC259DB}" destId="{348F9949-C606-46F2-9E9B-1C528A96627C}" srcOrd="0" destOrd="0" presId="urn:microsoft.com/office/officeart/2005/8/layout/cycle5"/>
-    <dgm:cxn modelId="{CD4D2034-3A2D-410C-B4A5-68AB00BDAF33}" type="presOf" srcId="{12DC27DD-E976-432E-8456-5E6163D5F808}" destId="{8B836E20-A7A6-4E67-9969-45A4119B346D}" srcOrd="0" destOrd="0" presId="urn:microsoft.com/office/officeart/2005/8/layout/cycle5"/>
-    <dgm:cxn modelId="{3CCDBEC4-E0DA-494C-8584-E5E009C972F4}" srcId="{2F6A1A3A-B1E5-4551-87E2-C92A6FBE999D}" destId="{FAD17EE2-2257-4EE2-8FE0-5FA2DF94F37B}" srcOrd="3" destOrd="0" parTransId="{DD8EBC43-F733-4D58-87E8-8302FC505EED}" sibTransId="{94E9AE90-5555-47C4-AF40-CC7191C6A80D}"/>
+    <dgm:cxn modelId="{C4474C39-FC86-46CA-AA8F-0E08FFF8C13D}" type="presOf" srcId="{6DD6EDCB-D4DC-49EE-9B5F-D63B0DDA0909}" destId="{178530D2-4FCE-41F1-AF5F-EA8CDD964178}" srcOrd="0" destOrd="0" presId="urn:microsoft.com/office/officeart/2005/8/layout/cycle5"/>
     <dgm:cxn modelId="{4067F164-77D7-4177-B390-33C3C9E07D2F}" type="presParOf" srcId="{E4959498-6FA1-427B-9318-5AF836D1F9B8}" destId="{111AD116-9F33-4DB3-897F-E139AE3B2194}" srcOrd="0" destOrd="0" presId="urn:microsoft.com/office/officeart/2005/8/layout/cycle5"/>
     <dgm:cxn modelId="{DBFC13CF-F5C6-4A45-966F-446B5F89FC28}" type="presParOf" srcId="{E4959498-6FA1-427B-9318-5AF836D1F9B8}" destId="{B82607C6-D64F-4A71-B019-3AEB44CD45DF}" srcOrd="1" destOrd="0" presId="urn:microsoft.com/office/officeart/2005/8/layout/cycle5"/>
     <dgm:cxn modelId="{60FB6E74-7D3D-4889-8A17-3068ABFD9A8E}" type="presParOf" srcId="{E4959498-6FA1-427B-9318-5AF836D1F9B8}" destId="{20D8D24C-A97F-424A-A62B-5063243D4492}" srcOrd="2" destOrd="0" presId="urn:microsoft.com/office/officeart/2005/8/layout/cycle5"/>
@@ -4045,6 +4137,13 @@
         </dgm:presLayoutVars>
       </dgm:prSet>
       <dgm:spPr/>
+      <dgm:t>
+        <a:bodyPr/>
+        <a:lstStyle/>
+        <a:p>
+          <a:endParaRPr lang="de-DE"/>
+        </a:p>
+      </dgm:t>
     </dgm:pt>
     <dgm:pt modelId="{B944BD18-B4DF-480C-94C4-B9AE198B688B}" type="pres">
       <dgm:prSet presAssocID="{1413249E-440B-489E-8A93-C04EF60F9DBB}" presName="composite" presStyleCnt="0"/>
@@ -4058,6 +4157,13 @@
         </dgm:presLayoutVars>
       </dgm:prSet>
       <dgm:spPr/>
+      <dgm:t>
+        <a:bodyPr/>
+        <a:lstStyle/>
+        <a:p>
+          <a:endParaRPr lang="de-DE"/>
+        </a:p>
+      </dgm:t>
     </dgm:pt>
     <dgm:pt modelId="{DC9D09E2-080A-41AE-B81A-049313D392CB}" type="pres">
       <dgm:prSet presAssocID="{1413249E-440B-489E-8A93-C04EF60F9DBB}" presName="descendantText" presStyleLbl="alignAcc1" presStyleIdx="0" presStyleCnt="3">
@@ -4090,6 +4196,13 @@
         </dgm:presLayoutVars>
       </dgm:prSet>
       <dgm:spPr/>
+      <dgm:t>
+        <a:bodyPr/>
+        <a:lstStyle/>
+        <a:p>
+          <a:endParaRPr lang="de-DE"/>
+        </a:p>
+      </dgm:t>
     </dgm:pt>
     <dgm:pt modelId="{729886DD-DCE6-49C6-9FB6-D32C3DA0B6D3}" type="pres">
       <dgm:prSet presAssocID="{C8224FA4-5DFD-4356-914C-5DA3F459D239}" presName="descendantText" presStyleLbl="alignAcc1" presStyleIdx="1" presStyleCnt="3">
@@ -4122,6 +4235,13 @@
         </dgm:presLayoutVars>
       </dgm:prSet>
       <dgm:spPr/>
+      <dgm:t>
+        <a:bodyPr/>
+        <a:lstStyle/>
+        <a:p>
+          <a:endParaRPr lang="de-DE"/>
+        </a:p>
+      </dgm:t>
     </dgm:pt>
     <dgm:pt modelId="{94C3BC84-E903-4169-8CD0-DC9E484EEB43}" type="pres">
       <dgm:prSet presAssocID="{4E5F1318-501E-4DCA-9C64-33CA98A9F794}" presName="descendantText" presStyleLbl="alignAcc1" presStyleIdx="2" presStyleCnt="3">
@@ -4140,19 +4260,19 @@
     </dgm:pt>
   </dgm:ptLst>
   <dgm:cxnLst>
+    <dgm:cxn modelId="{7C6DB121-5044-4072-9C7C-EBDBF35A6AE2}" type="presOf" srcId="{C8224FA4-5DFD-4356-914C-5DA3F459D239}" destId="{4A98D4D8-FCC4-4C71-8E9D-1BD56C5D8B75}" srcOrd="0" destOrd="0" presId="urn:microsoft.com/office/officeart/2005/8/layout/chevron2"/>
+    <dgm:cxn modelId="{2DB4419D-C154-4576-862F-0453D6564846}" type="presOf" srcId="{3BEDA472-2344-41AE-97B9-D8DA209A1CF7}" destId="{94C3BC84-E903-4169-8CD0-DC9E484EEB43}" srcOrd="0" destOrd="0" presId="urn:microsoft.com/office/officeart/2005/8/layout/chevron2"/>
+    <dgm:cxn modelId="{001D76E2-704F-49C1-BB3A-5170ABC53334}" type="presOf" srcId="{825FA7B3-B4C0-4114-AA0D-1F794BDE9C07}" destId="{77DB9F58-7134-4D94-8B54-3542B00AB91C}" srcOrd="0" destOrd="0" presId="urn:microsoft.com/office/officeart/2005/8/layout/chevron2"/>
+    <dgm:cxn modelId="{7F83C79B-47B6-42A0-88D9-7CDA5E6B16AB}" srcId="{C8224FA4-5DFD-4356-914C-5DA3F459D239}" destId="{3AF96215-25FB-45B6-8FA4-772B1B764F48}" srcOrd="0" destOrd="0" parTransId="{56FAF8E8-1AB5-4719-A868-B7121483DA6F}" sibTransId="{A82B12D9-9784-4BAB-8523-445BFD4EBC29}"/>
     <dgm:cxn modelId="{0E9CD334-47F8-4435-8D65-960DC40CD752}" srcId="{825FA7B3-B4C0-4114-AA0D-1F794BDE9C07}" destId="{4E5F1318-501E-4DCA-9C64-33CA98A9F794}" srcOrd="2" destOrd="0" parTransId="{9B339F75-BD66-4C5D-A99F-2038BB2995D5}" sibTransId="{DD043C0D-3FEE-49C6-8AAA-7BBD15F15A54}"/>
+    <dgm:cxn modelId="{56439783-2FCE-46D8-AD9A-E49BF28DBEDB}" srcId="{825FA7B3-B4C0-4114-AA0D-1F794BDE9C07}" destId="{1413249E-440B-489E-8A93-C04EF60F9DBB}" srcOrd="0" destOrd="0" parTransId="{81463611-5D72-4942-8CE6-D1E96C053156}" sibTransId="{9667C1A9-C833-46F9-A572-8A7696413909}"/>
     <dgm:cxn modelId="{C2B47AA4-FF10-49A3-8F31-BE285670DDF4}" type="presOf" srcId="{4E5F1318-501E-4DCA-9C64-33CA98A9F794}" destId="{91116D07-CB5C-46CA-A0AD-5F454FD6BECF}" srcOrd="0" destOrd="0" presId="urn:microsoft.com/office/officeart/2005/8/layout/chevron2"/>
-    <dgm:cxn modelId="{2DB4419D-C154-4576-862F-0453D6564846}" type="presOf" srcId="{3BEDA472-2344-41AE-97B9-D8DA209A1CF7}" destId="{94C3BC84-E903-4169-8CD0-DC9E484EEB43}" srcOrd="0" destOrd="0" presId="urn:microsoft.com/office/officeart/2005/8/layout/chevron2"/>
+    <dgm:cxn modelId="{6AB718E6-17FB-4B92-8B2D-6BB517530CF6}" type="presOf" srcId="{1413249E-440B-489E-8A93-C04EF60F9DBB}" destId="{598AA08F-AEB9-4FEE-BD47-4069F1C4B33E}" srcOrd="0" destOrd="0" presId="urn:microsoft.com/office/officeart/2005/8/layout/chevron2"/>
+    <dgm:cxn modelId="{54FEA55E-6207-483C-B920-4A8AED980B7E}" srcId="{4E5F1318-501E-4DCA-9C64-33CA98A9F794}" destId="{3BEDA472-2344-41AE-97B9-D8DA209A1CF7}" srcOrd="0" destOrd="0" parTransId="{3D7DBAC8-6328-4A9C-9200-2FEC26E38DFD}" sibTransId="{326256A2-665E-4FE2-AE18-E2075008100C}"/>
+    <dgm:cxn modelId="{F2A0C1B5-CDBA-4593-A25D-5E3E59721428}" type="presOf" srcId="{D65A22B4-B2EA-41F6-9EFF-8F221E79EF3C}" destId="{DC9D09E2-080A-41AE-B81A-049313D392CB}" srcOrd="0" destOrd="0" presId="urn:microsoft.com/office/officeart/2005/8/layout/chevron2"/>
+    <dgm:cxn modelId="{270CFFF8-F2F9-4E84-AD66-C55621B9C350}" srcId="{825FA7B3-B4C0-4114-AA0D-1F794BDE9C07}" destId="{C8224FA4-5DFD-4356-914C-5DA3F459D239}" srcOrd="1" destOrd="0" parTransId="{50E094B7-20D7-4D9A-B734-08FEB63B3543}" sibTransId="{59A75DAB-793D-4324-9BFD-63546C081C34}"/>
     <dgm:cxn modelId="{EBB8CDA2-847A-432D-9CAA-E1E4089A2E0B}" type="presOf" srcId="{3AF96215-25FB-45B6-8FA4-772B1B764F48}" destId="{729886DD-DCE6-49C6-9FB6-D32C3DA0B6D3}" srcOrd="0" destOrd="0" presId="urn:microsoft.com/office/officeart/2005/8/layout/chevron2"/>
-    <dgm:cxn modelId="{270CFFF8-F2F9-4E84-AD66-C55621B9C350}" srcId="{825FA7B3-B4C0-4114-AA0D-1F794BDE9C07}" destId="{C8224FA4-5DFD-4356-914C-5DA3F459D239}" srcOrd="1" destOrd="0" parTransId="{50E094B7-20D7-4D9A-B734-08FEB63B3543}" sibTransId="{59A75DAB-793D-4324-9BFD-63546C081C34}"/>
-    <dgm:cxn modelId="{56439783-2FCE-46D8-AD9A-E49BF28DBEDB}" srcId="{825FA7B3-B4C0-4114-AA0D-1F794BDE9C07}" destId="{1413249E-440B-489E-8A93-C04EF60F9DBB}" srcOrd="0" destOrd="0" parTransId="{81463611-5D72-4942-8CE6-D1E96C053156}" sibTransId="{9667C1A9-C833-46F9-A572-8A7696413909}"/>
     <dgm:cxn modelId="{2EC13678-960E-40F1-B77E-2AE045FE63E8}" srcId="{1413249E-440B-489E-8A93-C04EF60F9DBB}" destId="{D65A22B4-B2EA-41F6-9EFF-8F221E79EF3C}" srcOrd="0" destOrd="0" parTransId="{D98D5CB1-3D6D-4365-A762-56952A42903B}" sibTransId="{61CD796E-AF30-4990-91A6-3A0C45C484E1}"/>
-    <dgm:cxn modelId="{7F83C79B-47B6-42A0-88D9-7CDA5E6B16AB}" srcId="{C8224FA4-5DFD-4356-914C-5DA3F459D239}" destId="{3AF96215-25FB-45B6-8FA4-772B1B764F48}" srcOrd="0" destOrd="0" parTransId="{56FAF8E8-1AB5-4719-A868-B7121483DA6F}" sibTransId="{A82B12D9-9784-4BAB-8523-445BFD4EBC29}"/>
-    <dgm:cxn modelId="{F2A0C1B5-CDBA-4593-A25D-5E3E59721428}" type="presOf" srcId="{D65A22B4-B2EA-41F6-9EFF-8F221E79EF3C}" destId="{DC9D09E2-080A-41AE-B81A-049313D392CB}" srcOrd="0" destOrd="0" presId="urn:microsoft.com/office/officeart/2005/8/layout/chevron2"/>
-    <dgm:cxn modelId="{54FEA55E-6207-483C-B920-4A8AED980B7E}" srcId="{4E5F1318-501E-4DCA-9C64-33CA98A9F794}" destId="{3BEDA472-2344-41AE-97B9-D8DA209A1CF7}" srcOrd="0" destOrd="0" parTransId="{3D7DBAC8-6328-4A9C-9200-2FEC26E38DFD}" sibTransId="{326256A2-665E-4FE2-AE18-E2075008100C}"/>
-    <dgm:cxn modelId="{001D76E2-704F-49C1-BB3A-5170ABC53334}" type="presOf" srcId="{825FA7B3-B4C0-4114-AA0D-1F794BDE9C07}" destId="{77DB9F58-7134-4D94-8B54-3542B00AB91C}" srcOrd="0" destOrd="0" presId="urn:microsoft.com/office/officeart/2005/8/layout/chevron2"/>
-    <dgm:cxn modelId="{7C6DB121-5044-4072-9C7C-EBDBF35A6AE2}" type="presOf" srcId="{C8224FA4-5DFD-4356-914C-5DA3F459D239}" destId="{4A98D4D8-FCC4-4C71-8E9D-1BD56C5D8B75}" srcOrd="0" destOrd="0" presId="urn:microsoft.com/office/officeart/2005/8/layout/chevron2"/>
-    <dgm:cxn modelId="{6AB718E6-17FB-4B92-8B2D-6BB517530CF6}" type="presOf" srcId="{1413249E-440B-489E-8A93-C04EF60F9DBB}" destId="{598AA08F-AEB9-4FEE-BD47-4069F1C4B33E}" srcOrd="0" destOrd="0" presId="urn:microsoft.com/office/officeart/2005/8/layout/chevron2"/>
     <dgm:cxn modelId="{021B91D3-1E42-4247-A1FB-D25819631D1E}" type="presParOf" srcId="{77DB9F58-7134-4D94-8B54-3542B00AB91C}" destId="{B944BD18-B4DF-480C-94C4-B9AE198B688B}" srcOrd="0" destOrd="0" presId="urn:microsoft.com/office/officeart/2005/8/layout/chevron2"/>
     <dgm:cxn modelId="{A9CF6D5B-3022-4F65-A62D-8AA3EB79566D}" type="presParOf" srcId="{B944BD18-B4DF-480C-94C4-B9AE198B688B}" destId="{598AA08F-AEB9-4FEE-BD47-4069F1C4B33E}" srcOrd="0" destOrd="0" presId="urn:microsoft.com/office/officeart/2005/8/layout/chevron2"/>
     <dgm:cxn modelId="{8220B7A8-A42E-480A-A0B8-2F881C50DA30}" type="presParOf" srcId="{B944BD18-B4DF-480C-94C4-B9AE198B688B}" destId="{DC9D09E2-080A-41AE-B81A-049313D392CB}" srcOrd="1" destOrd="0" presId="urn:microsoft.com/office/officeart/2005/8/layout/chevron2"/>
@@ -4498,6 +4618,13 @@
         </dgm:presLayoutVars>
       </dgm:prSet>
       <dgm:spPr/>
+      <dgm:t>
+        <a:bodyPr/>
+        <a:lstStyle/>
+        <a:p>
+          <a:endParaRPr lang="de-DE"/>
+        </a:p>
+      </dgm:t>
     </dgm:pt>
     <dgm:pt modelId="{12864688-CB5F-4A50-8ECD-65C56A4AED78}" type="pres">
       <dgm:prSet presAssocID="{C451D7E0-A181-4DF4-B12D-37FF91A85B09}" presName="linNode" presStyleCnt="0"/>
@@ -4510,6 +4637,13 @@
         </dgm:presLayoutVars>
       </dgm:prSet>
       <dgm:spPr/>
+      <dgm:t>
+        <a:bodyPr/>
+        <a:lstStyle/>
+        <a:p>
+          <a:endParaRPr lang="de-DE"/>
+        </a:p>
+      </dgm:t>
     </dgm:pt>
     <dgm:pt modelId="{5028E4EF-D4FA-480C-944F-5DDB8C7FD94D}" type="pres">
       <dgm:prSet presAssocID="{C451D7E0-A181-4DF4-B12D-37FF91A85B09}" presName="childShp" presStyleLbl="bgAccFollowNode1" presStyleIdx="0" presStyleCnt="2">
@@ -11674,7 +11808,7 @@
           <a:p>
             <a:fld id="{49867C23-E626-400E-BBDE-0AAF1B5B75AB}" type="datetimeFigureOut">
               <a:rPr lang="de-DE" smtClean="0"/>
-              <a:t>26.10.2012</a:t>
+              <a:t>28.10.2012</a:t>
             </a:fld>
             <a:endParaRPr lang="de-DE"/>
           </a:p>
@@ -12121,9 +12255,9 @@
           <a:bodyPr/>
           <a:lstStyle/>
           <a:p>
-            <a:fld id="{0D53458A-9389-40D6-A6C6-A00B98060C7E}" type="datetime1">
+            <a:fld id="{54E998D3-3A28-4A66-9A21-09142FE7552E}" type="datetime1">
               <a:rPr lang="de-DE" smtClean="0"/>
-              <a:t>26.10.2012</a:t>
+              <a:t>28.10.2012</a:t>
             </a:fld>
             <a:endParaRPr lang="de-DE"/>
           </a:p>
@@ -12144,6 +12278,10 @@
           <a:bodyPr/>
           <a:lstStyle/>
           <a:p>
+            <a:r>
+              <a:rPr lang="de-DE" smtClean="0"/>
+              <a:t>Clemens Wagner &amp; Christian Wolter</a:t>
+            </a:r>
             <a:endParaRPr lang="de-DE"/>
           </a:p>
         </p:txBody>
@@ -12286,9 +12424,9 @@
           <a:bodyPr/>
           <a:lstStyle/>
           <a:p>
-            <a:fld id="{C3892950-67D4-4E8B-ACD2-C5E0465F0226}" type="datetime1">
+            <a:fld id="{8916F32D-CA1D-42CB-B39C-713B6DB160B2}" type="datetime1">
               <a:rPr lang="de-DE" smtClean="0"/>
-              <a:t>26.10.2012</a:t>
+              <a:t>28.10.2012</a:t>
             </a:fld>
             <a:endParaRPr lang="de-DE"/>
           </a:p>
@@ -12309,6 +12447,10 @@
           <a:bodyPr/>
           <a:lstStyle/>
           <a:p>
+            <a:r>
+              <a:rPr lang="de-DE" smtClean="0"/>
+              <a:t>Clemens Wagner &amp; Christian Wolter</a:t>
+            </a:r>
             <a:endParaRPr lang="de-DE"/>
           </a:p>
         </p:txBody>
@@ -12461,9 +12603,9 @@
           <a:bodyPr/>
           <a:lstStyle/>
           <a:p>
-            <a:fld id="{5CBBD044-F7C1-4946-AF4C-5C08A8F6B633}" type="datetime1">
+            <a:fld id="{C43F7F80-5FEF-489E-8205-AD1B8746D890}" type="datetime1">
               <a:rPr lang="de-DE" smtClean="0"/>
-              <a:t>26.10.2012</a:t>
+              <a:t>28.10.2012</a:t>
             </a:fld>
             <a:endParaRPr lang="de-DE"/>
           </a:p>
@@ -12484,6 +12626,10 @@
           <a:bodyPr/>
           <a:lstStyle/>
           <a:p>
+            <a:r>
+              <a:rPr lang="de-DE" smtClean="0"/>
+              <a:t>Clemens Wagner &amp; Christian Wolter</a:t>
+            </a:r>
             <a:endParaRPr lang="de-DE"/>
           </a:p>
         </p:txBody>
@@ -12626,9 +12772,9 @@
           <a:bodyPr/>
           <a:lstStyle/>
           <a:p>
-            <a:fld id="{E00AEE2F-7062-4AA2-882D-7CFCA7F81259}" type="datetime1">
+            <a:fld id="{68341324-8F87-45CB-9D14-B0BA1C09914F}" type="datetime1">
               <a:rPr lang="de-DE" smtClean="0"/>
-              <a:t>26.10.2012</a:t>
+              <a:t>28.10.2012</a:t>
             </a:fld>
             <a:endParaRPr lang="de-DE"/>
           </a:p>
@@ -12649,6 +12795,10 @@
           <a:bodyPr/>
           <a:lstStyle/>
           <a:p>
+            <a:r>
+              <a:rPr lang="de-DE" smtClean="0"/>
+              <a:t>Clemens Wagner &amp; Christian Wolter</a:t>
+            </a:r>
             <a:endParaRPr lang="de-DE"/>
           </a:p>
         </p:txBody>
@@ -12681,6 +12831,13 @@
   <p:clrMapOvr>
     <a:masterClrMapping/>
   </p:clrMapOvr>
+  <p:timing>
+    <p:tnLst>
+      <p:par>
+        <p:cTn id="1" dur="indefinite" restart="never" nodeType="tmRoot"/>
+      </p:par>
+    </p:tnLst>
+  </p:timing>
 </p:sldLayout>
 </file>
 
@@ -12867,9 +13024,9 @@
           <a:bodyPr/>
           <a:lstStyle/>
           <a:p>
-            <a:fld id="{661145A2-1A20-4117-ACFB-7E21A8C7910F}" type="datetime1">
+            <a:fld id="{DEF3FF15-0331-48FA-9BF2-B788C716EF81}" type="datetime1">
               <a:rPr lang="de-DE" smtClean="0"/>
-              <a:t>26.10.2012</a:t>
+              <a:t>28.10.2012</a:t>
             </a:fld>
             <a:endParaRPr lang="de-DE"/>
           </a:p>
@@ -12890,6 +13047,10 @@
           <a:bodyPr/>
           <a:lstStyle/>
           <a:p>
+            <a:r>
+              <a:rPr lang="de-DE" smtClean="0"/>
+              <a:t>Clemens Wagner &amp; Christian Wolter</a:t>
+            </a:r>
             <a:endParaRPr lang="de-DE"/>
           </a:p>
         </p:txBody>
@@ -13150,9 +13311,9 @@
           <a:bodyPr/>
           <a:lstStyle/>
           <a:p>
-            <a:fld id="{78C0F7A4-9477-42A5-9469-A84A7B99E9E3}" type="datetime1">
+            <a:fld id="{9216F35A-62CB-4E3E-A3CD-C33A125C0529}" type="datetime1">
               <a:rPr lang="de-DE" smtClean="0"/>
-              <a:t>26.10.2012</a:t>
+              <a:t>28.10.2012</a:t>
             </a:fld>
             <a:endParaRPr lang="de-DE"/>
           </a:p>
@@ -13173,6 +13334,10 @@
           <a:bodyPr/>
           <a:lstStyle/>
           <a:p>
+            <a:r>
+              <a:rPr lang="de-DE" smtClean="0"/>
+              <a:t>Clemens Wagner &amp; Christian Wolter</a:t>
+            </a:r>
             <a:endParaRPr lang="de-DE"/>
           </a:p>
         </p:txBody>
@@ -13567,9 +13732,9 @@
           <a:bodyPr/>
           <a:lstStyle/>
           <a:p>
-            <a:fld id="{7A49957D-E071-4281-8901-F2F08D54441B}" type="datetime1">
+            <a:fld id="{8082EEF0-0FB7-40C2-8F59-35A8812DC12B}" type="datetime1">
               <a:rPr lang="de-DE" smtClean="0"/>
-              <a:t>26.10.2012</a:t>
+              <a:t>28.10.2012</a:t>
             </a:fld>
             <a:endParaRPr lang="de-DE"/>
           </a:p>
@@ -13590,6 +13755,10 @@
           <a:bodyPr/>
           <a:lstStyle/>
           <a:p>
+            <a:r>
+              <a:rPr lang="de-DE" smtClean="0"/>
+              <a:t>Clemens Wagner &amp; Christian Wolter</a:t>
+            </a:r>
             <a:endParaRPr lang="de-DE"/>
           </a:p>
         </p:txBody>
@@ -13680,9 +13849,9 @@
           <a:bodyPr/>
           <a:lstStyle/>
           <a:p>
-            <a:fld id="{F61E8267-2731-4201-AF6B-6DEB1A3D92DD}" type="datetime1">
+            <a:fld id="{982BAD64-7CDE-4706-B19A-ED4405D601B1}" type="datetime1">
               <a:rPr lang="de-DE" smtClean="0"/>
-              <a:t>26.10.2012</a:t>
+              <a:t>28.10.2012</a:t>
             </a:fld>
             <a:endParaRPr lang="de-DE"/>
           </a:p>
@@ -13703,6 +13872,10 @@
           <a:bodyPr/>
           <a:lstStyle/>
           <a:p>
+            <a:r>
+              <a:rPr lang="de-DE" smtClean="0"/>
+              <a:t>Clemens Wagner &amp; Christian Wolter</a:t>
+            </a:r>
             <a:endParaRPr lang="de-DE"/>
           </a:p>
         </p:txBody>
@@ -13770,9 +13943,9 @@
           <a:bodyPr/>
           <a:lstStyle/>
           <a:p>
-            <a:fld id="{4C1DA57B-ACF7-4896-8735-BF844A49BF6A}" type="datetime1">
+            <a:fld id="{80347158-DB69-41CE-9DE1-6F69BFB0EC61}" type="datetime1">
               <a:rPr lang="de-DE" smtClean="0"/>
-              <a:t>26.10.2012</a:t>
+              <a:t>28.10.2012</a:t>
             </a:fld>
             <a:endParaRPr lang="de-DE"/>
           </a:p>
@@ -13793,6 +13966,10 @@
           <a:bodyPr/>
           <a:lstStyle/>
           <a:p>
+            <a:r>
+              <a:rPr lang="de-DE" smtClean="0"/>
+              <a:t>Clemens Wagner &amp; Christian Wolter</a:t>
+            </a:r>
             <a:endParaRPr lang="de-DE"/>
           </a:p>
         </p:txBody>
@@ -14042,9 +14219,9 @@
           <a:bodyPr/>
           <a:lstStyle/>
           <a:p>
-            <a:fld id="{A903C6B6-AECE-4072-856F-2E57262798FE}" type="datetime1">
+            <a:fld id="{5A9895E7-62D7-45AC-92D9-D9BE9B1D5FFE}" type="datetime1">
               <a:rPr lang="de-DE" smtClean="0"/>
-              <a:t>26.10.2012</a:t>
+              <a:t>28.10.2012</a:t>
             </a:fld>
             <a:endParaRPr lang="de-DE"/>
           </a:p>
@@ -14065,6 +14242,10 @@
           <a:bodyPr/>
           <a:lstStyle/>
           <a:p>
+            <a:r>
+              <a:rPr lang="de-DE" smtClean="0"/>
+              <a:t>Clemens Wagner &amp; Christian Wolter</a:t>
+            </a:r>
             <a:endParaRPr lang="de-DE"/>
           </a:p>
         </p:txBody>
@@ -14290,9 +14471,9 @@
           <a:bodyPr/>
           <a:lstStyle/>
           <a:p>
-            <a:fld id="{222F0A4A-374C-4601-BA2C-00CB5F24DCCD}" type="datetime1">
+            <a:fld id="{74E8C99C-9A38-4B16-AC90-1AA672CA6693}" type="datetime1">
               <a:rPr lang="de-DE" smtClean="0"/>
-              <a:t>26.10.2012</a:t>
+              <a:t>28.10.2012</a:t>
             </a:fld>
             <a:endParaRPr lang="de-DE"/>
           </a:p>
@@ -14313,6 +14494,10 @@
           <a:bodyPr/>
           <a:lstStyle/>
           <a:p>
+            <a:r>
+              <a:rPr lang="de-DE" smtClean="0"/>
+              <a:t>Clemens Wagner &amp; Christian Wolter</a:t>
+            </a:r>
             <a:endParaRPr lang="de-DE"/>
           </a:p>
         </p:txBody>
@@ -14430,38 +14615,38 @@
           <a:p>
             <a:pPr lvl="0"/>
             <a:r>
-              <a:rPr lang="de-DE" smtClean="0"/>
+              <a:rPr lang="de-DE" dirty="0" smtClean="0"/>
               <a:t>Textmasterformate durch Klicken bearbeiten</a:t>
             </a:r>
           </a:p>
           <a:p>
             <a:pPr lvl="1"/>
             <a:r>
-              <a:rPr lang="de-DE" smtClean="0"/>
+              <a:rPr lang="de-DE" dirty="0" smtClean="0"/>
               <a:t>Zweite Ebene</a:t>
             </a:r>
           </a:p>
           <a:p>
             <a:pPr lvl="2"/>
             <a:r>
-              <a:rPr lang="de-DE" smtClean="0"/>
+              <a:rPr lang="de-DE" dirty="0" smtClean="0"/>
               <a:t>Dritte Ebene</a:t>
             </a:r>
           </a:p>
           <a:p>
             <a:pPr lvl="3"/>
             <a:r>
-              <a:rPr lang="de-DE" smtClean="0"/>
+              <a:rPr lang="de-DE" dirty="0" smtClean="0"/>
               <a:t>Vierte Ebene</a:t>
             </a:r>
           </a:p>
           <a:p>
             <a:pPr lvl="4"/>
             <a:r>
-              <a:rPr lang="de-DE" smtClean="0"/>
+              <a:rPr lang="de-DE" dirty="0" smtClean="0"/>
               <a:t>Fünfte Ebene</a:t>
             </a:r>
-            <a:endParaRPr lang="de-DE"/>
+            <a:endParaRPr lang="de-DE" dirty="0"/>
           </a:p>
         </p:txBody>
       </p:sp>
@@ -14498,9 +14683,9 @@
             </a:lvl1pPr>
           </a:lstStyle>
           <a:p>
-            <a:fld id="{3EC0DBE0-B43A-43A4-8DD5-170CEE3732ED}" type="datetime1">
+            <a:fld id="{D1C9A838-1B27-4195-A75D-5F68C08EE2A8}" type="datetime1">
               <a:rPr lang="de-DE" smtClean="0"/>
-              <a:t>26.10.2012</a:t>
+              <a:t>28.10.2012</a:t>
             </a:fld>
             <a:endParaRPr lang="de-DE"/>
           </a:p>
@@ -14539,6 +14724,10 @@
             </a:lvl1pPr>
           </a:lstStyle>
           <a:p>
+            <a:r>
+              <a:rPr lang="de-DE" smtClean="0"/>
+              <a:t>Clemens Wagner &amp; Christian Wolter</a:t>
+            </a:r>
             <a:endParaRPr lang="de-DE"/>
           </a:p>
         </p:txBody>
@@ -14627,6 +14816,9 @@
     </p:titleStyle>
     <p:bodyStyle>
       <a:lvl1pPr marL="342900" indent="-342900" algn="l" defTabSz="914400" rtl="0" eaLnBrk="1" latinLnBrk="0" hangingPunct="1">
+        <a:lnSpc>
+          <a:spcPct val="150000"/>
+        </a:lnSpc>
         <a:spcBef>
           <a:spcPct val="20000"/>
         </a:spcBef>
@@ -14951,9 +15143,9 @@
           <a:bodyPr/>
           <a:lstStyle/>
           <a:p>
-            <a:fld id="{0D53458A-9389-40D6-A6C6-A00B98060C7E}" type="datetime1">
+            <a:fld id="{0B5E9F13-1434-4346-80F0-60BF24CA9AE7}" type="datetime1">
               <a:rPr lang="de-DE" smtClean="0"/>
-              <a:t>26.10.2012</a:t>
+              <a:t>28.10.2012</a:t>
             </a:fld>
             <a:endParaRPr lang="de-DE"/>
           </a:p>
@@ -14974,7 +15166,11 @@
           <a:bodyPr/>
           <a:lstStyle/>
           <a:p>
-            <a:endParaRPr lang="de-DE"/>
+            <a:r>
+              <a:rPr lang="de-DE" dirty="0" smtClean="0"/>
+              <a:t>Clemens Wagner &amp; Christian Wolter</a:t>
+            </a:r>
+            <a:endParaRPr lang="de-DE" dirty="0"/>
           </a:p>
         </p:txBody>
       </p:sp>
@@ -15054,38 +15250,61 @@
           <a:lstStyle/>
           <a:p>
             <a:r>
-              <a:rPr lang="de-DE" dirty="0" smtClean="0"/>
-              <a:t>Implementierung</a:t>
+              <a:rPr lang="de-DE" dirty="0" err="1"/>
+              <a:t>eXtreme</a:t>
+            </a:r>
+            <a:r>
+              <a:rPr lang="de-DE" dirty="0"/>
+              <a:t> </a:t>
+            </a:r>
+            <a:r>
+              <a:rPr lang="de-DE" dirty="0" err="1"/>
+              <a:t>Programming</a:t>
             </a:r>
             <a:endParaRPr lang="de-DE" dirty="0"/>
           </a:p>
         </p:txBody>
       </p:sp>
-      <p:graphicFrame>
-        <p:nvGraphicFramePr>
-          <p:cNvPr id="7" name="Inhaltsplatzhalter 6"/>
-          <p:cNvGraphicFramePr>
-            <a:graphicFrameLocks noGrp="1"/>
-          </p:cNvGraphicFramePr>
+      <p:sp>
+        <p:nvSpPr>
+          <p:cNvPr id="3" name="Inhaltsplatzhalter 2"/>
+          <p:cNvSpPr>
+            <a:spLocks noGrp="1"/>
+          </p:cNvSpPr>
           <p:nvPr>
             <p:ph idx="1"/>
-            <p:extLst>
-              <p:ext uri="{D42A27DB-BD31-4B8C-83A1-F6EECF244321}">
-                <p14:modId xmlns:p14="http://schemas.microsoft.com/office/powerpoint/2010/main" val="606692184"/>
-              </p:ext>
-            </p:extLst>
           </p:nvPr>
-        </p:nvGraphicFramePr>
-        <p:xfrm>
-          <a:off x="457200" y="1600200"/>
-          <a:ext cx="8229600" cy="4525963"/>
-        </p:xfrm>
-        <a:graphic>
-          <a:graphicData uri="http://schemas.openxmlformats.org/drawingml/2006/diagram">
-            <dgm:relIds xmlns:dgm="http://schemas.openxmlformats.org/drawingml/2006/diagram" xmlns:r="http://schemas.openxmlformats.org/officeDocument/2006/relationships" r:dm="rId2" r:lo="rId3" r:qs="rId4" r:cs="rId5"/>
-          </a:graphicData>
-        </a:graphic>
-      </p:graphicFrame>
+        </p:nvSpPr>
+        <p:spPr/>
+        <p:txBody>
+          <a:bodyPr/>
+          <a:lstStyle/>
+          <a:p>
+            <a:r>
+              <a:rPr lang="de-DE" dirty="0" smtClean="0"/>
+              <a:t>Programmierstandards</a:t>
+            </a:r>
+          </a:p>
+          <a:p>
+            <a:r>
+              <a:rPr lang="de-DE" dirty="0" smtClean="0"/>
+              <a:t>Pair-</a:t>
+            </a:r>
+            <a:r>
+              <a:rPr lang="de-DE" dirty="0" err="1" smtClean="0"/>
+              <a:t>Programming</a:t>
+            </a:r>
+            <a:endParaRPr lang="de-DE" dirty="0" smtClean="0"/>
+          </a:p>
+          <a:p>
+            <a:r>
+              <a:rPr lang="de-DE" dirty="0" smtClean="0"/>
+              <a:t>Gemeinsame Verantwortung</a:t>
+            </a:r>
+            <a:endParaRPr lang="de-DE" dirty="0"/>
+          </a:p>
+        </p:txBody>
+      </p:sp>
       <p:sp>
         <p:nvSpPr>
           <p:cNvPr id="4" name="Datumsplatzhalter 3"/>
@@ -15101,9 +15320,9 @@
           <a:bodyPr/>
           <a:lstStyle/>
           <a:p>
-            <a:fld id="{E00AEE2F-7062-4AA2-882D-7CFCA7F81259}" type="datetime1">
+            <a:fld id="{22C8D608-9E41-49A5-8E79-0373467F55B3}" type="datetime1">
               <a:rPr lang="de-DE" smtClean="0"/>
-              <a:t>26.10.2012</a:t>
+              <a:t>28.10.2012</a:t>
             </a:fld>
             <a:endParaRPr lang="de-DE"/>
           </a:p>
@@ -15124,6 +15343,10 @@
           <a:bodyPr/>
           <a:lstStyle/>
           <a:p>
+            <a:r>
+              <a:rPr lang="de-DE" smtClean="0"/>
+              <a:t>Clemens Wagner &amp; Christian Wolter</a:t>
+            </a:r>
             <a:endParaRPr lang="de-DE"/>
           </a:p>
         </p:txBody>
@@ -15154,7 +15377,7 @@
     </p:spTree>
     <p:extLst>
       <p:ext uri="{BB962C8B-B14F-4D97-AF65-F5344CB8AC3E}">
-        <p14:creationId xmlns:p14="http://schemas.microsoft.com/office/powerpoint/2010/main" val="3602523607"/>
+        <p14:creationId xmlns:p14="http://schemas.microsoft.com/office/powerpoint/2010/main" val="1809855539"/>
       </p:ext>
     </p:extLst>
   </p:cSld>
@@ -15221,7 +15444,7 @@
             <p:ph idx="1"/>
             <p:extLst>
               <p:ext uri="{D42A27DB-BD31-4B8C-83A1-F6EECF244321}">
-                <p14:modId xmlns:p14="http://schemas.microsoft.com/office/powerpoint/2010/main" val="842292665"/>
+                <p14:modId xmlns:p14="http://schemas.microsoft.com/office/powerpoint/2010/main" val="606692184"/>
               </p:ext>
             </p:extLst>
           </p:nvPr>
@@ -15251,9 +15474,9 @@
           <a:bodyPr/>
           <a:lstStyle/>
           <a:p>
-            <a:fld id="{E00AEE2F-7062-4AA2-882D-7CFCA7F81259}" type="datetime1">
+            <a:fld id="{4EE0FD25-6A80-4606-92DE-835D7558AC7F}" type="datetime1">
               <a:rPr lang="de-DE" smtClean="0"/>
-              <a:t>26.10.2012</a:t>
+              <a:t>28.10.2012</a:t>
             </a:fld>
             <a:endParaRPr lang="de-DE"/>
           </a:p>
@@ -15274,6 +15497,10 @@
           <a:bodyPr/>
           <a:lstStyle/>
           <a:p>
+            <a:r>
+              <a:rPr lang="de-DE" smtClean="0"/>
+              <a:t>Clemens Wagner &amp; Christian Wolter</a:t>
+            </a:r>
             <a:endParaRPr lang="de-DE"/>
           </a:p>
         </p:txBody>
@@ -15304,7 +15531,7 @@
     </p:spTree>
     <p:extLst>
       <p:ext uri="{BB962C8B-B14F-4D97-AF65-F5344CB8AC3E}">
-        <p14:creationId xmlns:p14="http://schemas.microsoft.com/office/powerpoint/2010/main" val="3535810884"/>
+        <p14:creationId xmlns:p14="http://schemas.microsoft.com/office/powerpoint/2010/main" val="3602523607"/>
       </p:ext>
     </p:extLst>
   </p:cSld>
@@ -15361,72 +15588,31 @@
           </a:p>
         </p:txBody>
       </p:sp>
-      <p:sp>
-        <p:nvSpPr>
-          <p:cNvPr id="3" name="Inhaltsplatzhalter 2"/>
-          <p:cNvSpPr>
-            <a:spLocks noGrp="1"/>
-          </p:cNvSpPr>
+      <p:graphicFrame>
+        <p:nvGraphicFramePr>
+          <p:cNvPr id="7" name="Inhaltsplatzhalter 6"/>
+          <p:cNvGraphicFramePr>
+            <a:graphicFrameLocks noGrp="1"/>
+          </p:cNvGraphicFramePr>
           <p:nvPr>
             <p:ph idx="1"/>
+            <p:extLst>
+              <p:ext uri="{D42A27DB-BD31-4B8C-83A1-F6EECF244321}">
+                <p14:modId xmlns:p14="http://schemas.microsoft.com/office/powerpoint/2010/main" val="842292665"/>
+              </p:ext>
+            </p:extLst>
           </p:nvPr>
-        </p:nvSpPr>
-        <p:spPr/>
-        <p:txBody>
-          <a:bodyPr/>
-          <a:lstStyle/>
-          <a:p>
-            <a:r>
-              <a:rPr lang="de-DE" dirty="0" smtClean="0"/>
-              <a:t>Klasse </a:t>
-            </a:r>
-            <a:r>
-              <a:rPr lang="de-DE" dirty="0" err="1" smtClean="0"/>
-              <a:t>Paintpanel</a:t>
-            </a:r>
-            <a:r>
-              <a:rPr lang="de-DE" dirty="0" smtClean="0"/>
-              <a:t>:</a:t>
-            </a:r>
-          </a:p>
-          <a:p>
-            <a:pPr lvl="1"/>
-            <a:r>
-              <a:rPr lang="de-DE" dirty="0" smtClean="0"/>
-              <a:t>Zeichnet Routen, Städte und Pheromone</a:t>
-            </a:r>
-          </a:p>
-          <a:p>
-            <a:pPr lvl="1"/>
-            <a:r>
-              <a:rPr lang="de-DE" dirty="0" smtClean="0"/>
-              <a:t>Darstellung optimal skaliert</a:t>
-            </a:r>
-          </a:p>
-          <a:p>
-            <a:pPr lvl="1"/>
-            <a:r>
-              <a:rPr lang="de-DE" dirty="0" smtClean="0"/>
-              <a:t>Zoomfunktion</a:t>
-            </a:r>
-          </a:p>
-          <a:p>
-            <a:pPr lvl="1"/>
-            <a:r>
-              <a:rPr lang="de-DE" dirty="0" smtClean="0"/>
-              <a:t>Freies Scrollen</a:t>
-            </a:r>
-          </a:p>
-          <a:p>
-            <a:pPr lvl="1"/>
-            <a:r>
-              <a:rPr lang="de-DE" dirty="0" smtClean="0"/>
-              <a:t>TSP bearbeiten</a:t>
-            </a:r>
-            <a:endParaRPr lang="de-DE" dirty="0"/>
-          </a:p>
-        </p:txBody>
-      </p:sp>
+        </p:nvGraphicFramePr>
+        <p:xfrm>
+          <a:off x="457200" y="1600200"/>
+          <a:ext cx="8229600" cy="4525963"/>
+        </p:xfrm>
+        <a:graphic>
+          <a:graphicData uri="http://schemas.openxmlformats.org/drawingml/2006/diagram">
+            <dgm:relIds xmlns:dgm="http://schemas.openxmlformats.org/drawingml/2006/diagram" xmlns:r="http://schemas.openxmlformats.org/officeDocument/2006/relationships" r:dm="rId2" r:lo="rId3" r:qs="rId4" r:cs="rId5"/>
+          </a:graphicData>
+        </a:graphic>
+      </p:graphicFrame>
       <p:sp>
         <p:nvSpPr>
           <p:cNvPr id="4" name="Datumsplatzhalter 3"/>
@@ -15442,9 +15628,9 @@
           <a:bodyPr/>
           <a:lstStyle/>
           <a:p>
-            <a:fld id="{E00AEE2F-7062-4AA2-882D-7CFCA7F81259}" type="datetime1">
+            <a:fld id="{0CF1D5E6-5DD7-4A45-8616-4F7DA8607CFA}" type="datetime1">
               <a:rPr lang="de-DE" smtClean="0"/>
-              <a:t>26.10.2012</a:t>
+              <a:t>28.10.2012</a:t>
             </a:fld>
             <a:endParaRPr lang="de-DE"/>
           </a:p>
@@ -15465,6 +15651,10 @@
           <a:bodyPr/>
           <a:lstStyle/>
           <a:p>
+            <a:r>
+              <a:rPr lang="de-DE" smtClean="0"/>
+              <a:t>Clemens Wagner &amp; Christian Wolter</a:t>
+            </a:r>
             <a:endParaRPr lang="de-DE"/>
           </a:p>
         </p:txBody>
@@ -15495,7 +15685,7 @@
     </p:spTree>
     <p:extLst>
       <p:ext uri="{BB962C8B-B14F-4D97-AF65-F5344CB8AC3E}">
-        <p14:creationId xmlns:p14="http://schemas.microsoft.com/office/powerpoint/2010/main" val="799708026"/>
+        <p14:creationId xmlns:p14="http://schemas.microsoft.com/office/powerpoint/2010/main" val="3535810884"/>
       </p:ext>
     </p:extLst>
   </p:cSld>
@@ -15569,46 +15759,51 @@
           <a:p>
             <a:r>
               <a:rPr lang="de-DE" dirty="0" smtClean="0"/>
-              <a:t>Besonderheiten Algorithmus:</a:t>
-            </a:r>
-          </a:p>
-          <a:p>
-            <a:r>
-              <a:rPr lang="de-DE" dirty="0" smtClean="0"/>
-              <a:t>Pheromone zufällig verteilt</a:t>
-            </a:r>
-          </a:p>
-          <a:p>
-            <a:r>
-              <a:rPr lang="de-DE" dirty="0" smtClean="0"/>
-              <a:t>Iteration </a:t>
-            </a:r>
-            <a:r>
-              <a:rPr lang="de-DE" dirty="0" smtClean="0">
-                <a:sym typeface="Wingdings" pitchFamily="2" charset="2"/>
-              </a:rPr>
-              <a:t> neue Berechnung</a:t>
-            </a:r>
-            <a:endParaRPr lang="de-DE" dirty="0" smtClean="0"/>
-          </a:p>
-          <a:p>
-            <a:r>
-              <a:rPr lang="de-DE" dirty="0" smtClean="0"/>
-              <a:t>Adaptives </a:t>
+              <a:t>Klasse </a:t>
             </a:r>
             <a:r>
               <a:rPr lang="de-DE" dirty="0" err="1" smtClean="0"/>
-              <a:t>Pheromonupdate</a:t>
+              <a:t>Paintpanel</a:t>
             </a:r>
-            <a:endParaRPr lang="de-DE" dirty="0" smtClean="0"/>
-          </a:p>
-          <a:p>
             <a:r>
               <a:rPr lang="de-DE" dirty="0" smtClean="0"/>
-              <a:t>Auslagerung in eigenen Thread</a:t>
+              <a:t>:</a:t>
             </a:r>
           </a:p>
           <a:p>
+            <a:pPr lvl="1"/>
+            <a:r>
+              <a:rPr lang="de-DE" dirty="0" smtClean="0"/>
+              <a:t>Zeichnet Routen, Städte und Pheromone</a:t>
+            </a:r>
+          </a:p>
+          <a:p>
+            <a:pPr lvl="1"/>
+            <a:r>
+              <a:rPr lang="de-DE" dirty="0" smtClean="0"/>
+              <a:t>Darstellung optimal skaliert</a:t>
+            </a:r>
+          </a:p>
+          <a:p>
+            <a:pPr lvl="1"/>
+            <a:r>
+              <a:rPr lang="de-DE" dirty="0" smtClean="0"/>
+              <a:t>Zoomfunktion</a:t>
+            </a:r>
+          </a:p>
+          <a:p>
+            <a:pPr lvl="1"/>
+            <a:r>
+              <a:rPr lang="de-DE" dirty="0" smtClean="0"/>
+              <a:t>Freies Scrollen</a:t>
+            </a:r>
+          </a:p>
+          <a:p>
+            <a:pPr lvl="1"/>
+            <a:r>
+              <a:rPr lang="de-DE" dirty="0" smtClean="0"/>
+              <a:t>TSP bearbeiten</a:t>
+            </a:r>
             <a:endParaRPr lang="de-DE" dirty="0"/>
           </a:p>
         </p:txBody>
@@ -15628,9 +15823,9 @@
           <a:bodyPr/>
           <a:lstStyle/>
           <a:p>
-            <a:fld id="{E00AEE2F-7062-4AA2-882D-7CFCA7F81259}" type="datetime1">
+            <a:fld id="{54909B47-53CE-4A48-B031-A50C91643E80}" type="datetime1">
               <a:rPr lang="de-DE" smtClean="0"/>
-              <a:t>26.10.2012</a:t>
+              <a:t>28.10.2012</a:t>
             </a:fld>
             <a:endParaRPr lang="de-DE"/>
           </a:p>
@@ -15651,6 +15846,10 @@
           <a:bodyPr/>
           <a:lstStyle/>
           <a:p>
+            <a:r>
+              <a:rPr lang="de-DE" smtClean="0"/>
+              <a:t>Clemens Wagner &amp; Christian Wolter</a:t>
+            </a:r>
             <a:endParaRPr lang="de-DE"/>
           </a:p>
         </p:txBody>
@@ -15681,7 +15880,7 @@
     </p:spTree>
     <p:extLst>
       <p:ext uri="{BB962C8B-B14F-4D97-AF65-F5344CB8AC3E}">
-        <p14:creationId xmlns:p14="http://schemas.microsoft.com/office/powerpoint/2010/main" val="3695580845"/>
+        <p14:creationId xmlns:p14="http://schemas.microsoft.com/office/powerpoint/2010/main" val="799708026"/>
       </p:ext>
     </p:extLst>
   </p:cSld>
@@ -15732,7 +15931,7 @@
           <a:p>
             <a:r>
               <a:rPr lang="de-DE" dirty="0" smtClean="0"/>
-              <a:t>Programmvorführung</a:t>
+              <a:t>Implementierung</a:t>
             </a:r>
             <a:endParaRPr lang="de-DE" dirty="0"/>
           </a:p>
@@ -15753,7 +15952,53 @@
           <a:bodyPr/>
           <a:lstStyle/>
           <a:p>
-            <a:endParaRPr lang="de-DE"/>
+            <a:r>
+              <a:rPr lang="de-DE" dirty="0" smtClean="0"/>
+              <a:t>Besonderheiten Algorithmus:</a:t>
+            </a:r>
+          </a:p>
+          <a:p>
+            <a:pPr lvl="1"/>
+            <a:r>
+              <a:rPr lang="de-DE" dirty="0" smtClean="0"/>
+              <a:t>Pheromone zufällig verteilt</a:t>
+            </a:r>
+          </a:p>
+          <a:p>
+            <a:pPr lvl="1"/>
+            <a:r>
+              <a:rPr lang="de-DE" dirty="0" smtClean="0"/>
+              <a:t>Iteration </a:t>
+            </a:r>
+            <a:r>
+              <a:rPr lang="de-DE" dirty="0" smtClean="0">
+                <a:sym typeface="Wingdings" pitchFamily="2" charset="2"/>
+              </a:rPr>
+              <a:t> neue Berechnung</a:t>
+            </a:r>
+            <a:endParaRPr lang="de-DE" dirty="0" smtClean="0"/>
+          </a:p>
+          <a:p>
+            <a:pPr lvl="1"/>
+            <a:r>
+              <a:rPr lang="de-DE" dirty="0" smtClean="0"/>
+              <a:t>Adaptives </a:t>
+            </a:r>
+            <a:r>
+              <a:rPr lang="de-DE" dirty="0" err="1" smtClean="0"/>
+              <a:t>Pheromonupdate</a:t>
+            </a:r>
+            <a:endParaRPr lang="de-DE" dirty="0" smtClean="0"/>
+          </a:p>
+          <a:p>
+            <a:pPr lvl="1"/>
+            <a:r>
+              <a:rPr lang="de-DE" dirty="0" smtClean="0"/>
+              <a:t>Auslagerung in eigenen Thread</a:t>
+            </a:r>
+          </a:p>
+          <a:p>
+            <a:endParaRPr lang="de-DE" dirty="0"/>
           </a:p>
         </p:txBody>
       </p:sp>
@@ -15772,9 +16017,9 @@
           <a:bodyPr/>
           <a:lstStyle/>
           <a:p>
-            <a:fld id="{E00AEE2F-7062-4AA2-882D-7CFCA7F81259}" type="datetime1">
+            <a:fld id="{E3C2BFFC-52F5-4CE7-BCD5-DEDD2807FD86}" type="datetime1">
               <a:rPr lang="de-DE" smtClean="0"/>
-              <a:t>26.10.2012</a:t>
+              <a:t>28.10.2012</a:t>
             </a:fld>
             <a:endParaRPr lang="de-DE"/>
           </a:p>
@@ -15795,6 +16040,10 @@
           <a:bodyPr/>
           <a:lstStyle/>
           <a:p>
+            <a:r>
+              <a:rPr lang="de-DE" smtClean="0"/>
+              <a:t>Clemens Wagner &amp; Christian Wolter</a:t>
+            </a:r>
             <a:endParaRPr lang="de-DE"/>
           </a:p>
         </p:txBody>
@@ -15825,7 +16074,7 @@
     </p:spTree>
     <p:extLst>
       <p:ext uri="{BB962C8B-B14F-4D97-AF65-F5344CB8AC3E}">
-        <p14:creationId xmlns:p14="http://schemas.microsoft.com/office/powerpoint/2010/main" val="1934001372"/>
+        <p14:creationId xmlns:p14="http://schemas.microsoft.com/office/powerpoint/2010/main" val="3695580845"/>
       </p:ext>
     </p:extLst>
   </p:cSld>
@@ -15876,7 +16125,7 @@
           <a:p>
             <a:r>
               <a:rPr lang="de-DE" dirty="0" smtClean="0"/>
-              <a:t>Fazit</a:t>
+              <a:t>Programmvorführung</a:t>
             </a:r>
             <a:endParaRPr lang="de-DE" dirty="0"/>
           </a:p>
@@ -15897,39 +16146,7 @@
           <a:bodyPr/>
           <a:lstStyle/>
           <a:p>
-            <a:r>
-              <a:rPr lang="de-DE" dirty="0" smtClean="0"/>
-              <a:t>Viel gelernt</a:t>
-            </a:r>
-          </a:p>
-          <a:p>
-            <a:r>
-              <a:rPr lang="de-DE" dirty="0" smtClean="0"/>
-              <a:t>Wenig Fehler beim PP</a:t>
-            </a:r>
-          </a:p>
-          <a:p>
-            <a:r>
-              <a:rPr lang="de-DE" dirty="0" smtClean="0"/>
-              <a:t>Kein Nachteil durch Gruppengröße</a:t>
-            </a:r>
-          </a:p>
-          <a:p>
-            <a:r>
-              <a:rPr lang="de-DE" dirty="0" smtClean="0"/>
-              <a:t>Nicht immer nach XP gehandelt</a:t>
-            </a:r>
-          </a:p>
-          <a:p>
-            <a:r>
-              <a:rPr lang="de-DE" dirty="0" err="1" smtClean="0"/>
-              <a:t>Storycards</a:t>
-            </a:r>
-            <a:r>
-              <a:rPr lang="de-DE" dirty="0" smtClean="0"/>
-              <a:t> sind wichtig &amp; hilfreich</a:t>
-            </a:r>
-            <a:endParaRPr lang="de-DE" dirty="0"/>
+            <a:endParaRPr lang="de-DE"/>
           </a:p>
         </p:txBody>
       </p:sp>
@@ -15948,9 +16165,9 @@
           <a:bodyPr/>
           <a:lstStyle/>
           <a:p>
-            <a:fld id="{E00AEE2F-7062-4AA2-882D-7CFCA7F81259}" type="datetime1">
+            <a:fld id="{301B2F88-54D7-4499-81E6-AF131889FDA6}" type="datetime1">
               <a:rPr lang="de-DE" smtClean="0"/>
-              <a:t>26.10.2012</a:t>
+              <a:t>28.10.2012</a:t>
             </a:fld>
             <a:endParaRPr lang="de-DE"/>
           </a:p>
@@ -15971,6 +16188,10 @@
           <a:bodyPr/>
           <a:lstStyle/>
           <a:p>
+            <a:r>
+              <a:rPr lang="de-DE" smtClean="0"/>
+              <a:t>Clemens Wagner &amp; Christian Wolter</a:t>
+            </a:r>
             <a:endParaRPr lang="de-DE"/>
           </a:p>
         </p:txBody>
@@ -15993,6 +16214,186 @@
             <a:fld id="{6C6AE60A-B69C-4790-82F7-3882EDF23186}" type="slidenum">
               <a:rPr lang="de-DE" smtClean="0"/>
               <a:t>15</a:t>
+            </a:fld>
+            <a:endParaRPr lang="de-DE"/>
+          </a:p>
+        </p:txBody>
+      </p:sp>
+    </p:spTree>
+    <p:extLst>
+      <p:ext uri="{BB962C8B-B14F-4D97-AF65-F5344CB8AC3E}">
+        <p14:creationId xmlns:p14="http://schemas.microsoft.com/office/powerpoint/2010/main" val="1934001372"/>
+      </p:ext>
+    </p:extLst>
+  </p:cSld>
+  <p:clrMapOvr>
+    <a:masterClrMapping/>
+  </p:clrMapOvr>
+  <p:timing>
+    <p:tnLst>
+      <p:par>
+        <p:cTn id="1" dur="indefinite" restart="never" nodeType="tmRoot"/>
+      </p:par>
+    </p:tnLst>
+  </p:timing>
+</p:sld>
+</file>
+
+<file path=ppt/slides/slide16.xml><?xml version="1.0" encoding="utf-8"?>
+<p:sld xmlns:a="http://schemas.openxmlformats.org/drawingml/2006/main" xmlns:r="http://schemas.openxmlformats.org/officeDocument/2006/relationships" xmlns:p="http://schemas.openxmlformats.org/presentationml/2006/main">
+  <p:cSld>
+    <p:spTree>
+      <p:nvGrpSpPr>
+        <p:cNvPr id="1" name=""/>
+        <p:cNvGrpSpPr/>
+        <p:nvPr/>
+      </p:nvGrpSpPr>
+      <p:grpSpPr>
+        <a:xfrm>
+          <a:off x="0" y="0"/>
+          <a:ext cx="0" cy="0"/>
+          <a:chOff x="0" y="0"/>
+          <a:chExt cx="0" cy="0"/>
+        </a:xfrm>
+      </p:grpSpPr>
+      <p:sp>
+        <p:nvSpPr>
+          <p:cNvPr id="2" name="Titel 1"/>
+          <p:cNvSpPr>
+            <a:spLocks noGrp="1"/>
+          </p:cNvSpPr>
+          <p:nvPr>
+            <p:ph type="title"/>
+          </p:nvPr>
+        </p:nvSpPr>
+        <p:spPr/>
+        <p:txBody>
+          <a:bodyPr/>
+          <a:lstStyle/>
+          <a:p>
+            <a:r>
+              <a:rPr lang="de-DE" dirty="0" smtClean="0"/>
+              <a:t>Fazit</a:t>
+            </a:r>
+            <a:endParaRPr lang="de-DE" dirty="0"/>
+          </a:p>
+        </p:txBody>
+      </p:sp>
+      <p:sp>
+        <p:nvSpPr>
+          <p:cNvPr id="3" name="Inhaltsplatzhalter 2"/>
+          <p:cNvSpPr>
+            <a:spLocks noGrp="1"/>
+          </p:cNvSpPr>
+          <p:nvPr>
+            <p:ph idx="1"/>
+          </p:nvPr>
+        </p:nvSpPr>
+        <p:spPr/>
+        <p:txBody>
+          <a:bodyPr/>
+          <a:lstStyle/>
+          <a:p>
+            <a:r>
+              <a:rPr lang="de-DE" dirty="0" smtClean="0"/>
+              <a:t>Viel gelernt</a:t>
+            </a:r>
+          </a:p>
+          <a:p>
+            <a:r>
+              <a:rPr lang="de-DE" dirty="0" smtClean="0"/>
+              <a:t>Wenig Fehler beim PP</a:t>
+            </a:r>
+          </a:p>
+          <a:p>
+            <a:r>
+              <a:rPr lang="de-DE" dirty="0" smtClean="0"/>
+              <a:t>Kein Nachteil durch Gruppengröße</a:t>
+            </a:r>
+          </a:p>
+          <a:p>
+            <a:r>
+              <a:rPr lang="de-DE" dirty="0" smtClean="0"/>
+              <a:t>Nicht immer nach XP gehandelt</a:t>
+            </a:r>
+          </a:p>
+          <a:p>
+            <a:r>
+              <a:rPr lang="de-DE" dirty="0" err="1" smtClean="0"/>
+              <a:t>Storycards</a:t>
+            </a:r>
+            <a:r>
+              <a:rPr lang="de-DE" dirty="0" smtClean="0"/>
+              <a:t> sind wichtig &amp; hilfreich</a:t>
+            </a:r>
+            <a:endParaRPr lang="de-DE" dirty="0"/>
+          </a:p>
+        </p:txBody>
+      </p:sp>
+      <p:sp>
+        <p:nvSpPr>
+          <p:cNvPr id="4" name="Datumsplatzhalter 3"/>
+          <p:cNvSpPr>
+            <a:spLocks noGrp="1"/>
+          </p:cNvSpPr>
+          <p:nvPr>
+            <p:ph type="dt" sz="half" idx="10"/>
+          </p:nvPr>
+        </p:nvSpPr>
+        <p:spPr/>
+        <p:txBody>
+          <a:bodyPr/>
+          <a:lstStyle/>
+          <a:p>
+            <a:fld id="{3591A5E0-DA92-4F5C-88D8-4AA4702BD5A2}" type="datetime1">
+              <a:rPr lang="de-DE" smtClean="0"/>
+              <a:t>28.10.2012</a:t>
+            </a:fld>
+            <a:endParaRPr lang="de-DE"/>
+          </a:p>
+        </p:txBody>
+      </p:sp>
+      <p:sp>
+        <p:nvSpPr>
+          <p:cNvPr id="5" name="Fußzeilenplatzhalter 4"/>
+          <p:cNvSpPr>
+            <a:spLocks noGrp="1"/>
+          </p:cNvSpPr>
+          <p:nvPr>
+            <p:ph type="ftr" sz="quarter" idx="11"/>
+          </p:nvPr>
+        </p:nvSpPr>
+        <p:spPr/>
+        <p:txBody>
+          <a:bodyPr/>
+          <a:lstStyle/>
+          <a:p>
+            <a:r>
+              <a:rPr lang="de-DE" smtClean="0"/>
+              <a:t>Clemens Wagner &amp; Christian Wolter</a:t>
+            </a:r>
+            <a:endParaRPr lang="de-DE"/>
+          </a:p>
+        </p:txBody>
+      </p:sp>
+      <p:sp>
+        <p:nvSpPr>
+          <p:cNvPr id="6" name="Foliennummernplatzhalter 5"/>
+          <p:cNvSpPr>
+            <a:spLocks noGrp="1"/>
+          </p:cNvSpPr>
+          <p:nvPr>
+            <p:ph type="sldNum" sz="quarter" idx="12"/>
+          </p:nvPr>
+        </p:nvSpPr>
+        <p:spPr/>
+        <p:txBody>
+          <a:bodyPr/>
+          <a:lstStyle/>
+          <a:p>
+            <a:fld id="{6C6AE60A-B69C-4790-82F7-3882EDF23186}" type="slidenum">
+              <a:rPr lang="de-DE" smtClean="0"/>
+              <a:t>16</a:t>
             </a:fld>
             <a:endParaRPr lang="de-DE"/>
           </a:p>
@@ -16070,7 +16471,9 @@
         </p:nvSpPr>
         <p:spPr/>
         <p:txBody>
-          <a:bodyPr/>
+          <a:bodyPr>
+            <a:normAutofit fontScale="92500" lnSpcReduction="10000"/>
+          </a:bodyPr>
           <a:lstStyle/>
           <a:p>
             <a:r>
@@ -16137,9 +16540,9 @@
           <a:bodyPr/>
           <a:lstStyle/>
           <a:p>
-            <a:fld id="{E00AEE2F-7062-4AA2-882D-7CFCA7F81259}" type="datetime1">
+            <a:fld id="{3F606780-1223-4AD0-8391-97A69D9D599C}" type="datetime1">
               <a:rPr lang="de-DE" smtClean="0"/>
-              <a:t>26.10.2012</a:t>
+              <a:t>28.10.2012</a:t>
             </a:fld>
             <a:endParaRPr lang="de-DE" dirty="0"/>
           </a:p>
@@ -16160,6 +16563,10 @@
           <a:bodyPr/>
           <a:lstStyle/>
           <a:p>
+            <a:r>
+              <a:rPr lang="de-DE" smtClean="0"/>
+              <a:t>Clemens Wagner &amp; Christian Wolter</a:t>
+            </a:r>
             <a:endParaRPr lang="de-DE"/>
           </a:p>
         </p:txBody>
@@ -16305,9 +16712,9 @@
           <a:bodyPr/>
           <a:lstStyle/>
           <a:p>
-            <a:fld id="{E00AEE2F-7062-4AA2-882D-7CFCA7F81259}" type="datetime1">
+            <a:fld id="{C24D827F-9E24-4CC0-8DD8-5A998D68FDF8}" type="datetime1">
               <a:rPr lang="de-DE" smtClean="0"/>
-              <a:t>26.10.2012</a:t>
+              <a:t>28.10.2012</a:t>
             </a:fld>
             <a:endParaRPr lang="de-DE"/>
           </a:p>
@@ -16328,6 +16735,10 @@
           <a:bodyPr/>
           <a:lstStyle/>
           <a:p>
+            <a:r>
+              <a:rPr lang="de-DE" smtClean="0"/>
+              <a:t>Clemens Wagner &amp; Christian Wolter</a:t>
+            </a:r>
             <a:endParaRPr lang="de-DE"/>
           </a:p>
         </p:txBody>
@@ -16477,9 +16888,9 @@
           <a:bodyPr/>
           <a:lstStyle/>
           <a:p>
-            <a:fld id="{E00AEE2F-7062-4AA2-882D-7CFCA7F81259}" type="datetime1">
+            <a:fld id="{1727F365-8C37-475E-A8FE-D73B7F342F8F}" type="datetime1">
               <a:rPr lang="de-DE" smtClean="0"/>
-              <a:t>26.10.2012</a:t>
+              <a:t>28.10.2012</a:t>
             </a:fld>
             <a:endParaRPr lang="de-DE"/>
           </a:p>
@@ -16500,6 +16911,10 @@
           <a:bodyPr/>
           <a:lstStyle/>
           <a:p>
+            <a:r>
+              <a:rPr lang="de-DE" smtClean="0"/>
+              <a:t>Clemens Wagner &amp; Christian Wolter</a:t>
+            </a:r>
             <a:endParaRPr lang="de-DE"/>
           </a:p>
         </p:txBody>
@@ -16659,9 +17074,9 @@
           <a:bodyPr/>
           <a:lstStyle/>
           <a:p>
-            <a:fld id="{E00AEE2F-7062-4AA2-882D-7CFCA7F81259}" type="datetime1">
+            <a:fld id="{AD9612F7-58C2-403C-B0C1-BFC6B72BD1E9}" type="datetime1">
               <a:rPr lang="de-DE" smtClean="0"/>
-              <a:t>26.10.2012</a:t>
+              <a:t>28.10.2012</a:t>
             </a:fld>
             <a:endParaRPr lang="de-DE"/>
           </a:p>
@@ -16682,6 +17097,10 @@
           <a:bodyPr/>
           <a:lstStyle/>
           <a:p>
+            <a:r>
+              <a:rPr lang="de-DE" smtClean="0"/>
+              <a:t>Clemens Wagner &amp; Christian Wolter</a:t>
+            </a:r>
             <a:endParaRPr lang="de-DE"/>
           </a:p>
         </p:txBody>
@@ -16845,9 +17264,9 @@
           <a:bodyPr/>
           <a:lstStyle/>
           <a:p>
-            <a:fld id="{E00AEE2F-7062-4AA2-882D-7CFCA7F81259}" type="datetime1">
+            <a:fld id="{2E425724-5C50-4440-9CFB-52F5D8CEF4FA}" type="datetime1">
               <a:rPr lang="de-DE" smtClean="0"/>
-              <a:t>26.10.2012</a:t>
+              <a:t>28.10.2012</a:t>
             </a:fld>
             <a:endParaRPr lang="de-DE"/>
           </a:p>
@@ -16868,6 +17287,10 @@
           <a:bodyPr/>
           <a:lstStyle/>
           <a:p>
+            <a:r>
+              <a:rPr lang="de-DE" smtClean="0"/>
+              <a:t>Clemens Wagner &amp; Christian Wolter</a:t>
+            </a:r>
             <a:endParaRPr lang="de-DE"/>
           </a:p>
         </p:txBody>
@@ -16978,9 +17401,9 @@
           <a:bodyPr/>
           <a:lstStyle/>
           <a:p>
-            <a:fld id="{E00AEE2F-7062-4AA2-882D-7CFCA7F81259}" type="datetime1">
+            <a:fld id="{05E35A7F-1D44-4D5F-9D94-351C9635F3C6}" type="datetime1">
               <a:rPr lang="de-DE" smtClean="0"/>
-              <a:t>26.10.2012</a:t>
+              <a:t>28.10.2012</a:t>
             </a:fld>
             <a:endParaRPr lang="de-DE"/>
           </a:p>
@@ -17001,6 +17424,10 @@
           <a:bodyPr/>
           <a:lstStyle/>
           <a:p>
+            <a:r>
+              <a:rPr lang="de-DE" smtClean="0"/>
+              <a:t>Clemens Wagner &amp; Christian Wolter</a:t>
+            </a:r>
             <a:endParaRPr lang="de-DE"/>
           </a:p>
         </p:txBody>
@@ -17158,9 +17585,9 @@
           <a:bodyPr/>
           <a:lstStyle/>
           <a:p>
-            <a:fld id="{E00AEE2F-7062-4AA2-882D-7CFCA7F81259}" type="datetime1">
+            <a:fld id="{19916AF9-7048-43E0-ADAA-0348A1E1CD70}" type="datetime1">
               <a:rPr lang="de-DE" smtClean="0"/>
-              <a:t>26.10.2012</a:t>
+              <a:t>28.10.2012</a:t>
             </a:fld>
             <a:endParaRPr lang="de-DE"/>
           </a:p>
@@ -17181,6 +17608,10 @@
           <a:bodyPr/>
           <a:lstStyle/>
           <a:p>
+            <a:r>
+              <a:rPr lang="de-DE" smtClean="0"/>
+              <a:t>Clemens Wagner &amp; Christian Wolter</a:t>
+            </a:r>
             <a:endParaRPr lang="de-DE"/>
           </a:p>
         </p:txBody>
@@ -17247,77 +17678,6 @@
       </p:grpSpPr>
       <p:sp>
         <p:nvSpPr>
-          <p:cNvPr id="2" name="Titel 1"/>
-          <p:cNvSpPr>
-            <a:spLocks noGrp="1"/>
-          </p:cNvSpPr>
-          <p:nvPr>
-            <p:ph type="title"/>
-          </p:nvPr>
-        </p:nvSpPr>
-        <p:spPr/>
-        <p:txBody>
-          <a:bodyPr/>
-          <a:lstStyle/>
-          <a:p>
-            <a:r>
-              <a:rPr lang="de-DE" dirty="0" err="1"/>
-              <a:t>eXtreme</a:t>
-            </a:r>
-            <a:r>
-              <a:rPr lang="de-DE" dirty="0"/>
-              <a:t> </a:t>
-            </a:r>
-            <a:r>
-              <a:rPr lang="de-DE" dirty="0" err="1"/>
-              <a:t>Programming</a:t>
-            </a:r>
-            <a:endParaRPr lang="de-DE" dirty="0"/>
-          </a:p>
-        </p:txBody>
-      </p:sp>
-      <p:sp>
-        <p:nvSpPr>
-          <p:cNvPr id="3" name="Inhaltsplatzhalter 2"/>
-          <p:cNvSpPr>
-            <a:spLocks noGrp="1"/>
-          </p:cNvSpPr>
-          <p:nvPr>
-            <p:ph idx="1"/>
-          </p:nvPr>
-        </p:nvSpPr>
-        <p:spPr/>
-        <p:txBody>
-          <a:bodyPr/>
-          <a:lstStyle/>
-          <a:p>
-            <a:r>
-              <a:rPr lang="de-DE" dirty="0" smtClean="0"/>
-              <a:t>Programmierstandards</a:t>
-            </a:r>
-          </a:p>
-          <a:p>
-            <a:r>
-              <a:rPr lang="de-DE" dirty="0" smtClean="0"/>
-              <a:t>Pair-</a:t>
-            </a:r>
-            <a:r>
-              <a:rPr lang="de-DE" dirty="0" err="1" smtClean="0"/>
-              <a:t>Programming</a:t>
-            </a:r>
-            <a:endParaRPr lang="de-DE" dirty="0" smtClean="0"/>
-          </a:p>
-          <a:p>
-            <a:r>
-              <a:rPr lang="de-DE" dirty="0" smtClean="0"/>
-              <a:t>Gemeinsame Verantwortung</a:t>
-            </a:r>
-            <a:endParaRPr lang="de-DE" dirty="0"/>
-          </a:p>
-        </p:txBody>
-      </p:sp>
-      <p:sp>
-        <p:nvSpPr>
           <p:cNvPr id="4" name="Datumsplatzhalter 3"/>
           <p:cNvSpPr>
             <a:spLocks noGrp="1"/>
@@ -17331,9 +17691,9 @@
           <a:bodyPr/>
           <a:lstStyle/>
           <a:p>
-            <a:fld id="{E00AEE2F-7062-4AA2-882D-7CFCA7F81259}" type="datetime1">
+            <a:fld id="{68341324-8F87-45CB-9D14-B0BA1C09914F}" type="datetime1">
               <a:rPr lang="de-DE" smtClean="0"/>
-              <a:t>26.10.2012</a:t>
+              <a:t>28.10.2012</a:t>
             </a:fld>
             <a:endParaRPr lang="de-DE"/>
           </a:p>
@@ -17354,6 +17714,10 @@
           <a:bodyPr/>
           <a:lstStyle/>
           <a:p>
+            <a:r>
+              <a:rPr lang="de-DE" smtClean="0"/>
+              <a:t>Clemens Wagner &amp; Christian Wolter</a:t>
+            </a:r>
             <a:endParaRPr lang="de-DE"/>
           </a:p>
         </p:txBody>
@@ -17381,10 +17745,72 @@
           </a:p>
         </p:txBody>
       </p:sp>
+      <p:sp>
+        <p:nvSpPr>
+          <p:cNvPr id="8" name="Inhaltsplatzhalter 7"/>
+          <p:cNvSpPr>
+            <a:spLocks noGrp="1"/>
+          </p:cNvSpPr>
+          <p:nvPr>
+            <p:ph idx="1"/>
+          </p:nvPr>
+        </p:nvSpPr>
+        <p:spPr/>
+        <p:txBody>
+          <a:bodyPr/>
+          <a:lstStyle/>
+          <a:p>
+            <a:r>
+              <a:rPr lang="de-DE" dirty="0" smtClean="0">
+                <a:solidFill>
+                  <a:srgbClr val="FF0000"/>
+                </a:solidFill>
+              </a:rPr>
+              <a:t>Statistik!!!</a:t>
+            </a:r>
+            <a:endParaRPr lang="de-DE" dirty="0">
+              <a:solidFill>
+                <a:srgbClr val="FF0000"/>
+              </a:solidFill>
+            </a:endParaRPr>
+          </a:p>
+        </p:txBody>
+      </p:sp>
+      <p:sp>
+        <p:nvSpPr>
+          <p:cNvPr id="9" name="Titel 1"/>
+          <p:cNvSpPr>
+            <a:spLocks noGrp="1"/>
+          </p:cNvSpPr>
+          <p:nvPr>
+            <p:ph type="title"/>
+          </p:nvPr>
+        </p:nvSpPr>
+        <p:spPr/>
+        <p:txBody>
+          <a:bodyPr/>
+          <a:lstStyle/>
+          <a:p>
+            <a:r>
+              <a:rPr lang="de-DE" dirty="0" err="1"/>
+              <a:t>eXtreme</a:t>
+            </a:r>
+            <a:r>
+              <a:rPr lang="de-DE" dirty="0"/>
+              <a:t> </a:t>
+            </a:r>
+            <a:r>
+              <a:rPr lang="de-DE" dirty="0" err="1"/>
+              <a:t>Programming</a:t>
+            </a:r>
+            <a:endParaRPr lang="de-DE" dirty="0"/>
+          </a:p>
+        </p:txBody>
+      </p:sp>
     </p:spTree>
     <p:extLst>
       <p:ext uri="{BB962C8B-B14F-4D97-AF65-F5344CB8AC3E}">
-        <p14:creationId xmlns:p14="http://schemas.microsoft.com/office/powerpoint/2010/main" val="1809855539"/>
+        <p14:creationId xmlns:p14="http://schemas.microsoft.com/office/powerpoint/2010/main" val="3129272570"/>
       </p:ext>
     </p:extLst>
   </p:cSld>

</xml_diff>

<commit_message>
Präsentation Folien hinzugefügt, Statistik. Hinzufügen und Verschieben von Städten wärend der Berechnung nicht mehr möglich
</commit_message>
<xml_diff>
--- a/Ants/src/doku/präsentation.pptx
+++ b/Ants/src/doku/präsentation.pptx
@@ -5,10 +5,10 @@
     <p:sldMasterId id="2147483876" r:id="rId1"/>
   </p:sldMasterIdLst>
   <p:notesMasterIdLst>
-    <p:notesMasterId r:id="rId23"/>
+    <p:notesMasterId r:id="rId25"/>
   </p:notesMasterIdLst>
   <p:handoutMasterIdLst>
-    <p:handoutMasterId r:id="rId24"/>
+    <p:handoutMasterId r:id="rId26"/>
   </p:handoutMasterIdLst>
   <p:sldIdLst>
     <p:sldId id="274" r:id="rId2"/>
@@ -21,17 +21,19 @@
     <p:sldId id="260" r:id="rId9"/>
     <p:sldId id="277" r:id="rId10"/>
     <p:sldId id="262" r:id="rId11"/>
-    <p:sldId id="263" r:id="rId12"/>
-    <p:sldId id="271" r:id="rId13"/>
-    <p:sldId id="264" r:id="rId14"/>
-    <p:sldId id="278" r:id="rId15"/>
-    <p:sldId id="265" r:id="rId16"/>
-    <p:sldId id="266" r:id="rId17"/>
-    <p:sldId id="267" r:id="rId18"/>
-    <p:sldId id="268" r:id="rId19"/>
-    <p:sldId id="279" r:id="rId20"/>
-    <p:sldId id="280" r:id="rId21"/>
-    <p:sldId id="270" r:id="rId22"/>
+    <p:sldId id="281" r:id="rId12"/>
+    <p:sldId id="263" r:id="rId13"/>
+    <p:sldId id="271" r:id="rId14"/>
+    <p:sldId id="282" r:id="rId15"/>
+    <p:sldId id="264" r:id="rId16"/>
+    <p:sldId id="278" r:id="rId17"/>
+    <p:sldId id="265" r:id="rId18"/>
+    <p:sldId id="266" r:id="rId19"/>
+    <p:sldId id="267" r:id="rId20"/>
+    <p:sldId id="268" r:id="rId21"/>
+    <p:sldId id="279" r:id="rId22"/>
+    <p:sldId id="280" r:id="rId23"/>
+    <p:sldId id="270" r:id="rId24"/>
   </p:sldIdLst>
   <p:sldSz cx="9144000" cy="6858000" type="screen4x3"/>
   <p:notesSz cx="6858000" cy="9144000"/>
@@ -131,6 +133,500 @@
     </a:lvl9pPr>
   </p:defaultTextStyle>
 </p:presentation>
+</file>
+
+<file path=ppt/charts/chart1.xml><?xml version="1.0" encoding="utf-8"?>
+<c:chartSpace xmlns:c="http://schemas.openxmlformats.org/drawingml/2006/chart" xmlns:a="http://schemas.openxmlformats.org/drawingml/2006/main" xmlns:r="http://schemas.openxmlformats.org/officeDocument/2006/relationships">
+  <c:date1904 val="0"/>
+  <c:lang val="de-DE"/>
+  <c:roundedCorners val="0"/>
+  <mc:AlternateContent xmlns:mc="http://schemas.openxmlformats.org/markup-compatibility/2006">
+    <mc:Choice xmlns:c14="http://schemas.microsoft.com/office/drawing/2007/8/2/chart" Requires="c14">
+      <c14:style val="126"/>
+    </mc:Choice>
+    <mc:Fallback>
+      <c:style val="26"/>
+    </mc:Fallback>
+  </mc:AlternateContent>
+  <c:chart>
+    <c:title>
+      <c:tx>
+        <c:rich>
+          <a:bodyPr/>
+          <a:lstStyle/>
+          <a:p>
+            <a:pPr>
+              <a:defRPr/>
+            </a:pPr>
+            <a:r>
+              <a:rPr lang="de-DE"/>
+              <a:t>Dauer und Story Points</a:t>
+            </a:r>
+          </a:p>
+        </c:rich>
+      </c:tx>
+      <c:layout/>
+      <c:overlay val="0"/>
+    </c:title>
+    <c:autoTitleDeleted val="0"/>
+    <c:plotArea>
+      <c:layout/>
+      <c:lineChart>
+        <c:grouping val="stacked"/>
+        <c:varyColors val="0"/>
+        <c:ser>
+          <c:idx val="0"/>
+          <c:order val="0"/>
+          <c:tx>
+            <c:strRef>
+              <c:f>Tabelle1!$C$1</c:f>
+              <c:strCache>
+                <c:ptCount val="1"/>
+                <c:pt idx="0">
+                  <c:v>Story Points</c:v>
+                </c:pt>
+              </c:strCache>
+            </c:strRef>
+          </c:tx>
+          <c:spPr>
+            <a:ln>
+              <a:solidFill>
+                <a:srgbClr val="00B050"/>
+              </a:solidFill>
+            </a:ln>
+          </c:spPr>
+          <c:marker>
+            <c:symbol val="none"/>
+          </c:marker>
+          <c:val>
+            <c:numRef>
+              <c:f>Tabelle1!$C$2:$C$11</c:f>
+              <c:numCache>
+                <c:formatCode>General</c:formatCode>
+                <c:ptCount val="10"/>
+                <c:pt idx="0">
+                  <c:v>110</c:v>
+                </c:pt>
+                <c:pt idx="1">
+                  <c:v>90</c:v>
+                </c:pt>
+                <c:pt idx="2">
+                  <c:v>50</c:v>
+                </c:pt>
+                <c:pt idx="3">
+                  <c:v>40</c:v>
+                </c:pt>
+                <c:pt idx="4">
+                  <c:v>5</c:v>
+                </c:pt>
+                <c:pt idx="5">
+                  <c:v>1</c:v>
+                </c:pt>
+                <c:pt idx="6">
+                  <c:v>4</c:v>
+                </c:pt>
+                <c:pt idx="7">
+                  <c:v>30</c:v>
+                </c:pt>
+                <c:pt idx="8">
+                  <c:v>20</c:v>
+                </c:pt>
+                <c:pt idx="9">
+                  <c:v>70</c:v>
+                </c:pt>
+              </c:numCache>
+            </c:numRef>
+          </c:val>
+          <c:smooth val="0"/>
+        </c:ser>
+        <c:ser>
+          <c:idx val="1"/>
+          <c:order val="1"/>
+          <c:tx>
+            <c:strRef>
+              <c:f>Tabelle1!$D$1</c:f>
+              <c:strCache>
+                <c:ptCount val="1"/>
+                <c:pt idx="0">
+                  <c:v>Dauer [min]</c:v>
+                </c:pt>
+              </c:strCache>
+            </c:strRef>
+          </c:tx>
+          <c:spPr>
+            <a:ln>
+              <a:solidFill>
+                <a:srgbClr val="FF0000"/>
+              </a:solidFill>
+            </a:ln>
+          </c:spPr>
+          <c:marker>
+            <c:symbol val="none"/>
+          </c:marker>
+          <c:val>
+            <c:numRef>
+              <c:f>Tabelle1!$D$2:$D$11</c:f>
+              <c:numCache>
+                <c:formatCode>General</c:formatCode>
+                <c:ptCount val="10"/>
+                <c:pt idx="0">
+                  <c:v>160</c:v>
+                </c:pt>
+                <c:pt idx="1">
+                  <c:v>130</c:v>
+                </c:pt>
+                <c:pt idx="2">
+                  <c:v>90</c:v>
+                </c:pt>
+                <c:pt idx="3">
+                  <c:v>120</c:v>
+                </c:pt>
+                <c:pt idx="4">
+                  <c:v>30</c:v>
+                </c:pt>
+                <c:pt idx="5">
+                  <c:v>10</c:v>
+                </c:pt>
+                <c:pt idx="6">
+                  <c:v>20</c:v>
+                </c:pt>
+                <c:pt idx="7">
+                  <c:v>120</c:v>
+                </c:pt>
+                <c:pt idx="8">
+                  <c:v>60</c:v>
+                </c:pt>
+                <c:pt idx="9">
+                  <c:v>120</c:v>
+                </c:pt>
+              </c:numCache>
+            </c:numRef>
+          </c:val>
+          <c:smooth val="0"/>
+        </c:ser>
+        <c:dLbls>
+          <c:showLegendKey val="0"/>
+          <c:showVal val="0"/>
+          <c:showCatName val="0"/>
+          <c:showSerName val="0"/>
+          <c:showPercent val="0"/>
+          <c:showBubbleSize val="0"/>
+        </c:dLbls>
+        <c:marker val="1"/>
+        <c:smooth val="0"/>
+        <c:axId val="85344768"/>
+        <c:axId val="89704128"/>
+      </c:lineChart>
+      <c:catAx>
+        <c:axId val="85344768"/>
+        <c:scaling>
+          <c:orientation val="minMax"/>
+        </c:scaling>
+        <c:delete val="0"/>
+        <c:axPos val="b"/>
+        <c:majorGridlines/>
+        <c:majorTickMark val="out"/>
+        <c:minorTickMark val="none"/>
+        <c:tickLblPos val="nextTo"/>
+        <c:crossAx val="89704128"/>
+        <c:crosses val="autoZero"/>
+        <c:auto val="1"/>
+        <c:lblAlgn val="ctr"/>
+        <c:lblOffset val="100"/>
+        <c:noMultiLvlLbl val="0"/>
+      </c:catAx>
+      <c:valAx>
+        <c:axId val="89704128"/>
+        <c:scaling>
+          <c:orientation val="minMax"/>
+        </c:scaling>
+        <c:delete val="0"/>
+        <c:axPos val="l"/>
+        <c:majorGridlines/>
+        <c:numFmt formatCode="General" sourceLinked="1"/>
+        <c:majorTickMark val="out"/>
+        <c:minorTickMark val="none"/>
+        <c:tickLblPos val="nextTo"/>
+        <c:crossAx val="85344768"/>
+        <c:crosses val="autoZero"/>
+        <c:crossBetween val="midCat"/>
+      </c:valAx>
+    </c:plotArea>
+    <c:legend>
+      <c:legendPos val="r"/>
+      <c:layout/>
+      <c:overlay val="0"/>
+    </c:legend>
+    <c:plotVisOnly val="1"/>
+    <c:dispBlanksAs val="zero"/>
+    <c:showDLblsOverMax val="0"/>
+  </c:chart>
+  <c:txPr>
+    <a:bodyPr/>
+    <a:lstStyle/>
+    <a:p>
+      <a:pPr>
+        <a:defRPr sz="1800"/>
+      </a:pPr>
+      <a:endParaRPr lang="de-DE"/>
+    </a:p>
+  </c:txPr>
+  <c:externalData r:id="rId1">
+    <c:autoUpdate val="0"/>
+  </c:externalData>
+</c:chartSpace>
+</file>
+
+<file path=ppt/charts/chart2.xml><?xml version="1.0" encoding="utf-8"?>
+<c:chartSpace xmlns:c="http://schemas.openxmlformats.org/drawingml/2006/chart" xmlns:a="http://schemas.openxmlformats.org/drawingml/2006/main" xmlns:r="http://schemas.openxmlformats.org/officeDocument/2006/relationships">
+  <c:date1904 val="0"/>
+  <c:lang val="de-DE"/>
+  <c:roundedCorners val="0"/>
+  <mc:AlternateContent xmlns:mc="http://schemas.openxmlformats.org/markup-compatibility/2006">
+    <mc:Choice xmlns:c14="http://schemas.microsoft.com/office/drawing/2007/8/2/chart" Requires="c14">
+      <c14:style val="126"/>
+    </mc:Choice>
+    <mc:Fallback>
+      <c:style val="26"/>
+    </mc:Fallback>
+  </mc:AlternateContent>
+  <c:chart>
+    <c:title>
+      <c:tx>
+        <c:rich>
+          <a:bodyPr/>
+          <a:lstStyle/>
+          <a:p>
+            <a:pPr>
+              <a:defRPr/>
+            </a:pPr>
+            <a:r>
+              <a:rPr lang="de-DE"/>
+              <a:t>Wert und Risiko</a:t>
+            </a:r>
+          </a:p>
+        </c:rich>
+      </c:tx>
+      <c:layout/>
+      <c:overlay val="0"/>
+    </c:title>
+    <c:autoTitleDeleted val="0"/>
+    <c:plotArea>
+      <c:layout>
+        <c:manualLayout>
+          <c:layoutTarget val="inner"/>
+          <c:xMode val="edge"/>
+          <c:yMode val="edge"/>
+          <c:x val="5.5777938285007739E-2"/>
+          <c:y val="0.13347618238496375"/>
+          <c:w val="0.78103637206057952"/>
+          <c:h val="0.75054405719625927"/>
+        </c:manualLayout>
+      </c:layout>
+      <c:lineChart>
+        <c:grouping val="standard"/>
+        <c:varyColors val="0"/>
+        <c:ser>
+          <c:idx val="0"/>
+          <c:order val="0"/>
+          <c:tx>
+            <c:strRef>
+              <c:f>Tabelle1!$F$1</c:f>
+              <c:strCache>
+                <c:ptCount val="1"/>
+                <c:pt idx="0">
+                  <c:v>Wert</c:v>
+                </c:pt>
+              </c:strCache>
+            </c:strRef>
+          </c:tx>
+          <c:spPr>
+            <a:ln>
+              <a:solidFill>
+                <a:srgbClr val="00B050"/>
+              </a:solidFill>
+            </a:ln>
+          </c:spPr>
+          <c:marker>
+            <c:symbol val="none"/>
+          </c:marker>
+          <c:val>
+            <c:numRef>
+              <c:f>Tabelle1!$F$2:$F$11</c:f>
+              <c:numCache>
+                <c:formatCode>General</c:formatCode>
+                <c:ptCount val="10"/>
+                <c:pt idx="0">
+                  <c:v>10</c:v>
+                </c:pt>
+                <c:pt idx="1">
+                  <c:v>10</c:v>
+                </c:pt>
+                <c:pt idx="2">
+                  <c:v>7</c:v>
+                </c:pt>
+                <c:pt idx="3">
+                  <c:v>8</c:v>
+                </c:pt>
+                <c:pt idx="4">
+                  <c:v>7</c:v>
+                </c:pt>
+                <c:pt idx="5">
+                  <c:v>6</c:v>
+                </c:pt>
+                <c:pt idx="6">
+                  <c:v>6</c:v>
+                </c:pt>
+                <c:pt idx="7">
+                  <c:v>5</c:v>
+                </c:pt>
+                <c:pt idx="8">
+                  <c:v>2</c:v>
+                </c:pt>
+                <c:pt idx="9">
+                  <c:v>1</c:v>
+                </c:pt>
+              </c:numCache>
+            </c:numRef>
+          </c:val>
+          <c:smooth val="0"/>
+        </c:ser>
+        <c:ser>
+          <c:idx val="1"/>
+          <c:order val="1"/>
+          <c:tx>
+            <c:strRef>
+              <c:f>Tabelle1!$G$1</c:f>
+              <c:strCache>
+                <c:ptCount val="1"/>
+                <c:pt idx="0">
+                  <c:v>Risiko</c:v>
+                </c:pt>
+              </c:strCache>
+            </c:strRef>
+          </c:tx>
+          <c:spPr>
+            <a:ln>
+              <a:solidFill>
+                <a:srgbClr val="FF0000"/>
+              </a:solidFill>
+            </a:ln>
+          </c:spPr>
+          <c:marker>
+            <c:symbol val="none"/>
+          </c:marker>
+          <c:val>
+            <c:numRef>
+              <c:f>Tabelle1!$G$2:$G$11</c:f>
+              <c:numCache>
+                <c:formatCode>General</c:formatCode>
+                <c:ptCount val="10"/>
+                <c:pt idx="0">
+                  <c:v>8</c:v>
+                </c:pt>
+                <c:pt idx="1">
+                  <c:v>8</c:v>
+                </c:pt>
+                <c:pt idx="2">
+                  <c:v>7</c:v>
+                </c:pt>
+                <c:pt idx="3">
+                  <c:v>3</c:v>
+                </c:pt>
+                <c:pt idx="4">
+                  <c:v>1</c:v>
+                </c:pt>
+                <c:pt idx="5">
+                  <c:v>1</c:v>
+                </c:pt>
+                <c:pt idx="6">
+                  <c:v>2</c:v>
+                </c:pt>
+                <c:pt idx="7">
+                  <c:v>4</c:v>
+                </c:pt>
+                <c:pt idx="8">
+                  <c:v>5</c:v>
+                </c:pt>
+                <c:pt idx="9">
+                  <c:v>9</c:v>
+                </c:pt>
+              </c:numCache>
+            </c:numRef>
+          </c:val>
+          <c:smooth val="0"/>
+        </c:ser>
+        <c:dLbls>
+          <c:showLegendKey val="0"/>
+          <c:showVal val="0"/>
+          <c:showCatName val="0"/>
+          <c:showSerName val="0"/>
+          <c:showPercent val="0"/>
+          <c:showBubbleSize val="0"/>
+        </c:dLbls>
+        <c:marker val="1"/>
+        <c:smooth val="0"/>
+        <c:axId val="193348096"/>
+        <c:axId val="194460992"/>
+      </c:lineChart>
+      <c:catAx>
+        <c:axId val="193348096"/>
+        <c:scaling>
+          <c:orientation val="minMax"/>
+        </c:scaling>
+        <c:delete val="0"/>
+        <c:axPos val="b"/>
+        <c:majorGridlines/>
+        <c:majorTickMark val="out"/>
+        <c:minorTickMark val="none"/>
+        <c:tickLblPos val="nextTo"/>
+        <c:crossAx val="194460992"/>
+        <c:crosses val="autoZero"/>
+        <c:auto val="1"/>
+        <c:lblAlgn val="ctr"/>
+        <c:lblOffset val="100"/>
+        <c:noMultiLvlLbl val="0"/>
+      </c:catAx>
+      <c:valAx>
+        <c:axId val="194460992"/>
+        <c:scaling>
+          <c:orientation val="minMax"/>
+        </c:scaling>
+        <c:delete val="0"/>
+        <c:axPos val="l"/>
+        <c:majorGridlines/>
+        <c:numFmt formatCode="General" sourceLinked="1"/>
+        <c:majorTickMark val="out"/>
+        <c:minorTickMark val="none"/>
+        <c:tickLblPos val="nextTo"/>
+        <c:crossAx val="193348096"/>
+        <c:crosses val="autoZero"/>
+        <c:crossBetween val="midCat"/>
+      </c:valAx>
+    </c:plotArea>
+    <c:legend>
+      <c:legendPos val="r"/>
+      <c:layout/>
+      <c:overlay val="0"/>
+    </c:legend>
+    <c:plotVisOnly val="1"/>
+    <c:dispBlanksAs val="gap"/>
+    <c:showDLblsOverMax val="0"/>
+  </c:chart>
+  <c:txPr>
+    <a:bodyPr/>
+    <a:lstStyle/>
+    <a:p>
+      <a:pPr>
+        <a:defRPr sz="1800"/>
+      </a:pPr>
+      <a:endParaRPr lang="de-DE"/>
+    </a:p>
+  </c:txPr>
+  <c:externalData r:id="rId1">
+    <c:autoUpdate val="0"/>
+  </c:externalData>
+</c:chartSpace>
 </file>
 
 <file path=ppt/diagrams/colors1.xml><?xml version="1.0" encoding="utf-8"?>
@@ -22141,6 +22637,282 @@
             </a:r>
             <a:r>
               <a:rPr lang="de-DE" dirty="0" smtClean="0"/>
+              <a:t> - Story Cards</a:t>
+            </a:r>
+            <a:endParaRPr lang="de-DE" dirty="0"/>
+          </a:p>
+        </p:txBody>
+      </p:sp>
+      <p:sp>
+        <p:nvSpPr>
+          <p:cNvPr id="4" name="Datumsplatzhalter 3"/>
+          <p:cNvSpPr>
+            <a:spLocks noGrp="1"/>
+          </p:cNvSpPr>
+          <p:nvPr>
+            <p:ph type="dt" sz="half" idx="10"/>
+          </p:nvPr>
+        </p:nvSpPr>
+        <p:spPr/>
+        <p:txBody>
+          <a:bodyPr/>
+          <a:lstStyle/>
+          <a:p>
+            <a:fld id="{68341324-8F87-45CB-9D14-B0BA1C09914F}" type="datetime1">
+              <a:rPr lang="de-DE" smtClean="0"/>
+              <a:t>29.10.2012</a:t>
+            </a:fld>
+            <a:endParaRPr lang="de-DE"/>
+          </a:p>
+        </p:txBody>
+      </p:sp>
+      <p:sp>
+        <p:nvSpPr>
+          <p:cNvPr id="5" name="Fußzeilenplatzhalter 4"/>
+          <p:cNvSpPr>
+            <a:spLocks noGrp="1"/>
+          </p:cNvSpPr>
+          <p:nvPr>
+            <p:ph type="ftr" sz="quarter" idx="11"/>
+          </p:nvPr>
+        </p:nvSpPr>
+        <p:spPr/>
+        <p:txBody>
+          <a:bodyPr/>
+          <a:lstStyle/>
+          <a:p>
+            <a:r>
+              <a:rPr lang="de-DE" smtClean="0"/>
+              <a:t>Clemens Wagner &amp; Christian Wolter</a:t>
+            </a:r>
+            <a:endParaRPr lang="de-DE"/>
+          </a:p>
+        </p:txBody>
+      </p:sp>
+      <p:sp>
+        <p:nvSpPr>
+          <p:cNvPr id="6" name="Foliennummernplatzhalter 5"/>
+          <p:cNvSpPr>
+            <a:spLocks noGrp="1"/>
+          </p:cNvSpPr>
+          <p:nvPr>
+            <p:ph type="sldNum" sz="quarter" idx="12"/>
+          </p:nvPr>
+        </p:nvSpPr>
+        <p:spPr/>
+        <p:txBody>
+          <a:bodyPr/>
+          <a:lstStyle/>
+          <a:p>
+            <a:fld id="{6C6AE60A-B69C-4790-82F7-3882EDF23186}" type="slidenum">
+              <a:rPr lang="de-DE" smtClean="0"/>
+              <a:pPr/>
+              <a:t>11</a:t>
+            </a:fld>
+            <a:r>
+              <a:rPr lang="de-DE" smtClean="0"/>
+              <a:t> </a:t>
+            </a:r>
+            <a:endParaRPr lang="de-DE" dirty="0"/>
+          </a:p>
+        </p:txBody>
+      </p:sp>
+      <p:pic>
+        <p:nvPicPr>
+          <p:cNvPr id="1027" name="Picture 3"/>
+          <p:cNvPicPr>
+            <a:picLocks noChangeAspect="1" noChangeArrowheads="1"/>
+          </p:cNvPicPr>
+          <p:nvPr/>
+        </p:nvPicPr>
+        <p:blipFill>
+          <a:blip r:embed="rId2">
+            <a:extLst>
+              <a:ext uri="{28A0092B-C50C-407E-A947-70E740481C1C}">
+                <a14:useLocalDpi xmlns:a14="http://schemas.microsoft.com/office/drawing/2010/main" val="0"/>
+              </a:ext>
+            </a:extLst>
+          </a:blip>
+          <a:srcRect/>
+          <a:stretch>
+            <a:fillRect/>
+          </a:stretch>
+        </p:blipFill>
+        <p:spPr bwMode="auto">
+          <a:xfrm>
+            <a:off x="3563888" y="2649291"/>
+            <a:ext cx="5267325" cy="3724275"/>
+          </a:xfrm>
+          <a:prstGeom prst="rect">
+            <a:avLst/>
+          </a:prstGeom>
+          <a:noFill/>
+          <a:ln>
+            <a:noFill/>
+          </a:ln>
+          <a:effectLst/>
+          <a:extLst>
+            <a:ext uri="{909E8E84-426E-40DD-AFC4-6F175D3DCCD1}">
+              <a14:hiddenFill xmlns:a14="http://schemas.microsoft.com/office/drawing/2010/main">
+                <a:solidFill>
+                  <a:schemeClr val="accent1"/>
+                </a:solidFill>
+              </a14:hiddenFill>
+            </a:ext>
+            <a:ext uri="{91240B29-F687-4F45-9708-019B960494DF}">
+              <a14:hiddenLine xmlns:a14="http://schemas.microsoft.com/office/drawing/2010/main" w="9525">
+                <a:solidFill>
+                  <a:schemeClr val="tx1"/>
+                </a:solidFill>
+                <a:miter lim="800000"/>
+                <a:headEnd/>
+                <a:tailEnd/>
+              </a14:hiddenLine>
+            </a:ext>
+            <a:ext uri="{AF507438-7753-43E0-B8FC-AC1667EBCBE1}">
+              <a14:hiddenEffects xmlns:a14="http://schemas.microsoft.com/office/drawing/2010/main">
+                <a:effectLst>
+                  <a:outerShdw dist="35921" dir="2700000" algn="ctr" rotWithShape="0">
+                    <a:schemeClr val="bg2"/>
+                  </a:outerShdw>
+                </a:effectLst>
+              </a14:hiddenEffects>
+            </a:ext>
+          </a:extLst>
+        </p:spPr>
+      </p:pic>
+      <p:pic>
+        <p:nvPicPr>
+          <p:cNvPr id="1026" name="Picture 2"/>
+          <p:cNvPicPr>
+            <a:picLocks noChangeAspect="1" noChangeArrowheads="1"/>
+          </p:cNvPicPr>
+          <p:nvPr/>
+        </p:nvPicPr>
+        <p:blipFill>
+          <a:blip r:embed="rId3">
+            <a:extLst>
+              <a:ext uri="{28A0092B-C50C-407E-A947-70E740481C1C}">
+                <a14:useLocalDpi xmlns:a14="http://schemas.microsoft.com/office/drawing/2010/main" val="0"/>
+              </a:ext>
+            </a:extLst>
+          </a:blip>
+          <a:srcRect/>
+          <a:stretch>
+            <a:fillRect/>
+          </a:stretch>
+        </p:blipFill>
+        <p:spPr bwMode="auto">
+          <a:xfrm>
+            <a:off x="539553" y="1574956"/>
+            <a:ext cx="4608512" cy="3258460"/>
+          </a:xfrm>
+          <a:prstGeom prst="rect">
+            <a:avLst/>
+          </a:prstGeom>
+          <a:noFill/>
+          <a:ln w="9525">
+            <a:solidFill>
+              <a:schemeClr val="bg1">
+                <a:lumMod val="50000"/>
+                <a:lumOff val="50000"/>
+              </a:schemeClr>
+            </a:solidFill>
+            <a:miter lim="800000"/>
+            <a:headEnd/>
+            <a:tailEnd/>
+          </a:ln>
+          <a:effectLst/>
+          <a:extLst>
+            <a:ext uri="{909E8E84-426E-40DD-AFC4-6F175D3DCCD1}">
+              <a14:hiddenFill xmlns:a14="http://schemas.microsoft.com/office/drawing/2010/main">
+                <a:solidFill>
+                  <a:schemeClr val="accent1"/>
+                </a:solidFill>
+              </a14:hiddenFill>
+            </a:ext>
+            <a:ext uri="{AF507438-7753-43E0-B8FC-AC1667EBCBE1}">
+              <a14:hiddenEffects xmlns:a14="http://schemas.microsoft.com/office/drawing/2010/main">
+                <a:effectLst>
+                  <a:outerShdw dist="35921" dir="2700000" algn="ctr" rotWithShape="0">
+                    <a:schemeClr val="bg2"/>
+                  </a:outerShdw>
+                </a:effectLst>
+              </a14:hiddenEffects>
+            </a:ext>
+          </a:extLst>
+        </p:spPr>
+      </p:pic>
+    </p:spTree>
+    <p:extLst>
+      <p:ext uri="{BB962C8B-B14F-4D97-AF65-F5344CB8AC3E}">
+        <p14:creationId xmlns:p14="http://schemas.microsoft.com/office/powerpoint/2010/main" val="2349738305"/>
+      </p:ext>
+    </p:extLst>
+  </p:cSld>
+  <p:clrMapOvr>
+    <a:masterClrMapping/>
+  </p:clrMapOvr>
+  <p:timing>
+    <p:tnLst>
+      <p:par>
+        <p:cTn id="1" dur="indefinite" restart="never" nodeType="tmRoot"/>
+      </p:par>
+    </p:tnLst>
+  </p:timing>
+</p:sld>
+</file>
+
+<file path=ppt/slides/slide12.xml><?xml version="1.0" encoding="utf-8"?>
+<p:sld xmlns:a="http://schemas.openxmlformats.org/drawingml/2006/main" xmlns:r="http://schemas.openxmlformats.org/officeDocument/2006/relationships" xmlns:p="http://schemas.openxmlformats.org/presentationml/2006/main">
+  <p:cSld>
+    <p:spTree>
+      <p:nvGrpSpPr>
+        <p:cNvPr id="1" name=""/>
+        <p:cNvGrpSpPr/>
+        <p:nvPr/>
+      </p:nvGrpSpPr>
+      <p:grpSpPr>
+        <a:xfrm>
+          <a:off x="0" y="0"/>
+          <a:ext cx="0" cy="0"/>
+          <a:chOff x="0" y="0"/>
+          <a:chExt cx="0" cy="0"/>
+        </a:xfrm>
+      </p:grpSpPr>
+      <p:sp>
+        <p:nvSpPr>
+          <p:cNvPr id="2" name="Titel 1"/>
+          <p:cNvSpPr>
+            <a:spLocks noGrp="1"/>
+          </p:cNvSpPr>
+          <p:nvPr>
+            <p:ph type="title"/>
+          </p:nvPr>
+        </p:nvSpPr>
+        <p:spPr/>
+        <p:txBody>
+          <a:bodyPr/>
+          <a:lstStyle/>
+          <a:p>
+            <a:r>
+              <a:rPr lang="de-DE" dirty="0" smtClean="0"/>
+              <a:t>3. </a:t>
+            </a:r>
+            <a:r>
+              <a:rPr lang="de-DE" dirty="0" err="1" smtClean="0"/>
+              <a:t>eXtreme</a:t>
+            </a:r>
+            <a:r>
+              <a:rPr lang="de-DE" dirty="0" smtClean="0"/>
+              <a:t> </a:t>
+            </a:r>
+            <a:r>
+              <a:rPr lang="de-DE" dirty="0" err="1" smtClean="0"/>
+              <a:t>Programming</a:t>
+            </a:r>
+            <a:r>
+              <a:rPr lang="de-DE" dirty="0" smtClean="0"/>
               <a:t> - Kreislauf</a:t>
             </a:r>
             <a:endParaRPr lang="de-DE" dirty="0"/>
@@ -22237,7 +23009,7 @@
           <a:p>
             <a:fld id="{6C6AE60A-B69C-4790-82F7-3882EDF23186}" type="slidenum">
               <a:rPr lang="de-DE" smtClean="0"/>
-              <a:t>11</a:t>
+              <a:t>12</a:t>
             </a:fld>
             <a:endParaRPr lang="de-DE" dirty="0"/>
           </a:p>
@@ -22263,7 +23035,7 @@
 </p:sld>
 </file>
 
-<file path=ppt/slides/slide12.xml><?xml version="1.0" encoding="utf-8"?>
+<file path=ppt/slides/slide13.xml><?xml version="1.0" encoding="utf-8"?>
 <p:sld xmlns:a="http://schemas.openxmlformats.org/drawingml/2006/main" xmlns:r="http://schemas.openxmlformats.org/officeDocument/2006/relationships" xmlns:p="http://schemas.openxmlformats.org/presentationml/2006/main">
   <p:cSld>
     <p:spTree>
@@ -22316,37 +23088,6 @@
               <a:t> - Statistiken</a:t>
             </a:r>
             <a:endParaRPr lang="de-DE" dirty="0"/>
-          </a:p>
-        </p:txBody>
-      </p:sp>
-      <p:sp>
-        <p:nvSpPr>
-          <p:cNvPr id="8" name="Inhaltsplatzhalter 7"/>
-          <p:cNvSpPr>
-            <a:spLocks noGrp="1"/>
-          </p:cNvSpPr>
-          <p:nvPr>
-            <p:ph idx="1"/>
-          </p:nvPr>
-        </p:nvSpPr>
-        <p:spPr/>
-        <p:txBody>
-          <a:bodyPr/>
-          <a:lstStyle/>
-          <a:p>
-            <a:r>
-              <a:rPr lang="de-DE" dirty="0" smtClean="0">
-                <a:solidFill>
-                  <a:srgbClr val="FF0000"/>
-                </a:solidFill>
-              </a:rPr>
-              <a:t>Statistik!!!</a:t>
-            </a:r>
-            <a:endParaRPr lang="de-DE" dirty="0">
-              <a:solidFill>
-                <a:srgbClr val="FF0000"/>
-              </a:solidFill>
-            </a:endParaRPr>
           </a:p>
         </p:txBody>
       </p:sp>
@@ -22415,12 +23156,37 @@
           <a:p>
             <a:fld id="{6C6AE60A-B69C-4790-82F7-3882EDF23186}" type="slidenum">
               <a:rPr lang="de-DE" smtClean="0"/>
-              <a:t>12</a:t>
+              <a:t>13</a:t>
             </a:fld>
             <a:endParaRPr lang="de-DE"/>
           </a:p>
         </p:txBody>
       </p:sp>
+      <p:graphicFrame>
+        <p:nvGraphicFramePr>
+          <p:cNvPr id="7" name="Inhaltsplatzhalter 6"/>
+          <p:cNvGraphicFramePr>
+            <a:graphicFrameLocks noGrp="1"/>
+          </p:cNvGraphicFramePr>
+          <p:nvPr>
+            <p:ph idx="1"/>
+            <p:extLst>
+              <p:ext uri="{D42A27DB-BD31-4B8C-83A1-F6EECF244321}">
+                <p14:modId xmlns:p14="http://schemas.microsoft.com/office/powerpoint/2010/main" val="1877438091"/>
+              </p:ext>
+            </p:extLst>
+          </p:nvPr>
+        </p:nvGraphicFramePr>
+        <p:xfrm>
+          <a:off x="467544" y="1628800"/>
+          <a:ext cx="8280920" cy="4608512"/>
+        </p:xfrm>
+        <a:graphic>
+          <a:graphicData uri="http://schemas.openxmlformats.org/drawingml/2006/chart">
+            <c:chart xmlns:c="http://schemas.openxmlformats.org/drawingml/2006/chart" xmlns:r="http://schemas.openxmlformats.org/officeDocument/2006/relationships" r:id="rId2"/>
+          </a:graphicData>
+        </a:graphic>
+      </p:graphicFrame>
     </p:spTree>
     <p:extLst>
       <p:ext uri="{BB962C8B-B14F-4D97-AF65-F5344CB8AC3E}">
@@ -22441,7 +23207,178 @@
 </p:sld>
 </file>
 
-<file path=ppt/slides/slide13.xml><?xml version="1.0" encoding="utf-8"?>
+<file path=ppt/slides/slide14.xml><?xml version="1.0" encoding="utf-8"?>
+<p:sld xmlns:a="http://schemas.openxmlformats.org/drawingml/2006/main" xmlns:r="http://schemas.openxmlformats.org/officeDocument/2006/relationships" xmlns:p="http://schemas.openxmlformats.org/presentationml/2006/main">
+  <p:cSld>
+    <p:spTree>
+      <p:nvGrpSpPr>
+        <p:cNvPr id="1" name=""/>
+        <p:cNvGrpSpPr/>
+        <p:nvPr/>
+      </p:nvGrpSpPr>
+      <p:grpSpPr>
+        <a:xfrm>
+          <a:off x="0" y="0"/>
+          <a:ext cx="0" cy="0"/>
+          <a:chOff x="0" y="0"/>
+          <a:chExt cx="0" cy="0"/>
+        </a:xfrm>
+      </p:grpSpPr>
+      <p:sp>
+        <p:nvSpPr>
+          <p:cNvPr id="9" name="Titel 1"/>
+          <p:cNvSpPr>
+            <a:spLocks noGrp="1"/>
+          </p:cNvSpPr>
+          <p:nvPr>
+            <p:ph type="title"/>
+          </p:nvPr>
+        </p:nvSpPr>
+        <p:spPr/>
+        <p:txBody>
+          <a:bodyPr/>
+          <a:lstStyle/>
+          <a:p>
+            <a:r>
+              <a:rPr lang="de-DE" dirty="0" smtClean="0"/>
+              <a:t>3. </a:t>
+            </a:r>
+            <a:r>
+              <a:rPr lang="de-DE" dirty="0" err="1" smtClean="0"/>
+              <a:t>eXtreme</a:t>
+            </a:r>
+            <a:r>
+              <a:rPr lang="de-DE" dirty="0" smtClean="0"/>
+              <a:t> </a:t>
+            </a:r>
+            <a:r>
+              <a:rPr lang="de-DE" dirty="0" err="1" smtClean="0"/>
+              <a:t>Programming</a:t>
+            </a:r>
+            <a:r>
+              <a:rPr lang="de-DE" dirty="0" smtClean="0"/>
+              <a:t> - Statistiken</a:t>
+            </a:r>
+            <a:endParaRPr lang="de-DE" dirty="0"/>
+          </a:p>
+        </p:txBody>
+      </p:sp>
+      <p:sp>
+        <p:nvSpPr>
+          <p:cNvPr id="4" name="Datumsplatzhalter 3"/>
+          <p:cNvSpPr>
+            <a:spLocks noGrp="1"/>
+          </p:cNvSpPr>
+          <p:nvPr>
+            <p:ph type="dt" sz="half" idx="10"/>
+          </p:nvPr>
+        </p:nvSpPr>
+        <p:spPr/>
+        <p:txBody>
+          <a:bodyPr/>
+          <a:lstStyle/>
+          <a:p>
+            <a:fld id="{68341324-8F87-45CB-9D14-B0BA1C09914F}" type="datetime1">
+              <a:rPr lang="de-DE" smtClean="0"/>
+              <a:t>29.10.2012</a:t>
+            </a:fld>
+            <a:endParaRPr lang="de-DE"/>
+          </a:p>
+        </p:txBody>
+      </p:sp>
+      <p:sp>
+        <p:nvSpPr>
+          <p:cNvPr id="5" name="Fußzeilenplatzhalter 4"/>
+          <p:cNvSpPr>
+            <a:spLocks noGrp="1"/>
+          </p:cNvSpPr>
+          <p:nvPr>
+            <p:ph type="ftr" sz="quarter" idx="11"/>
+          </p:nvPr>
+        </p:nvSpPr>
+        <p:spPr/>
+        <p:txBody>
+          <a:bodyPr/>
+          <a:lstStyle/>
+          <a:p>
+            <a:r>
+              <a:rPr lang="de-DE" smtClean="0"/>
+              <a:t>Clemens Wagner &amp; Christian Wolter</a:t>
+            </a:r>
+            <a:endParaRPr lang="de-DE"/>
+          </a:p>
+        </p:txBody>
+      </p:sp>
+      <p:sp>
+        <p:nvSpPr>
+          <p:cNvPr id="6" name="Foliennummernplatzhalter 5"/>
+          <p:cNvSpPr>
+            <a:spLocks noGrp="1"/>
+          </p:cNvSpPr>
+          <p:nvPr>
+            <p:ph type="sldNum" sz="quarter" idx="12"/>
+          </p:nvPr>
+        </p:nvSpPr>
+        <p:spPr/>
+        <p:txBody>
+          <a:bodyPr>
+            <a:normAutofit/>
+          </a:bodyPr>
+          <a:lstStyle/>
+          <a:p>
+            <a:fld id="{6C6AE60A-B69C-4790-82F7-3882EDF23186}" type="slidenum">
+              <a:rPr lang="de-DE" smtClean="0"/>
+              <a:t>14</a:t>
+            </a:fld>
+            <a:endParaRPr lang="de-DE"/>
+          </a:p>
+        </p:txBody>
+      </p:sp>
+      <p:graphicFrame>
+        <p:nvGraphicFramePr>
+          <p:cNvPr id="8" name="Diagramm 7"/>
+          <p:cNvGraphicFramePr>
+            <a:graphicFrameLocks/>
+          </p:cNvGraphicFramePr>
+          <p:nvPr>
+            <p:extLst>
+              <p:ext uri="{D42A27DB-BD31-4B8C-83A1-F6EECF244321}">
+                <p14:modId xmlns:p14="http://schemas.microsoft.com/office/powerpoint/2010/main" val="91010373"/>
+              </p:ext>
+            </p:extLst>
+          </p:nvPr>
+        </p:nvGraphicFramePr>
+        <p:xfrm>
+          <a:off x="683568" y="1628800"/>
+          <a:ext cx="7488832" cy="4680520"/>
+        </p:xfrm>
+        <a:graphic>
+          <a:graphicData uri="http://schemas.openxmlformats.org/drawingml/2006/chart">
+            <c:chart xmlns:c="http://schemas.openxmlformats.org/drawingml/2006/chart" xmlns:r="http://schemas.openxmlformats.org/officeDocument/2006/relationships" r:id="rId2"/>
+          </a:graphicData>
+        </a:graphic>
+      </p:graphicFrame>
+    </p:spTree>
+    <p:extLst>
+      <p:ext uri="{BB962C8B-B14F-4D97-AF65-F5344CB8AC3E}">
+        <p14:creationId xmlns:p14="http://schemas.microsoft.com/office/powerpoint/2010/main" val="1155043677"/>
+      </p:ext>
+    </p:extLst>
+  </p:cSld>
+  <p:clrMapOvr>
+    <a:masterClrMapping/>
+  </p:clrMapOvr>
+  <p:timing>
+    <p:tnLst>
+      <p:par>
+        <p:cTn id="1" dur="indefinite" restart="never" nodeType="tmRoot"/>
+      </p:par>
+    </p:tnLst>
+  </p:timing>
+</p:sld>
+</file>
+
+<file path=ppt/slides/slide15.xml><?xml version="1.0" encoding="utf-8"?>
 <p:sld xmlns:a="http://schemas.openxmlformats.org/drawingml/2006/main" xmlns:r="http://schemas.openxmlformats.org/officeDocument/2006/relationships" xmlns:p="http://schemas.openxmlformats.org/presentationml/2006/main">
   <p:cSld>
     <p:spTree>
@@ -22602,12 +23539,76 @@
           <a:p>
             <a:fld id="{6C6AE60A-B69C-4790-82F7-3882EDF23186}" type="slidenum">
               <a:rPr lang="de-DE" smtClean="0"/>
-              <a:t>13</a:t>
+              <a:t>15</a:t>
             </a:fld>
             <a:endParaRPr lang="de-DE"/>
           </a:p>
         </p:txBody>
       </p:sp>
+      <p:pic>
+        <p:nvPicPr>
+          <p:cNvPr id="2050" name="Picture 2"/>
+          <p:cNvPicPr>
+            <a:picLocks noChangeAspect="1" noChangeArrowheads="1"/>
+          </p:cNvPicPr>
+          <p:nvPr/>
+        </p:nvPicPr>
+        <p:blipFill>
+          <a:blip r:embed="rId2" cstate="print">
+            <a:extLst>
+              <a:ext uri="{28A0092B-C50C-407E-A947-70E740481C1C}">
+                <a14:useLocalDpi xmlns:a14="http://schemas.microsoft.com/office/drawing/2010/main" val="0"/>
+              </a:ext>
+            </a:extLst>
+          </a:blip>
+          <a:srcRect/>
+          <a:stretch>
+            <a:fillRect/>
+          </a:stretch>
+        </p:blipFill>
+        <p:spPr bwMode="auto">
+          <a:xfrm>
+            <a:off x="4768348" y="1628800"/>
+            <a:ext cx="3651176" cy="2738382"/>
+          </a:xfrm>
+          <a:prstGeom prst="rect">
+            <a:avLst/>
+          </a:prstGeom>
+          <a:noFill/>
+          <a:ln>
+            <a:noFill/>
+          </a:ln>
+          <a:effectLst/>
+          <a:extLst>
+            <a:ext uri="{909E8E84-426E-40DD-AFC4-6F175D3DCCD1}">
+              <a14:hiddenFill xmlns:a14="http://schemas.microsoft.com/office/drawing/2010/main">
+                <a:solidFill>
+                  <a:schemeClr val="accent1"/>
+                </a:solidFill>
+              </a14:hiddenFill>
+            </a:ext>
+            <a:ext uri="{91240B29-F687-4F45-9708-019B960494DF}">
+              <a14:hiddenLine xmlns:a14="http://schemas.microsoft.com/office/drawing/2010/main" w="9525">
+                <a:solidFill>
+                  <a:schemeClr val="tx1"/>
+                </a:solidFill>
+                <a:miter lim="800000"/>
+                <a:headEnd/>
+                <a:tailEnd/>
+              </a14:hiddenLine>
+            </a:ext>
+            <a:ext uri="{AF507438-7753-43E0-B8FC-AC1667EBCBE1}">
+              <a14:hiddenEffects xmlns:a14="http://schemas.microsoft.com/office/drawing/2010/main">
+                <a:effectLst>
+                  <a:outerShdw dist="35921" dir="2700000" algn="ctr" rotWithShape="0">
+                    <a:schemeClr val="bg2"/>
+                  </a:outerShdw>
+                </a:effectLst>
+              </a14:hiddenEffects>
+            </a:ext>
+          </a:extLst>
+        </p:spPr>
+      </p:pic>
     </p:spTree>
     <p:extLst>
       <p:ext uri="{BB962C8B-B14F-4D97-AF65-F5344CB8AC3E}">
@@ -22628,7 +23629,7 @@
 </p:sld>
 </file>
 
-<file path=ppt/slides/slide14.xml><?xml version="1.0" encoding="utf-8"?>
+<file path=ppt/slides/slide16.xml><?xml version="1.0" encoding="utf-8"?>
 <p:sld xmlns:a="http://schemas.openxmlformats.org/drawingml/2006/main" xmlns:r="http://schemas.openxmlformats.org/officeDocument/2006/relationships" xmlns:p="http://schemas.openxmlformats.org/presentationml/2006/main">
   <p:cSld>
     <p:spTree>
@@ -22766,7 +23767,7 @@
           <a:p>
             <a:fld id="{6C6AE60A-B69C-4790-82F7-3882EDF23186}" type="slidenum">
               <a:rPr lang="de-DE" smtClean="0"/>
-              <a:t>14</a:t>
+              <a:t>16</a:t>
             </a:fld>
             <a:endParaRPr lang="de-DE"/>
           </a:p>
@@ -22792,7 +23793,7 @@
 </p:sld>
 </file>
 
-<file path=ppt/slides/slide15.xml><?xml version="1.0" encoding="utf-8"?>
+<file path=ppt/slides/slide17.xml><?xml version="1.0" encoding="utf-8"?>
 <p:sld xmlns:a="http://schemas.openxmlformats.org/drawingml/2006/main" xmlns:r="http://schemas.openxmlformats.org/officeDocument/2006/relationships" xmlns:p="http://schemas.openxmlformats.org/presentationml/2006/main">
   <p:cSld>
     <p:spTree>
@@ -22922,7 +23923,7 @@
           <a:p>
             <a:fld id="{6C6AE60A-B69C-4790-82F7-3882EDF23186}" type="slidenum">
               <a:rPr lang="de-DE" smtClean="0"/>
-              <a:t>15</a:t>
+              <a:t>17</a:t>
             </a:fld>
             <a:endParaRPr lang="de-DE"/>
           </a:p>
@@ -22948,7 +23949,7 @@
 </p:sld>
 </file>
 
-<file path=ppt/slides/slide16.xml><?xml version="1.0" encoding="utf-8"?>
+<file path=ppt/slides/slide18.xml><?xml version="1.0" encoding="utf-8"?>
 <p:sld xmlns:a="http://schemas.openxmlformats.org/drawingml/2006/main" xmlns:r="http://schemas.openxmlformats.org/officeDocument/2006/relationships" xmlns:p="http://schemas.openxmlformats.org/presentationml/2006/main">
   <p:cSld>
     <p:spTree>
@@ -23078,7 +24079,7 @@
           <a:p>
             <a:fld id="{6C6AE60A-B69C-4790-82F7-3882EDF23186}" type="slidenum">
               <a:rPr lang="de-DE" smtClean="0"/>
-              <a:t>16</a:t>
+              <a:t>18</a:t>
             </a:fld>
             <a:endParaRPr lang="de-DE"/>
           </a:p>
@@ -23104,7 +24105,7 @@
 </p:sld>
 </file>
 
-<file path=ppt/slides/slide17.xml><?xml version="1.0" encoding="utf-8"?>
+<file path=ppt/slides/slide19.xml><?xml version="1.0" encoding="utf-8"?>
 <p:sld xmlns:a="http://schemas.openxmlformats.org/drawingml/2006/main" xmlns:r="http://schemas.openxmlformats.org/officeDocument/2006/relationships" xmlns:p="http://schemas.openxmlformats.org/presentationml/2006/main">
   <p:cSld>
     <p:spTree>
@@ -23275,7 +24276,7 @@
           <a:p>
             <a:fld id="{6C6AE60A-B69C-4790-82F7-3882EDF23186}" type="slidenum">
               <a:rPr lang="de-DE" smtClean="0"/>
-              <a:t>17</a:t>
+              <a:t>19</a:t>
             </a:fld>
             <a:endParaRPr lang="de-DE"/>
           </a:p>
@@ -23285,336 +24286,6 @@
     <p:extLst>
       <p:ext uri="{BB962C8B-B14F-4D97-AF65-F5344CB8AC3E}">
         <p14:creationId xmlns:p14="http://schemas.microsoft.com/office/powerpoint/2010/main" val="799708026"/>
-      </p:ext>
-    </p:extLst>
-  </p:cSld>
-  <p:clrMapOvr>
-    <a:masterClrMapping/>
-  </p:clrMapOvr>
-  <p:timing>
-    <p:tnLst>
-      <p:par>
-        <p:cTn id="1" dur="indefinite" restart="never" nodeType="tmRoot"/>
-      </p:par>
-    </p:tnLst>
-  </p:timing>
-</p:sld>
-</file>
-
-<file path=ppt/slides/slide18.xml><?xml version="1.0" encoding="utf-8"?>
-<p:sld xmlns:a="http://schemas.openxmlformats.org/drawingml/2006/main" xmlns:r="http://schemas.openxmlformats.org/officeDocument/2006/relationships" xmlns:p="http://schemas.openxmlformats.org/presentationml/2006/main">
-  <p:cSld>
-    <p:spTree>
-      <p:nvGrpSpPr>
-        <p:cNvPr id="1" name=""/>
-        <p:cNvGrpSpPr/>
-        <p:nvPr/>
-      </p:nvGrpSpPr>
-      <p:grpSpPr>
-        <a:xfrm>
-          <a:off x="0" y="0"/>
-          <a:ext cx="0" cy="0"/>
-          <a:chOff x="0" y="0"/>
-          <a:chExt cx="0" cy="0"/>
-        </a:xfrm>
-      </p:grpSpPr>
-      <p:sp>
-        <p:nvSpPr>
-          <p:cNvPr id="2" name="Titel 1"/>
-          <p:cNvSpPr>
-            <a:spLocks noGrp="1"/>
-          </p:cNvSpPr>
-          <p:nvPr>
-            <p:ph type="title"/>
-          </p:nvPr>
-        </p:nvSpPr>
-        <p:spPr/>
-        <p:txBody>
-          <a:bodyPr/>
-          <a:lstStyle/>
-          <a:p>
-            <a:r>
-              <a:rPr lang="de-DE" dirty="0" smtClean="0"/>
-              <a:t>4. Implementierung - Besonderheiten</a:t>
-            </a:r>
-            <a:endParaRPr lang="de-DE" dirty="0"/>
-          </a:p>
-        </p:txBody>
-      </p:sp>
-      <p:sp>
-        <p:nvSpPr>
-          <p:cNvPr id="3" name="Inhaltsplatzhalter 2"/>
-          <p:cNvSpPr>
-            <a:spLocks noGrp="1"/>
-          </p:cNvSpPr>
-          <p:nvPr>
-            <p:ph idx="1"/>
-          </p:nvPr>
-        </p:nvSpPr>
-        <p:spPr/>
-        <p:txBody>
-          <a:bodyPr/>
-          <a:lstStyle/>
-          <a:p>
-            <a:r>
-              <a:rPr lang="de-DE" dirty="0" smtClean="0"/>
-              <a:t>Besonderheiten Algorithmus:</a:t>
-            </a:r>
-          </a:p>
-          <a:p>
-            <a:pPr lvl="1"/>
-            <a:r>
-              <a:rPr lang="de-DE" dirty="0" smtClean="0"/>
-              <a:t>Pheromone zufällig verteilt</a:t>
-            </a:r>
-          </a:p>
-          <a:p>
-            <a:pPr lvl="1"/>
-            <a:r>
-              <a:rPr lang="de-DE" dirty="0" smtClean="0"/>
-              <a:t>Iteration </a:t>
-            </a:r>
-            <a:r>
-              <a:rPr lang="de-DE" dirty="0" smtClean="0">
-                <a:sym typeface="Wingdings" pitchFamily="2" charset="2"/>
-              </a:rPr>
-              <a:t> neue Berechnung</a:t>
-            </a:r>
-            <a:endParaRPr lang="de-DE" dirty="0" smtClean="0"/>
-          </a:p>
-          <a:p>
-            <a:pPr lvl="1"/>
-            <a:r>
-              <a:rPr lang="de-DE" dirty="0" smtClean="0"/>
-              <a:t>Adaptives </a:t>
-            </a:r>
-            <a:r>
-              <a:rPr lang="de-DE" dirty="0" err="1" smtClean="0"/>
-              <a:t>Pheromonupdate</a:t>
-            </a:r>
-            <a:endParaRPr lang="de-DE" dirty="0" smtClean="0"/>
-          </a:p>
-          <a:p>
-            <a:pPr lvl="1"/>
-            <a:r>
-              <a:rPr lang="de-DE" dirty="0" smtClean="0"/>
-              <a:t>Auslagerung in eigenen Thread</a:t>
-            </a:r>
-          </a:p>
-          <a:p>
-            <a:endParaRPr lang="de-DE" dirty="0"/>
-          </a:p>
-        </p:txBody>
-      </p:sp>
-      <p:sp>
-        <p:nvSpPr>
-          <p:cNvPr id="4" name="Datumsplatzhalter 3"/>
-          <p:cNvSpPr>
-            <a:spLocks noGrp="1"/>
-          </p:cNvSpPr>
-          <p:nvPr>
-            <p:ph type="dt" sz="half" idx="10"/>
-          </p:nvPr>
-        </p:nvSpPr>
-        <p:spPr/>
-        <p:txBody>
-          <a:bodyPr/>
-          <a:lstStyle/>
-          <a:p>
-            <a:fld id="{E3C2BFFC-52F5-4CE7-BCD5-DEDD2807FD86}" type="datetime1">
-              <a:rPr lang="de-DE" smtClean="0"/>
-              <a:t>29.10.2012</a:t>
-            </a:fld>
-            <a:endParaRPr lang="de-DE"/>
-          </a:p>
-        </p:txBody>
-      </p:sp>
-      <p:sp>
-        <p:nvSpPr>
-          <p:cNvPr id="5" name="Fußzeilenplatzhalter 4"/>
-          <p:cNvSpPr>
-            <a:spLocks noGrp="1"/>
-          </p:cNvSpPr>
-          <p:nvPr>
-            <p:ph type="ftr" sz="quarter" idx="11"/>
-          </p:nvPr>
-        </p:nvSpPr>
-        <p:spPr/>
-        <p:txBody>
-          <a:bodyPr/>
-          <a:lstStyle/>
-          <a:p>
-            <a:r>
-              <a:rPr lang="de-DE" smtClean="0"/>
-              <a:t>Clemens Wagner &amp; Christian Wolter</a:t>
-            </a:r>
-            <a:endParaRPr lang="de-DE"/>
-          </a:p>
-        </p:txBody>
-      </p:sp>
-      <p:sp>
-        <p:nvSpPr>
-          <p:cNvPr id="6" name="Foliennummernplatzhalter 5"/>
-          <p:cNvSpPr>
-            <a:spLocks noGrp="1"/>
-          </p:cNvSpPr>
-          <p:nvPr>
-            <p:ph type="sldNum" sz="quarter" idx="12"/>
-          </p:nvPr>
-        </p:nvSpPr>
-        <p:spPr/>
-        <p:txBody>
-          <a:bodyPr>
-            <a:normAutofit/>
-          </a:bodyPr>
-          <a:lstStyle/>
-          <a:p>
-            <a:fld id="{6C6AE60A-B69C-4790-82F7-3882EDF23186}" type="slidenum">
-              <a:rPr lang="de-DE" smtClean="0"/>
-              <a:t>18</a:t>
-            </a:fld>
-            <a:endParaRPr lang="de-DE"/>
-          </a:p>
-        </p:txBody>
-      </p:sp>
-    </p:spTree>
-    <p:extLst>
-      <p:ext uri="{BB962C8B-B14F-4D97-AF65-F5344CB8AC3E}">
-        <p14:creationId xmlns:p14="http://schemas.microsoft.com/office/powerpoint/2010/main" val="3695580845"/>
-      </p:ext>
-    </p:extLst>
-  </p:cSld>
-  <p:clrMapOvr>
-    <a:masterClrMapping/>
-  </p:clrMapOvr>
-  <p:timing>
-    <p:tnLst>
-      <p:par>
-        <p:cTn id="1" dur="indefinite" restart="never" nodeType="tmRoot"/>
-      </p:par>
-    </p:tnLst>
-  </p:timing>
-</p:sld>
-</file>
-
-<file path=ppt/slides/slide19.xml><?xml version="1.0" encoding="utf-8"?>
-<p:sld xmlns:a="http://schemas.openxmlformats.org/drawingml/2006/main" xmlns:r="http://schemas.openxmlformats.org/officeDocument/2006/relationships" xmlns:p="http://schemas.openxmlformats.org/presentationml/2006/main">
-  <p:cSld>
-    <p:spTree>
-      <p:nvGrpSpPr>
-        <p:cNvPr id="1" name=""/>
-        <p:cNvGrpSpPr/>
-        <p:nvPr/>
-      </p:nvGrpSpPr>
-      <p:grpSpPr>
-        <a:xfrm>
-          <a:off x="0" y="0"/>
-          <a:ext cx="0" cy="0"/>
-          <a:chOff x="0" y="0"/>
-          <a:chExt cx="0" cy="0"/>
-        </a:xfrm>
-      </p:grpSpPr>
-      <p:sp>
-        <p:nvSpPr>
-          <p:cNvPr id="3" name="Titel 2"/>
-          <p:cNvSpPr>
-            <a:spLocks noGrp="1"/>
-          </p:cNvSpPr>
-          <p:nvPr>
-            <p:ph type="title"/>
-          </p:nvPr>
-        </p:nvSpPr>
-        <p:spPr>
-          <a:xfrm>
-            <a:off x="323528" y="4725144"/>
-            <a:ext cx="8305800" cy="693624"/>
-          </a:xfrm>
-        </p:spPr>
-        <p:txBody>
-          <a:bodyPr/>
-          <a:lstStyle/>
-          <a:p>
-            <a:r>
-              <a:rPr lang="de-DE" dirty="0" smtClean="0"/>
-              <a:t>5. Programmvorführung</a:t>
-            </a:r>
-            <a:endParaRPr lang="de-DE" dirty="0"/>
-          </a:p>
-        </p:txBody>
-      </p:sp>
-      <p:sp>
-        <p:nvSpPr>
-          <p:cNvPr id="4" name="Datumsplatzhalter 3"/>
-          <p:cNvSpPr>
-            <a:spLocks noGrp="1"/>
-          </p:cNvSpPr>
-          <p:nvPr>
-            <p:ph type="dt" sz="half" idx="10"/>
-          </p:nvPr>
-        </p:nvSpPr>
-        <p:spPr/>
-        <p:txBody>
-          <a:bodyPr/>
-          <a:lstStyle/>
-          <a:p>
-            <a:fld id="{D1C9A838-1B27-4195-A75D-5F68C08EE2A8}" type="datetime1">
-              <a:rPr lang="de-DE" smtClean="0"/>
-              <a:t>29.10.2012</a:t>
-            </a:fld>
-            <a:endParaRPr lang="de-DE"/>
-          </a:p>
-        </p:txBody>
-      </p:sp>
-      <p:sp>
-        <p:nvSpPr>
-          <p:cNvPr id="5" name="Fußzeilenplatzhalter 4"/>
-          <p:cNvSpPr>
-            <a:spLocks noGrp="1"/>
-          </p:cNvSpPr>
-          <p:nvPr>
-            <p:ph type="ftr" sz="quarter" idx="11"/>
-          </p:nvPr>
-        </p:nvSpPr>
-        <p:spPr/>
-        <p:txBody>
-          <a:bodyPr/>
-          <a:lstStyle/>
-          <a:p>
-            <a:r>
-              <a:rPr lang="de-DE" smtClean="0"/>
-              <a:t>Clemens Wagner &amp; Christian Wolter</a:t>
-            </a:r>
-            <a:endParaRPr lang="de-DE"/>
-          </a:p>
-        </p:txBody>
-      </p:sp>
-      <p:sp>
-        <p:nvSpPr>
-          <p:cNvPr id="6" name="Foliennummernplatzhalter 5"/>
-          <p:cNvSpPr>
-            <a:spLocks noGrp="1"/>
-          </p:cNvSpPr>
-          <p:nvPr>
-            <p:ph type="sldNum" sz="quarter" idx="12"/>
-          </p:nvPr>
-        </p:nvSpPr>
-        <p:spPr/>
-        <p:txBody>
-          <a:bodyPr/>
-          <a:lstStyle/>
-          <a:p>
-            <a:fld id="{6C6AE60A-B69C-4790-82F7-3882EDF23186}" type="slidenum">
-              <a:rPr lang="de-DE" smtClean="0"/>
-              <a:t>19</a:t>
-            </a:fld>
-            <a:endParaRPr lang="de-DE"/>
-          </a:p>
-        </p:txBody>
-      </p:sp>
-    </p:spTree>
-    <p:extLst>
-      <p:ext uri="{BB962C8B-B14F-4D97-AF65-F5344CB8AC3E}">
-        <p14:creationId xmlns:p14="http://schemas.microsoft.com/office/powerpoint/2010/main" val="2897771327"/>
       </p:ext>
     </p:extLst>
   </p:cSld>
@@ -23871,6 +24542,336 @@
       </p:grpSpPr>
       <p:sp>
         <p:nvSpPr>
+          <p:cNvPr id="2" name="Titel 1"/>
+          <p:cNvSpPr>
+            <a:spLocks noGrp="1"/>
+          </p:cNvSpPr>
+          <p:nvPr>
+            <p:ph type="title"/>
+          </p:nvPr>
+        </p:nvSpPr>
+        <p:spPr/>
+        <p:txBody>
+          <a:bodyPr/>
+          <a:lstStyle/>
+          <a:p>
+            <a:r>
+              <a:rPr lang="de-DE" dirty="0" smtClean="0"/>
+              <a:t>4. Implementierung - Besonderheiten</a:t>
+            </a:r>
+            <a:endParaRPr lang="de-DE" dirty="0"/>
+          </a:p>
+        </p:txBody>
+      </p:sp>
+      <p:sp>
+        <p:nvSpPr>
+          <p:cNvPr id="3" name="Inhaltsplatzhalter 2"/>
+          <p:cNvSpPr>
+            <a:spLocks noGrp="1"/>
+          </p:cNvSpPr>
+          <p:nvPr>
+            <p:ph idx="1"/>
+          </p:nvPr>
+        </p:nvSpPr>
+        <p:spPr/>
+        <p:txBody>
+          <a:bodyPr/>
+          <a:lstStyle/>
+          <a:p>
+            <a:r>
+              <a:rPr lang="de-DE" dirty="0" smtClean="0"/>
+              <a:t>Besonderheiten Algorithmus:</a:t>
+            </a:r>
+          </a:p>
+          <a:p>
+            <a:pPr lvl="1"/>
+            <a:r>
+              <a:rPr lang="de-DE" dirty="0" smtClean="0"/>
+              <a:t>Pheromone zufällig verteilt</a:t>
+            </a:r>
+          </a:p>
+          <a:p>
+            <a:pPr lvl="1"/>
+            <a:r>
+              <a:rPr lang="de-DE" dirty="0" smtClean="0"/>
+              <a:t>Iteration </a:t>
+            </a:r>
+            <a:r>
+              <a:rPr lang="de-DE" dirty="0" smtClean="0">
+                <a:sym typeface="Wingdings" pitchFamily="2" charset="2"/>
+              </a:rPr>
+              <a:t> neue Berechnung</a:t>
+            </a:r>
+            <a:endParaRPr lang="de-DE" dirty="0" smtClean="0"/>
+          </a:p>
+          <a:p>
+            <a:pPr lvl="1"/>
+            <a:r>
+              <a:rPr lang="de-DE" dirty="0" smtClean="0"/>
+              <a:t>Adaptives </a:t>
+            </a:r>
+            <a:r>
+              <a:rPr lang="de-DE" dirty="0" err="1" smtClean="0"/>
+              <a:t>Pheromonupdate</a:t>
+            </a:r>
+            <a:endParaRPr lang="de-DE" dirty="0" smtClean="0"/>
+          </a:p>
+          <a:p>
+            <a:pPr lvl="1"/>
+            <a:r>
+              <a:rPr lang="de-DE" dirty="0" smtClean="0"/>
+              <a:t>Auslagerung in eigenen Thread</a:t>
+            </a:r>
+          </a:p>
+          <a:p>
+            <a:endParaRPr lang="de-DE" dirty="0"/>
+          </a:p>
+        </p:txBody>
+      </p:sp>
+      <p:sp>
+        <p:nvSpPr>
+          <p:cNvPr id="4" name="Datumsplatzhalter 3"/>
+          <p:cNvSpPr>
+            <a:spLocks noGrp="1"/>
+          </p:cNvSpPr>
+          <p:nvPr>
+            <p:ph type="dt" sz="half" idx="10"/>
+          </p:nvPr>
+        </p:nvSpPr>
+        <p:spPr/>
+        <p:txBody>
+          <a:bodyPr/>
+          <a:lstStyle/>
+          <a:p>
+            <a:fld id="{E3C2BFFC-52F5-4CE7-BCD5-DEDD2807FD86}" type="datetime1">
+              <a:rPr lang="de-DE" smtClean="0"/>
+              <a:t>29.10.2012</a:t>
+            </a:fld>
+            <a:endParaRPr lang="de-DE"/>
+          </a:p>
+        </p:txBody>
+      </p:sp>
+      <p:sp>
+        <p:nvSpPr>
+          <p:cNvPr id="5" name="Fußzeilenplatzhalter 4"/>
+          <p:cNvSpPr>
+            <a:spLocks noGrp="1"/>
+          </p:cNvSpPr>
+          <p:nvPr>
+            <p:ph type="ftr" sz="quarter" idx="11"/>
+          </p:nvPr>
+        </p:nvSpPr>
+        <p:spPr/>
+        <p:txBody>
+          <a:bodyPr/>
+          <a:lstStyle/>
+          <a:p>
+            <a:r>
+              <a:rPr lang="de-DE" smtClean="0"/>
+              <a:t>Clemens Wagner &amp; Christian Wolter</a:t>
+            </a:r>
+            <a:endParaRPr lang="de-DE"/>
+          </a:p>
+        </p:txBody>
+      </p:sp>
+      <p:sp>
+        <p:nvSpPr>
+          <p:cNvPr id="6" name="Foliennummernplatzhalter 5"/>
+          <p:cNvSpPr>
+            <a:spLocks noGrp="1"/>
+          </p:cNvSpPr>
+          <p:nvPr>
+            <p:ph type="sldNum" sz="quarter" idx="12"/>
+          </p:nvPr>
+        </p:nvSpPr>
+        <p:spPr/>
+        <p:txBody>
+          <a:bodyPr>
+            <a:normAutofit/>
+          </a:bodyPr>
+          <a:lstStyle/>
+          <a:p>
+            <a:fld id="{6C6AE60A-B69C-4790-82F7-3882EDF23186}" type="slidenum">
+              <a:rPr lang="de-DE" smtClean="0"/>
+              <a:t>20</a:t>
+            </a:fld>
+            <a:endParaRPr lang="de-DE"/>
+          </a:p>
+        </p:txBody>
+      </p:sp>
+    </p:spTree>
+    <p:extLst>
+      <p:ext uri="{BB962C8B-B14F-4D97-AF65-F5344CB8AC3E}">
+        <p14:creationId xmlns:p14="http://schemas.microsoft.com/office/powerpoint/2010/main" val="3695580845"/>
+      </p:ext>
+    </p:extLst>
+  </p:cSld>
+  <p:clrMapOvr>
+    <a:masterClrMapping/>
+  </p:clrMapOvr>
+  <p:timing>
+    <p:tnLst>
+      <p:par>
+        <p:cTn id="1" dur="indefinite" restart="never" nodeType="tmRoot"/>
+      </p:par>
+    </p:tnLst>
+  </p:timing>
+</p:sld>
+</file>
+
+<file path=ppt/slides/slide21.xml><?xml version="1.0" encoding="utf-8"?>
+<p:sld xmlns:a="http://schemas.openxmlformats.org/drawingml/2006/main" xmlns:r="http://schemas.openxmlformats.org/officeDocument/2006/relationships" xmlns:p="http://schemas.openxmlformats.org/presentationml/2006/main">
+  <p:cSld>
+    <p:spTree>
+      <p:nvGrpSpPr>
+        <p:cNvPr id="1" name=""/>
+        <p:cNvGrpSpPr/>
+        <p:nvPr/>
+      </p:nvGrpSpPr>
+      <p:grpSpPr>
+        <a:xfrm>
+          <a:off x="0" y="0"/>
+          <a:ext cx="0" cy="0"/>
+          <a:chOff x="0" y="0"/>
+          <a:chExt cx="0" cy="0"/>
+        </a:xfrm>
+      </p:grpSpPr>
+      <p:sp>
+        <p:nvSpPr>
+          <p:cNvPr id="3" name="Titel 2"/>
+          <p:cNvSpPr>
+            <a:spLocks noGrp="1"/>
+          </p:cNvSpPr>
+          <p:nvPr>
+            <p:ph type="title"/>
+          </p:nvPr>
+        </p:nvSpPr>
+        <p:spPr>
+          <a:xfrm>
+            <a:off x="323528" y="4725144"/>
+            <a:ext cx="8305800" cy="693624"/>
+          </a:xfrm>
+        </p:spPr>
+        <p:txBody>
+          <a:bodyPr/>
+          <a:lstStyle/>
+          <a:p>
+            <a:r>
+              <a:rPr lang="de-DE" dirty="0" smtClean="0"/>
+              <a:t>5. Programmvorführung</a:t>
+            </a:r>
+            <a:endParaRPr lang="de-DE" dirty="0"/>
+          </a:p>
+        </p:txBody>
+      </p:sp>
+      <p:sp>
+        <p:nvSpPr>
+          <p:cNvPr id="4" name="Datumsplatzhalter 3"/>
+          <p:cNvSpPr>
+            <a:spLocks noGrp="1"/>
+          </p:cNvSpPr>
+          <p:nvPr>
+            <p:ph type="dt" sz="half" idx="10"/>
+          </p:nvPr>
+        </p:nvSpPr>
+        <p:spPr/>
+        <p:txBody>
+          <a:bodyPr/>
+          <a:lstStyle/>
+          <a:p>
+            <a:fld id="{D1C9A838-1B27-4195-A75D-5F68C08EE2A8}" type="datetime1">
+              <a:rPr lang="de-DE" smtClean="0"/>
+              <a:t>29.10.2012</a:t>
+            </a:fld>
+            <a:endParaRPr lang="de-DE"/>
+          </a:p>
+        </p:txBody>
+      </p:sp>
+      <p:sp>
+        <p:nvSpPr>
+          <p:cNvPr id="5" name="Fußzeilenplatzhalter 4"/>
+          <p:cNvSpPr>
+            <a:spLocks noGrp="1"/>
+          </p:cNvSpPr>
+          <p:nvPr>
+            <p:ph type="ftr" sz="quarter" idx="11"/>
+          </p:nvPr>
+        </p:nvSpPr>
+        <p:spPr/>
+        <p:txBody>
+          <a:bodyPr/>
+          <a:lstStyle/>
+          <a:p>
+            <a:r>
+              <a:rPr lang="de-DE" smtClean="0"/>
+              <a:t>Clemens Wagner &amp; Christian Wolter</a:t>
+            </a:r>
+            <a:endParaRPr lang="de-DE"/>
+          </a:p>
+        </p:txBody>
+      </p:sp>
+      <p:sp>
+        <p:nvSpPr>
+          <p:cNvPr id="6" name="Foliennummernplatzhalter 5"/>
+          <p:cNvSpPr>
+            <a:spLocks noGrp="1"/>
+          </p:cNvSpPr>
+          <p:nvPr>
+            <p:ph type="sldNum" sz="quarter" idx="12"/>
+          </p:nvPr>
+        </p:nvSpPr>
+        <p:spPr/>
+        <p:txBody>
+          <a:bodyPr/>
+          <a:lstStyle/>
+          <a:p>
+            <a:fld id="{6C6AE60A-B69C-4790-82F7-3882EDF23186}" type="slidenum">
+              <a:rPr lang="de-DE" smtClean="0"/>
+              <a:t>21</a:t>
+            </a:fld>
+            <a:endParaRPr lang="de-DE"/>
+          </a:p>
+        </p:txBody>
+      </p:sp>
+    </p:spTree>
+    <p:extLst>
+      <p:ext uri="{BB962C8B-B14F-4D97-AF65-F5344CB8AC3E}">
+        <p14:creationId xmlns:p14="http://schemas.microsoft.com/office/powerpoint/2010/main" val="2897771327"/>
+      </p:ext>
+    </p:extLst>
+  </p:cSld>
+  <p:clrMapOvr>
+    <a:masterClrMapping/>
+  </p:clrMapOvr>
+  <p:timing>
+    <p:tnLst>
+      <p:par>
+        <p:cTn id="1" dur="indefinite" restart="never" nodeType="tmRoot"/>
+      </p:par>
+    </p:tnLst>
+  </p:timing>
+</p:sld>
+</file>
+
+<file path=ppt/slides/slide22.xml><?xml version="1.0" encoding="utf-8"?>
+<p:sld xmlns:a="http://schemas.openxmlformats.org/drawingml/2006/main" xmlns:r="http://schemas.openxmlformats.org/officeDocument/2006/relationships" xmlns:p="http://schemas.openxmlformats.org/presentationml/2006/main">
+  <p:cSld>
+    <p:spTree>
+      <p:nvGrpSpPr>
+        <p:cNvPr id="1" name=""/>
+        <p:cNvGrpSpPr/>
+        <p:nvPr/>
+      </p:nvGrpSpPr>
+      <p:grpSpPr>
+        <a:xfrm>
+          <a:off x="0" y="0"/>
+          <a:ext cx="0" cy="0"/>
+          <a:chOff x="0" y="0"/>
+          <a:chExt cx="0" cy="0"/>
+        </a:xfrm>
+      </p:grpSpPr>
+      <p:sp>
+        <p:nvSpPr>
           <p:cNvPr id="3" name="Titel 2"/>
           <p:cNvSpPr>
             <a:spLocks noGrp="1"/>
@@ -23960,7 +24961,7 @@
           <a:p>
             <a:fld id="{6C6AE60A-B69C-4790-82F7-3882EDF23186}" type="slidenum">
               <a:rPr lang="de-DE" smtClean="0"/>
-              <a:t>20</a:t>
+              <a:t>22</a:t>
             </a:fld>
             <a:endParaRPr lang="de-DE"/>
           </a:p>
@@ -23986,7 +24987,7 @@
 </p:sld>
 </file>
 
-<file path=ppt/slides/slide21.xml><?xml version="1.0" encoding="utf-8"?>
+<file path=ppt/slides/slide23.xml><?xml version="1.0" encoding="utf-8"?>
 <p:sld xmlns:a="http://schemas.openxmlformats.org/drawingml/2006/main" xmlns:r="http://schemas.openxmlformats.org/officeDocument/2006/relationships" xmlns:p="http://schemas.openxmlformats.org/presentationml/2006/main">
   <p:cSld>
     <p:spTree>
@@ -24142,7 +25143,7 @@
           <a:p>
             <a:fld id="{6C6AE60A-B69C-4790-82F7-3882EDF23186}" type="slidenum">
               <a:rPr lang="de-DE" smtClean="0"/>
-              <a:t>21</a:t>
+              <a:t>23</a:t>
             </a:fld>
             <a:endParaRPr lang="de-DE"/>
           </a:p>
@@ -25447,8 +26448,13 @@
           <a:p>
             <a:r>
               <a:rPr lang="de-DE" dirty="0" smtClean="0"/>
-              <a:t>Planung</a:t>
+              <a:t>Planung, </a:t>
             </a:r>
+            <a:r>
+              <a:rPr lang="de-DE" dirty="0" smtClean="0"/>
+              <a:t>Story Cards</a:t>
+            </a:r>
+            <a:endParaRPr lang="de-DE" dirty="0" smtClean="0"/>
           </a:p>
           <a:p>
             <a:r>

</xml_diff>

<commit_message>
PaintPanel Code aufgeräumt. Weitere Sttistik Folie hinzugefügt
</commit_message>
<xml_diff>
--- a/Ants/src/doku/präsentation.pptx
+++ b/Ants/src/doku/präsentation.pptx
@@ -5,10 +5,10 @@
     <p:sldMasterId id="2147483876" r:id="rId1"/>
   </p:sldMasterIdLst>
   <p:notesMasterIdLst>
-    <p:notesMasterId r:id="rId25"/>
+    <p:notesMasterId r:id="rId26"/>
   </p:notesMasterIdLst>
   <p:handoutMasterIdLst>
-    <p:handoutMasterId r:id="rId26"/>
+    <p:handoutMasterId r:id="rId27"/>
   </p:handoutMasterIdLst>
   <p:sldIdLst>
     <p:sldId id="274" r:id="rId2"/>
@@ -25,15 +25,16 @@
     <p:sldId id="263" r:id="rId13"/>
     <p:sldId id="271" r:id="rId14"/>
     <p:sldId id="282" r:id="rId15"/>
-    <p:sldId id="264" r:id="rId16"/>
-    <p:sldId id="278" r:id="rId17"/>
-    <p:sldId id="265" r:id="rId18"/>
-    <p:sldId id="266" r:id="rId19"/>
-    <p:sldId id="267" r:id="rId20"/>
-    <p:sldId id="268" r:id="rId21"/>
-    <p:sldId id="279" r:id="rId22"/>
-    <p:sldId id="280" r:id="rId23"/>
-    <p:sldId id="270" r:id="rId24"/>
+    <p:sldId id="283" r:id="rId16"/>
+    <p:sldId id="264" r:id="rId17"/>
+    <p:sldId id="278" r:id="rId18"/>
+    <p:sldId id="265" r:id="rId19"/>
+    <p:sldId id="266" r:id="rId20"/>
+    <p:sldId id="267" r:id="rId21"/>
+    <p:sldId id="268" r:id="rId22"/>
+    <p:sldId id="279" r:id="rId23"/>
+    <p:sldId id="280" r:id="rId24"/>
+    <p:sldId id="270" r:id="rId25"/>
   </p:sldIdLst>
   <p:sldSz cx="9144000" cy="6858000" type="screen4x3"/>
   <p:notesSz cx="6858000" cy="9144000"/>
@@ -629,754 +630,268 @@
 </c:chartSpace>
 </file>
 
-<file path=ppt/diagrams/colors1.xml><?xml version="1.0" encoding="utf-8"?>
-<dgm:colorsDef xmlns:dgm="http://schemas.openxmlformats.org/drawingml/2006/diagram" xmlns:a="http://schemas.openxmlformats.org/drawingml/2006/main" uniqueId="urn:microsoft.com/office/officeart/2005/8/colors/accent1_2">
-  <dgm:title val=""/>
-  <dgm:desc val=""/>
-  <dgm:catLst>
-    <dgm:cat type="accent1" pri="11200"/>
-  </dgm:catLst>
-  <dgm:styleLbl name="node0">
-    <dgm:fillClrLst meth="repeat">
-      <a:schemeClr val="accent1"/>
-    </dgm:fillClrLst>
-    <dgm:linClrLst meth="repeat">
-      <a:schemeClr val="lt1"/>
-    </dgm:linClrLst>
-    <dgm:effectClrLst/>
-    <dgm:txLinClrLst/>
-    <dgm:txFillClrLst/>
-    <dgm:txEffectClrLst/>
-  </dgm:styleLbl>
-  <dgm:styleLbl name="alignNode1">
-    <dgm:fillClrLst meth="repeat">
-      <a:schemeClr val="accent1"/>
-    </dgm:fillClrLst>
-    <dgm:linClrLst meth="repeat">
-      <a:schemeClr val="accent1"/>
-    </dgm:linClrLst>
-    <dgm:effectClrLst/>
-    <dgm:txLinClrLst/>
-    <dgm:txFillClrLst/>
-    <dgm:txEffectClrLst/>
-  </dgm:styleLbl>
-  <dgm:styleLbl name="node1">
-    <dgm:fillClrLst meth="repeat">
-      <a:schemeClr val="accent1"/>
-    </dgm:fillClrLst>
-    <dgm:linClrLst meth="repeat">
-      <a:schemeClr val="lt1"/>
-    </dgm:linClrLst>
-    <dgm:effectClrLst/>
-    <dgm:txLinClrLst/>
-    <dgm:txFillClrLst/>
-    <dgm:txEffectClrLst/>
-  </dgm:styleLbl>
-  <dgm:styleLbl name="lnNode1">
-    <dgm:fillClrLst meth="repeat">
-      <a:schemeClr val="accent1"/>
-    </dgm:fillClrLst>
-    <dgm:linClrLst meth="repeat">
-      <a:schemeClr val="lt1"/>
-    </dgm:linClrLst>
-    <dgm:effectClrLst/>
-    <dgm:txLinClrLst/>
-    <dgm:txFillClrLst/>
-    <dgm:txEffectClrLst/>
-  </dgm:styleLbl>
-  <dgm:styleLbl name="vennNode1">
-    <dgm:fillClrLst meth="repeat">
-      <a:schemeClr val="accent1">
-        <a:alpha val="50000"/>
-      </a:schemeClr>
-    </dgm:fillClrLst>
-    <dgm:linClrLst meth="repeat">
-      <a:schemeClr val="lt1"/>
-    </dgm:linClrLst>
-    <dgm:effectClrLst/>
-    <dgm:txLinClrLst/>
-    <dgm:txFillClrLst/>
-    <dgm:txEffectClrLst/>
-  </dgm:styleLbl>
-  <dgm:styleLbl name="node2">
-    <dgm:fillClrLst meth="repeat">
-      <a:schemeClr val="accent1"/>
-    </dgm:fillClrLst>
-    <dgm:linClrLst meth="repeat">
-      <a:schemeClr val="lt1"/>
-    </dgm:linClrLst>
-    <dgm:effectClrLst/>
-    <dgm:txLinClrLst/>
-    <dgm:txFillClrLst/>
-    <dgm:txEffectClrLst/>
-  </dgm:styleLbl>
-  <dgm:styleLbl name="node3">
-    <dgm:fillClrLst meth="repeat">
-      <a:schemeClr val="accent1"/>
-    </dgm:fillClrLst>
-    <dgm:linClrLst meth="repeat">
-      <a:schemeClr val="lt1"/>
-    </dgm:linClrLst>
-    <dgm:effectClrLst/>
-    <dgm:txLinClrLst/>
-    <dgm:txFillClrLst/>
-    <dgm:txEffectClrLst/>
-  </dgm:styleLbl>
-  <dgm:styleLbl name="node4">
-    <dgm:fillClrLst meth="repeat">
-      <a:schemeClr val="accent1"/>
-    </dgm:fillClrLst>
-    <dgm:linClrLst meth="repeat">
-      <a:schemeClr val="lt1"/>
-    </dgm:linClrLst>
-    <dgm:effectClrLst/>
-    <dgm:txLinClrLst/>
-    <dgm:txFillClrLst/>
-    <dgm:txEffectClrLst/>
-  </dgm:styleLbl>
-  <dgm:styleLbl name="fgImgPlace1">
-    <dgm:fillClrLst meth="repeat">
-      <a:schemeClr val="accent1">
-        <a:tint val="50000"/>
-      </a:schemeClr>
-    </dgm:fillClrLst>
-    <dgm:linClrLst meth="repeat">
-      <a:schemeClr val="lt1"/>
-    </dgm:linClrLst>
-    <dgm:effectClrLst/>
-    <dgm:txLinClrLst/>
-    <dgm:txFillClrLst meth="repeat">
-      <a:schemeClr val="lt1"/>
-    </dgm:txFillClrLst>
-    <dgm:txEffectClrLst/>
-  </dgm:styleLbl>
-  <dgm:styleLbl name="alignImgPlace1">
-    <dgm:fillClrLst meth="repeat">
-      <a:schemeClr val="accent1">
-        <a:tint val="50000"/>
-      </a:schemeClr>
-    </dgm:fillClrLst>
-    <dgm:linClrLst meth="repeat">
-      <a:schemeClr val="lt1"/>
-    </dgm:linClrLst>
-    <dgm:effectClrLst/>
-    <dgm:txLinClrLst/>
-    <dgm:txFillClrLst meth="repeat">
-      <a:schemeClr val="lt1"/>
-    </dgm:txFillClrLst>
-    <dgm:txEffectClrLst/>
-  </dgm:styleLbl>
-  <dgm:styleLbl name="bgImgPlace1">
-    <dgm:fillClrLst meth="repeat">
-      <a:schemeClr val="accent1">
-        <a:tint val="50000"/>
-      </a:schemeClr>
-    </dgm:fillClrLst>
-    <dgm:linClrLst meth="repeat">
-      <a:schemeClr val="lt1"/>
-    </dgm:linClrLst>
-    <dgm:effectClrLst/>
-    <dgm:txLinClrLst/>
-    <dgm:txFillClrLst meth="repeat">
-      <a:schemeClr val="lt1"/>
-    </dgm:txFillClrLst>
-    <dgm:txEffectClrLst/>
-  </dgm:styleLbl>
-  <dgm:styleLbl name="sibTrans2D1">
-    <dgm:fillClrLst meth="repeat">
-      <a:schemeClr val="accent1">
-        <a:tint val="60000"/>
-      </a:schemeClr>
-    </dgm:fillClrLst>
-    <dgm:linClrLst meth="repeat">
-      <a:schemeClr val="accent1">
-        <a:tint val="60000"/>
-      </a:schemeClr>
-    </dgm:linClrLst>
-    <dgm:effectClrLst/>
-    <dgm:txLinClrLst/>
-    <dgm:txFillClrLst/>
-    <dgm:txEffectClrLst/>
-  </dgm:styleLbl>
-  <dgm:styleLbl name="fgSibTrans2D1">
-    <dgm:fillClrLst meth="repeat">
-      <a:schemeClr val="accent1">
-        <a:tint val="60000"/>
-      </a:schemeClr>
-    </dgm:fillClrLst>
-    <dgm:linClrLst meth="repeat">
-      <a:schemeClr val="accent1">
-        <a:tint val="60000"/>
-      </a:schemeClr>
-    </dgm:linClrLst>
-    <dgm:effectClrLst/>
-    <dgm:txLinClrLst/>
-    <dgm:txFillClrLst/>
-    <dgm:txEffectClrLst/>
-  </dgm:styleLbl>
-  <dgm:styleLbl name="bgSibTrans2D1">
-    <dgm:fillClrLst meth="repeat">
-      <a:schemeClr val="accent1">
-        <a:tint val="60000"/>
-      </a:schemeClr>
-    </dgm:fillClrLst>
-    <dgm:linClrLst meth="repeat">
-      <a:schemeClr val="accent1">
-        <a:tint val="60000"/>
-      </a:schemeClr>
-    </dgm:linClrLst>
-    <dgm:effectClrLst/>
-    <dgm:txLinClrLst/>
-    <dgm:txFillClrLst/>
-    <dgm:txEffectClrLst/>
-  </dgm:styleLbl>
-  <dgm:styleLbl name="sibTrans1D1">
-    <dgm:fillClrLst meth="repeat">
-      <a:schemeClr val="accent1"/>
-    </dgm:fillClrLst>
-    <dgm:linClrLst meth="repeat">
-      <a:schemeClr val="accent1"/>
-    </dgm:linClrLst>
-    <dgm:effectClrLst/>
-    <dgm:txLinClrLst/>
-    <dgm:txFillClrLst meth="repeat">
-      <a:schemeClr val="tx1"/>
-    </dgm:txFillClrLst>
-    <dgm:txEffectClrLst/>
-  </dgm:styleLbl>
-  <dgm:styleLbl name="callout">
-    <dgm:fillClrLst meth="repeat">
-      <a:schemeClr val="accent1"/>
-    </dgm:fillClrLst>
-    <dgm:linClrLst meth="repeat">
-      <a:schemeClr val="accent1">
-        <a:tint val="50000"/>
-      </a:schemeClr>
-    </dgm:linClrLst>
-    <dgm:effectClrLst/>
-    <dgm:txLinClrLst/>
-    <dgm:txFillClrLst meth="repeat">
-      <a:schemeClr val="tx1"/>
-    </dgm:txFillClrLst>
-    <dgm:txEffectClrLst/>
-  </dgm:styleLbl>
-  <dgm:styleLbl name="asst0">
-    <dgm:fillClrLst meth="repeat">
-      <a:schemeClr val="accent1"/>
-    </dgm:fillClrLst>
-    <dgm:linClrLst meth="repeat">
-      <a:schemeClr val="lt1"/>
-    </dgm:linClrLst>
-    <dgm:effectClrLst/>
-    <dgm:txLinClrLst/>
-    <dgm:txFillClrLst/>
-    <dgm:txEffectClrLst/>
-  </dgm:styleLbl>
-  <dgm:styleLbl name="asst1">
-    <dgm:fillClrLst meth="repeat">
-      <a:schemeClr val="accent1"/>
-    </dgm:fillClrLst>
-    <dgm:linClrLst meth="repeat">
-      <a:schemeClr val="lt1"/>
-    </dgm:linClrLst>
-    <dgm:effectClrLst/>
-    <dgm:txLinClrLst/>
-    <dgm:txFillClrLst/>
-    <dgm:txEffectClrLst/>
-  </dgm:styleLbl>
-  <dgm:styleLbl name="asst2">
-    <dgm:fillClrLst meth="repeat">
-      <a:schemeClr val="accent1"/>
-    </dgm:fillClrLst>
-    <dgm:linClrLst meth="repeat">
-      <a:schemeClr val="lt1"/>
-    </dgm:linClrLst>
-    <dgm:effectClrLst/>
-    <dgm:txLinClrLst/>
-    <dgm:txFillClrLst/>
-    <dgm:txEffectClrLst/>
-  </dgm:styleLbl>
-  <dgm:styleLbl name="asst3">
-    <dgm:fillClrLst meth="repeat">
-      <a:schemeClr val="accent1"/>
-    </dgm:fillClrLst>
-    <dgm:linClrLst meth="repeat">
-      <a:schemeClr val="lt1"/>
-    </dgm:linClrLst>
-    <dgm:effectClrLst/>
-    <dgm:txLinClrLst/>
-    <dgm:txFillClrLst/>
-    <dgm:txEffectClrLst/>
-  </dgm:styleLbl>
-  <dgm:styleLbl name="asst4">
-    <dgm:fillClrLst meth="repeat">
-      <a:schemeClr val="accent1"/>
-    </dgm:fillClrLst>
-    <dgm:linClrLst meth="repeat">
-      <a:schemeClr val="lt1"/>
-    </dgm:linClrLst>
-    <dgm:effectClrLst/>
-    <dgm:txLinClrLst/>
-    <dgm:txFillClrLst/>
-    <dgm:txEffectClrLst/>
-  </dgm:styleLbl>
-  <dgm:styleLbl name="parChTrans2D1">
-    <dgm:fillClrLst meth="repeat">
-      <a:schemeClr val="accent1">
-        <a:tint val="60000"/>
-      </a:schemeClr>
-    </dgm:fillClrLst>
-    <dgm:linClrLst meth="repeat">
-      <a:schemeClr val="accent1">
-        <a:tint val="60000"/>
-      </a:schemeClr>
-    </dgm:linClrLst>
-    <dgm:effectClrLst/>
-    <dgm:txLinClrLst/>
-    <dgm:txFillClrLst meth="repeat">
-      <a:schemeClr val="lt1"/>
-    </dgm:txFillClrLst>
-    <dgm:txEffectClrLst/>
-  </dgm:styleLbl>
-  <dgm:styleLbl name="parChTrans2D2">
-    <dgm:fillClrLst meth="repeat">
-      <a:schemeClr val="accent1"/>
-    </dgm:fillClrLst>
-    <dgm:linClrLst meth="repeat">
-      <a:schemeClr val="accent1"/>
-    </dgm:linClrLst>
-    <dgm:effectClrLst/>
-    <dgm:txLinClrLst/>
-    <dgm:txFillClrLst meth="repeat">
-      <a:schemeClr val="lt1"/>
-    </dgm:txFillClrLst>
-    <dgm:txEffectClrLst/>
-  </dgm:styleLbl>
-  <dgm:styleLbl name="parChTrans2D3">
-    <dgm:fillClrLst meth="repeat">
-      <a:schemeClr val="accent1"/>
-    </dgm:fillClrLst>
-    <dgm:linClrLst meth="repeat">
-      <a:schemeClr val="accent1"/>
-    </dgm:linClrLst>
-    <dgm:effectClrLst/>
-    <dgm:txLinClrLst/>
-    <dgm:txFillClrLst meth="repeat">
-      <a:schemeClr val="lt1"/>
-    </dgm:txFillClrLst>
-    <dgm:txEffectClrLst/>
-  </dgm:styleLbl>
-  <dgm:styleLbl name="parChTrans2D4">
-    <dgm:fillClrLst meth="repeat">
-      <a:schemeClr val="accent1"/>
-    </dgm:fillClrLst>
-    <dgm:linClrLst meth="repeat">
-      <a:schemeClr val="accent1"/>
-    </dgm:linClrLst>
-    <dgm:effectClrLst/>
-    <dgm:txLinClrLst/>
-    <dgm:txFillClrLst meth="repeat">
-      <a:schemeClr val="lt1"/>
-    </dgm:txFillClrLst>
-    <dgm:txEffectClrLst/>
-  </dgm:styleLbl>
-  <dgm:styleLbl name="parChTrans1D1">
-    <dgm:fillClrLst meth="repeat">
-      <a:schemeClr val="accent1"/>
-    </dgm:fillClrLst>
-    <dgm:linClrLst meth="repeat">
-      <a:schemeClr val="accent1">
-        <a:shade val="60000"/>
-      </a:schemeClr>
-    </dgm:linClrLst>
-    <dgm:effectClrLst/>
-    <dgm:txLinClrLst/>
-    <dgm:txFillClrLst meth="repeat">
-      <a:schemeClr val="tx1"/>
-    </dgm:txFillClrLst>
-    <dgm:txEffectClrLst/>
-  </dgm:styleLbl>
-  <dgm:styleLbl name="parChTrans1D2">
-    <dgm:fillClrLst meth="repeat">
-      <a:schemeClr val="accent1"/>
-    </dgm:fillClrLst>
-    <dgm:linClrLst meth="repeat">
-      <a:schemeClr val="accent1">
-        <a:shade val="60000"/>
-      </a:schemeClr>
-    </dgm:linClrLst>
-    <dgm:effectClrLst/>
-    <dgm:txLinClrLst/>
-    <dgm:txFillClrLst meth="repeat">
-      <a:schemeClr val="tx1"/>
-    </dgm:txFillClrLst>
-    <dgm:txEffectClrLst/>
-  </dgm:styleLbl>
-  <dgm:styleLbl name="parChTrans1D3">
-    <dgm:fillClrLst meth="repeat">
-      <a:schemeClr val="accent1"/>
-    </dgm:fillClrLst>
-    <dgm:linClrLst meth="repeat">
-      <a:schemeClr val="accent1">
-        <a:shade val="80000"/>
-      </a:schemeClr>
-    </dgm:linClrLst>
-    <dgm:effectClrLst/>
-    <dgm:txLinClrLst/>
-    <dgm:txFillClrLst meth="repeat">
-      <a:schemeClr val="tx1"/>
-    </dgm:txFillClrLst>
-    <dgm:txEffectClrLst/>
-  </dgm:styleLbl>
-  <dgm:styleLbl name="parChTrans1D4">
-    <dgm:fillClrLst meth="repeat">
-      <a:schemeClr val="accent1"/>
-    </dgm:fillClrLst>
-    <dgm:linClrLst meth="repeat">
-      <a:schemeClr val="accent1">
-        <a:shade val="80000"/>
-      </a:schemeClr>
-    </dgm:linClrLst>
-    <dgm:effectClrLst/>
-    <dgm:txLinClrLst/>
-    <dgm:txFillClrLst meth="repeat">
-      <a:schemeClr val="tx1"/>
-    </dgm:txFillClrLst>
-    <dgm:txEffectClrLst/>
-  </dgm:styleLbl>
-  <dgm:styleLbl name="fgAcc1">
-    <dgm:fillClrLst meth="repeat">
-      <a:schemeClr val="lt1">
-        <a:alpha val="90000"/>
-      </a:schemeClr>
-    </dgm:fillClrLst>
-    <dgm:linClrLst meth="repeat">
-      <a:schemeClr val="accent1"/>
-    </dgm:linClrLst>
-    <dgm:effectClrLst/>
-    <dgm:txLinClrLst/>
-    <dgm:txFillClrLst meth="repeat">
-      <a:schemeClr val="dk1"/>
-    </dgm:txFillClrLst>
-    <dgm:txEffectClrLst/>
-  </dgm:styleLbl>
-  <dgm:styleLbl name="conFgAcc1">
-    <dgm:fillClrLst meth="repeat">
-      <a:schemeClr val="lt1">
-        <a:alpha val="90000"/>
-      </a:schemeClr>
-    </dgm:fillClrLst>
-    <dgm:linClrLst meth="repeat">
-      <a:schemeClr val="accent1"/>
-    </dgm:linClrLst>
-    <dgm:effectClrLst/>
-    <dgm:txLinClrLst/>
-    <dgm:txFillClrLst meth="repeat">
-      <a:schemeClr val="dk1"/>
-    </dgm:txFillClrLst>
-    <dgm:txEffectClrLst/>
-  </dgm:styleLbl>
-  <dgm:styleLbl name="alignAcc1">
-    <dgm:fillClrLst meth="repeat">
-      <a:schemeClr val="lt1">
-        <a:alpha val="90000"/>
-      </a:schemeClr>
-    </dgm:fillClrLst>
-    <dgm:linClrLst meth="repeat">
-      <a:schemeClr val="accent1"/>
-    </dgm:linClrLst>
-    <dgm:effectClrLst/>
-    <dgm:txLinClrLst/>
-    <dgm:txFillClrLst meth="repeat">
-      <a:schemeClr val="dk1"/>
-    </dgm:txFillClrLst>
-    <dgm:txEffectClrLst/>
-  </dgm:styleLbl>
-  <dgm:styleLbl name="trAlignAcc1">
-    <dgm:fillClrLst meth="repeat">
-      <a:schemeClr val="lt1">
-        <a:alpha val="40000"/>
-      </a:schemeClr>
-    </dgm:fillClrLst>
-    <dgm:linClrLst meth="repeat">
-      <a:schemeClr val="accent1"/>
-    </dgm:linClrLst>
-    <dgm:effectClrLst/>
-    <dgm:txLinClrLst/>
-    <dgm:txFillClrLst meth="repeat">
-      <a:schemeClr val="dk1"/>
-    </dgm:txFillClrLst>
-    <dgm:txEffectClrLst/>
-  </dgm:styleLbl>
-  <dgm:styleLbl name="bgAcc1">
-    <dgm:fillClrLst meth="repeat">
-      <a:schemeClr val="lt1">
-        <a:alpha val="90000"/>
-      </a:schemeClr>
-    </dgm:fillClrLst>
-    <dgm:linClrLst meth="repeat">
-      <a:schemeClr val="accent1"/>
-    </dgm:linClrLst>
-    <dgm:effectClrLst/>
-    <dgm:txLinClrLst/>
-    <dgm:txFillClrLst meth="repeat">
-      <a:schemeClr val="dk1"/>
-    </dgm:txFillClrLst>
-    <dgm:txEffectClrLst/>
-  </dgm:styleLbl>
-  <dgm:styleLbl name="solidFgAcc1">
-    <dgm:fillClrLst meth="repeat">
-      <a:schemeClr val="lt1"/>
-    </dgm:fillClrLst>
-    <dgm:linClrLst meth="repeat">
-      <a:schemeClr val="accent1"/>
-    </dgm:linClrLst>
-    <dgm:effectClrLst/>
-    <dgm:txLinClrLst/>
-    <dgm:txFillClrLst meth="repeat">
-      <a:schemeClr val="dk1"/>
-    </dgm:txFillClrLst>
-    <dgm:txEffectClrLst/>
-  </dgm:styleLbl>
-  <dgm:styleLbl name="solidAlignAcc1">
-    <dgm:fillClrLst meth="repeat">
-      <a:schemeClr val="lt1"/>
-    </dgm:fillClrLst>
-    <dgm:linClrLst meth="repeat">
-      <a:schemeClr val="accent1"/>
-    </dgm:linClrLst>
-    <dgm:effectClrLst/>
-    <dgm:txLinClrLst/>
-    <dgm:txFillClrLst meth="repeat">
-      <a:schemeClr val="dk1"/>
-    </dgm:txFillClrLst>
-    <dgm:txEffectClrLst/>
-  </dgm:styleLbl>
-  <dgm:styleLbl name="solidBgAcc1">
-    <dgm:fillClrLst meth="repeat">
-      <a:schemeClr val="lt1"/>
-    </dgm:fillClrLst>
-    <dgm:linClrLst meth="repeat">
-      <a:schemeClr val="accent1"/>
-    </dgm:linClrLst>
-    <dgm:effectClrLst/>
-    <dgm:txLinClrLst/>
-    <dgm:txFillClrLst meth="repeat">
-      <a:schemeClr val="dk1"/>
-    </dgm:txFillClrLst>
-    <dgm:txEffectClrLst/>
-  </dgm:styleLbl>
-  <dgm:styleLbl name="fgAccFollowNode1">
-    <dgm:fillClrLst meth="repeat">
-      <a:schemeClr val="accent1">
-        <a:alpha val="90000"/>
-        <a:tint val="40000"/>
-      </a:schemeClr>
-    </dgm:fillClrLst>
-    <dgm:linClrLst meth="repeat">
-      <a:schemeClr val="accent1">
-        <a:alpha val="90000"/>
-        <a:tint val="40000"/>
-      </a:schemeClr>
-    </dgm:linClrLst>
-    <dgm:effectClrLst/>
-    <dgm:txLinClrLst/>
-    <dgm:txFillClrLst meth="repeat">
-      <a:schemeClr val="dk1"/>
-    </dgm:txFillClrLst>
-    <dgm:txEffectClrLst/>
-  </dgm:styleLbl>
-  <dgm:styleLbl name="alignAccFollowNode1">
-    <dgm:fillClrLst meth="repeat">
-      <a:schemeClr val="accent1">
-        <a:alpha val="90000"/>
-        <a:tint val="40000"/>
-      </a:schemeClr>
-    </dgm:fillClrLst>
-    <dgm:linClrLst meth="repeat">
-      <a:schemeClr val="accent1">
-        <a:alpha val="90000"/>
-        <a:tint val="40000"/>
-      </a:schemeClr>
-    </dgm:linClrLst>
-    <dgm:effectClrLst/>
-    <dgm:txLinClrLst/>
-    <dgm:txFillClrLst meth="repeat">
-      <a:schemeClr val="dk1"/>
-    </dgm:txFillClrLst>
-    <dgm:txEffectClrLst/>
-  </dgm:styleLbl>
-  <dgm:styleLbl name="bgAccFollowNode1">
-    <dgm:fillClrLst meth="repeat">
-      <a:schemeClr val="accent1">
-        <a:alpha val="90000"/>
-        <a:tint val="40000"/>
-      </a:schemeClr>
-    </dgm:fillClrLst>
-    <dgm:linClrLst meth="repeat">
-      <a:schemeClr val="accent1">
-        <a:alpha val="90000"/>
-        <a:tint val="40000"/>
-      </a:schemeClr>
-    </dgm:linClrLst>
-    <dgm:effectClrLst/>
-    <dgm:txLinClrLst/>
-    <dgm:txFillClrLst meth="repeat">
-      <a:schemeClr val="dk1"/>
-    </dgm:txFillClrLst>
-    <dgm:txEffectClrLst/>
-  </dgm:styleLbl>
-  <dgm:styleLbl name="fgAcc0">
-    <dgm:fillClrLst meth="repeat">
-      <a:schemeClr val="lt1">
-        <a:alpha val="90000"/>
-      </a:schemeClr>
-    </dgm:fillClrLst>
-    <dgm:linClrLst meth="repeat">
-      <a:schemeClr val="accent1"/>
-    </dgm:linClrLst>
-    <dgm:effectClrLst/>
-    <dgm:txLinClrLst/>
-    <dgm:txFillClrLst meth="repeat">
-      <a:schemeClr val="dk1"/>
-    </dgm:txFillClrLst>
-    <dgm:txEffectClrLst/>
-  </dgm:styleLbl>
-  <dgm:styleLbl name="fgAcc2">
-    <dgm:fillClrLst meth="repeat">
-      <a:schemeClr val="lt1">
-        <a:alpha val="90000"/>
-      </a:schemeClr>
-    </dgm:fillClrLst>
-    <dgm:linClrLst meth="repeat">
-      <a:schemeClr val="accent1"/>
-    </dgm:linClrLst>
-    <dgm:effectClrLst/>
-    <dgm:txLinClrLst/>
-    <dgm:txFillClrLst meth="repeat">
-      <a:schemeClr val="dk1"/>
-    </dgm:txFillClrLst>
-    <dgm:txEffectClrLst/>
-  </dgm:styleLbl>
-  <dgm:styleLbl name="fgAcc3">
-    <dgm:fillClrLst meth="repeat">
-      <a:schemeClr val="lt1">
-        <a:alpha val="90000"/>
-      </a:schemeClr>
-    </dgm:fillClrLst>
-    <dgm:linClrLst meth="repeat">
-      <a:schemeClr val="accent1"/>
-    </dgm:linClrLst>
-    <dgm:effectClrLst/>
-    <dgm:txLinClrLst/>
-    <dgm:txFillClrLst meth="repeat">
-      <a:schemeClr val="dk1"/>
-    </dgm:txFillClrLst>
-    <dgm:txEffectClrLst/>
-  </dgm:styleLbl>
-  <dgm:styleLbl name="fgAcc4">
-    <dgm:fillClrLst meth="repeat">
-      <a:schemeClr val="lt1">
-        <a:alpha val="90000"/>
-      </a:schemeClr>
-    </dgm:fillClrLst>
-    <dgm:linClrLst meth="repeat">
-      <a:schemeClr val="accent1"/>
-    </dgm:linClrLst>
-    <dgm:effectClrLst/>
-    <dgm:txLinClrLst/>
-    <dgm:txFillClrLst meth="repeat">
-      <a:schemeClr val="dk1"/>
-    </dgm:txFillClrLst>
-    <dgm:txEffectClrLst/>
-  </dgm:styleLbl>
-  <dgm:styleLbl name="bgShp">
-    <dgm:fillClrLst meth="repeat">
-      <a:schemeClr val="accent1">
-        <a:tint val="40000"/>
-      </a:schemeClr>
-    </dgm:fillClrLst>
-    <dgm:linClrLst meth="repeat">
-      <a:schemeClr val="accent1"/>
-    </dgm:linClrLst>
-    <dgm:effectClrLst/>
-    <dgm:txLinClrLst/>
-    <dgm:txFillClrLst meth="repeat">
-      <a:schemeClr val="dk1"/>
-    </dgm:txFillClrLst>
-    <dgm:txEffectClrLst/>
-  </dgm:styleLbl>
-  <dgm:styleLbl name="dkBgShp">
-    <dgm:fillClrLst meth="repeat">
-      <a:schemeClr val="accent1">
-        <a:shade val="80000"/>
-      </a:schemeClr>
-    </dgm:fillClrLst>
-    <dgm:linClrLst meth="repeat">
-      <a:schemeClr val="accent1"/>
-    </dgm:linClrLst>
-    <dgm:effectClrLst/>
-    <dgm:txLinClrLst/>
-    <dgm:txFillClrLst meth="repeat">
-      <a:schemeClr val="lt1"/>
-    </dgm:txFillClrLst>
-    <dgm:txEffectClrLst/>
-  </dgm:styleLbl>
-  <dgm:styleLbl name="trBgShp">
-    <dgm:fillClrLst meth="repeat">
-      <a:schemeClr val="accent1">
-        <a:tint val="50000"/>
-        <a:alpha val="40000"/>
-      </a:schemeClr>
-    </dgm:fillClrLst>
-    <dgm:linClrLst meth="repeat">
-      <a:schemeClr val="accent1"/>
-    </dgm:linClrLst>
-    <dgm:effectClrLst/>
-    <dgm:txLinClrLst/>
-    <dgm:txFillClrLst meth="repeat">
-      <a:schemeClr val="lt1"/>
-    </dgm:txFillClrLst>
-    <dgm:txEffectClrLst/>
-  </dgm:styleLbl>
-  <dgm:styleLbl name="fgShp">
-    <dgm:fillClrLst meth="repeat">
-      <a:schemeClr val="accent1">
-        <a:tint val="60000"/>
-      </a:schemeClr>
-    </dgm:fillClrLst>
-    <dgm:linClrLst meth="repeat">
-      <a:schemeClr val="lt1"/>
-    </dgm:linClrLst>
-    <dgm:effectClrLst/>
-    <dgm:txLinClrLst/>
-    <dgm:txFillClrLst meth="repeat">
-      <a:schemeClr val="dk1"/>
-    </dgm:txFillClrLst>
-    <dgm:txEffectClrLst/>
-  </dgm:styleLbl>
-  <dgm:styleLbl name="revTx">
-    <dgm:fillClrLst meth="repeat">
-      <a:schemeClr val="lt1">
-        <a:alpha val="0"/>
-      </a:schemeClr>
-    </dgm:fillClrLst>
-    <dgm:linClrLst meth="repeat">
-      <a:schemeClr val="dk1">
-        <a:alpha val="0"/>
-      </a:schemeClr>
-    </dgm:linClrLst>
-    <dgm:effectClrLst/>
-    <dgm:txLinClrLst/>
-    <dgm:txFillClrLst meth="repeat">
-      <a:schemeClr val="tx1"/>
-    </dgm:txFillClrLst>
-    <dgm:txEffectClrLst/>
-  </dgm:styleLbl>
-</dgm:colorsDef>
+<file path=ppt/charts/chart3.xml><?xml version="1.0" encoding="utf-8"?>
+<c:chartSpace xmlns:c="http://schemas.openxmlformats.org/drawingml/2006/chart" xmlns:a="http://schemas.openxmlformats.org/drawingml/2006/main" xmlns:r="http://schemas.openxmlformats.org/officeDocument/2006/relationships">
+  <c:date1904 val="0"/>
+  <c:lang val="de-DE"/>
+  <c:roundedCorners val="0"/>
+  <mc:AlternateContent xmlns:mc="http://schemas.openxmlformats.org/markup-compatibility/2006">
+    <mc:Choice xmlns:c14="http://schemas.microsoft.com/office/drawing/2007/8/2/chart" Requires="c14">
+      <c14:style val="126"/>
+    </mc:Choice>
+    <mc:Fallback>
+      <c:style val="26"/>
+    </mc:Fallback>
+  </mc:AlternateContent>
+  <c:chart>
+    <c:title>
+      <c:tx>
+        <c:rich>
+          <a:bodyPr/>
+          <a:lstStyle/>
+          <a:p>
+            <a:pPr>
+              <a:defRPr/>
+            </a:pPr>
+            <a:r>
+              <a:rPr lang="de-DE" dirty="0" smtClean="0"/>
+              <a:t>Story Points pro Stunde</a:t>
+            </a:r>
+          </a:p>
+        </c:rich>
+      </c:tx>
+      <c:layout/>
+      <c:overlay val="0"/>
+    </c:title>
+    <c:autoTitleDeleted val="0"/>
+    <c:plotArea>
+      <c:layout>
+        <c:manualLayout>
+          <c:layoutTarget val="inner"/>
+          <c:xMode val="edge"/>
+          <c:yMode val="edge"/>
+          <c:x val="7.0277751705749167E-2"/>
+          <c:y val="0.13998618209087879"/>
+          <c:w val="0.68980613744066754"/>
+          <c:h val="0.75980034336462621"/>
+        </c:manualLayout>
+      </c:layout>
+      <c:lineChart>
+        <c:grouping val="standard"/>
+        <c:varyColors val="0"/>
+        <c:ser>
+          <c:idx val="0"/>
+          <c:order val="0"/>
+          <c:tx>
+            <c:strRef>
+              <c:f>Tabelle1!$E$1</c:f>
+              <c:strCache>
+                <c:ptCount val="1"/>
+                <c:pt idx="0">
+                  <c:v>Story Points pro Stunden</c:v>
+                </c:pt>
+              </c:strCache>
+            </c:strRef>
+          </c:tx>
+          <c:spPr>
+            <a:ln>
+              <a:solidFill>
+                <a:srgbClr val="00B050"/>
+              </a:solidFill>
+            </a:ln>
+          </c:spPr>
+          <c:marker>
+            <c:symbol val="none"/>
+          </c:marker>
+          <c:val>
+            <c:numRef>
+              <c:f>Tabelle1!$E$2:$E$11</c:f>
+              <c:numCache>
+                <c:formatCode>0.00</c:formatCode>
+                <c:ptCount val="10"/>
+                <c:pt idx="0">
+                  <c:v>41.25</c:v>
+                </c:pt>
+                <c:pt idx="1">
+                  <c:v>41.53846153846154</c:v>
+                </c:pt>
+                <c:pt idx="2">
+                  <c:v>33.333333333333336</c:v>
+                </c:pt>
+                <c:pt idx="3">
+                  <c:v>20</c:v>
+                </c:pt>
+                <c:pt idx="4">
+                  <c:v>10</c:v>
+                </c:pt>
+                <c:pt idx="5">
+                  <c:v>6</c:v>
+                </c:pt>
+                <c:pt idx="6">
+                  <c:v>12</c:v>
+                </c:pt>
+                <c:pt idx="7">
+                  <c:v>15</c:v>
+                </c:pt>
+                <c:pt idx="8">
+                  <c:v>20</c:v>
+                </c:pt>
+                <c:pt idx="9">
+                  <c:v>35</c:v>
+                </c:pt>
+              </c:numCache>
+            </c:numRef>
+          </c:val>
+          <c:smooth val="0"/>
+        </c:ser>
+        <c:ser>
+          <c:idx val="1"/>
+          <c:order val="1"/>
+          <c:tx>
+            <c:strRef>
+              <c:f>Tabelle1!$C$1</c:f>
+              <c:strCache>
+                <c:ptCount val="1"/>
+                <c:pt idx="0">
+                  <c:v>Story Points</c:v>
+                </c:pt>
+              </c:strCache>
+            </c:strRef>
+          </c:tx>
+          <c:spPr>
+            <a:ln>
+              <a:solidFill>
+                <a:srgbClr val="FF0000"/>
+              </a:solidFill>
+            </a:ln>
+          </c:spPr>
+          <c:marker>
+            <c:symbol val="none"/>
+          </c:marker>
+          <c:val>
+            <c:numRef>
+              <c:f>Tabelle1!$C$2:$C$11</c:f>
+              <c:numCache>
+                <c:formatCode>General</c:formatCode>
+                <c:ptCount val="10"/>
+                <c:pt idx="0">
+                  <c:v>110</c:v>
+                </c:pt>
+                <c:pt idx="1">
+                  <c:v>90</c:v>
+                </c:pt>
+                <c:pt idx="2">
+                  <c:v>50</c:v>
+                </c:pt>
+                <c:pt idx="3">
+                  <c:v>40</c:v>
+                </c:pt>
+                <c:pt idx="4">
+                  <c:v>5</c:v>
+                </c:pt>
+                <c:pt idx="5">
+                  <c:v>1</c:v>
+                </c:pt>
+                <c:pt idx="6">
+                  <c:v>4</c:v>
+                </c:pt>
+                <c:pt idx="7">
+                  <c:v>30</c:v>
+                </c:pt>
+                <c:pt idx="8">
+                  <c:v>20</c:v>
+                </c:pt>
+                <c:pt idx="9">
+                  <c:v>70</c:v>
+                </c:pt>
+              </c:numCache>
+            </c:numRef>
+          </c:val>
+          <c:smooth val="0"/>
+        </c:ser>
+        <c:dLbls>
+          <c:showLegendKey val="0"/>
+          <c:showVal val="0"/>
+          <c:showCatName val="0"/>
+          <c:showSerName val="0"/>
+          <c:showPercent val="0"/>
+          <c:showBubbleSize val="0"/>
+        </c:dLbls>
+        <c:marker val="1"/>
+        <c:smooth val="0"/>
+        <c:axId val="159738368"/>
+        <c:axId val="194453504"/>
+      </c:lineChart>
+      <c:catAx>
+        <c:axId val="159738368"/>
+        <c:scaling>
+          <c:orientation val="minMax"/>
+        </c:scaling>
+        <c:delete val="0"/>
+        <c:axPos val="b"/>
+        <c:majorGridlines/>
+        <c:majorTickMark val="out"/>
+        <c:minorTickMark val="none"/>
+        <c:tickLblPos val="nextTo"/>
+        <c:crossAx val="194453504"/>
+        <c:crosses val="autoZero"/>
+        <c:auto val="1"/>
+        <c:lblAlgn val="ctr"/>
+        <c:lblOffset val="100"/>
+        <c:noMultiLvlLbl val="0"/>
+      </c:catAx>
+      <c:valAx>
+        <c:axId val="194453504"/>
+        <c:scaling>
+          <c:orientation val="minMax"/>
+        </c:scaling>
+        <c:delete val="0"/>
+        <c:axPos val="l"/>
+        <c:majorGridlines/>
+        <c:numFmt formatCode="#,##0" sourceLinked="0"/>
+        <c:majorTickMark val="out"/>
+        <c:minorTickMark val="none"/>
+        <c:tickLblPos val="nextTo"/>
+        <c:crossAx val="159738368"/>
+        <c:crosses val="autoZero"/>
+        <c:crossBetween val="midCat"/>
+      </c:valAx>
+    </c:plotArea>
+    <c:legend>
+      <c:legendPos val="r"/>
+      <c:layout>
+        <c:manualLayout>
+          <c:xMode val="edge"/>
+          <c:yMode val="edge"/>
+          <c:x val="0.79190638300725202"/>
+          <c:y val="0.42449450061104321"/>
+          <c:w val="0.18224639312107083"/>
+          <c:h val="0.27226488723475167"/>
+        </c:manualLayout>
+      </c:layout>
+      <c:overlay val="0"/>
+    </c:legend>
+    <c:plotVisOnly val="1"/>
+    <c:dispBlanksAs val="gap"/>
+    <c:showDLblsOverMax val="0"/>
+  </c:chart>
+  <c:txPr>
+    <a:bodyPr/>
+    <a:lstStyle/>
+    <a:p>
+      <a:pPr>
+        <a:defRPr sz="1800"/>
+      </a:pPr>
+      <a:endParaRPr lang="de-DE"/>
+    </a:p>
+  </c:txPr>
+  <c:externalData r:id="rId1">
+    <c:autoUpdate val="0"/>
+  </c:externalData>
+</c:chartSpace>
 </file>
 
-<file path=ppt/diagrams/colors2.xml><?xml version="1.0" encoding="utf-8"?>
+<file path=ppt/diagrams/colors1.xml><?xml version="1.0" encoding="utf-8"?>
 <dgm:colorsDef xmlns:dgm="http://schemas.openxmlformats.org/drawingml/2006/diagram" xmlns:a="http://schemas.openxmlformats.org/drawingml/2006/main" uniqueId="urn:microsoft.com/office/officeart/2005/8/colors/colorful4">
   <dgm:title val=""/>
   <dgm:desc val=""/>
@@ -2158,7 +1673,7 @@
 </dgm:colorsDef>
 </file>
 
-<file path=ppt/diagrams/colors3.xml><?xml version="1.0" encoding="utf-8"?>
+<file path=ppt/diagrams/colors2.xml><?xml version="1.0" encoding="utf-8"?>
 <dgm:colorsDef xmlns:dgm="http://schemas.openxmlformats.org/drawingml/2006/diagram" xmlns:a="http://schemas.openxmlformats.org/drawingml/2006/main" uniqueId="urn:microsoft.com/office/officeart/2005/8/colors/colorful4">
   <dgm:title val=""/>
   <dgm:desc val=""/>
@@ -2940,7 +2455,7 @@
 </dgm:colorsDef>
 </file>
 
-<file path=ppt/diagrams/colors4.xml><?xml version="1.0" encoding="utf-8"?>
+<file path=ppt/diagrams/colors3.xml><?xml version="1.0" encoding="utf-8"?>
 <dgm:colorsDef xmlns:dgm="http://schemas.openxmlformats.org/drawingml/2006/diagram" xmlns:a="http://schemas.openxmlformats.org/drawingml/2006/main" uniqueId="urn:microsoft.com/office/officeart/2005/8/colors/colorful4">
   <dgm:title val=""/>
   <dgm:desc val=""/>
@@ -3722,11 +3237,793 @@
 </dgm:colorsDef>
 </file>
 
+<file path=ppt/diagrams/colors4.xml><?xml version="1.0" encoding="utf-8"?>
+<dgm:colorsDef xmlns:dgm="http://schemas.openxmlformats.org/drawingml/2006/diagram" xmlns:a="http://schemas.openxmlformats.org/drawingml/2006/main" uniqueId="urn:microsoft.com/office/officeart/2005/8/colors/colorful4">
+  <dgm:title val=""/>
+  <dgm:desc val=""/>
+  <dgm:catLst>
+    <dgm:cat type="colorful" pri="10400"/>
+  </dgm:catLst>
+  <dgm:styleLbl name="node0">
+    <dgm:fillClrLst meth="repeat">
+      <a:schemeClr val="accent3"/>
+    </dgm:fillClrLst>
+    <dgm:linClrLst meth="repeat">
+      <a:schemeClr val="lt1"/>
+    </dgm:linClrLst>
+    <dgm:effectClrLst/>
+    <dgm:txLinClrLst/>
+    <dgm:txFillClrLst/>
+    <dgm:txEffectClrLst/>
+  </dgm:styleLbl>
+  <dgm:styleLbl name="node1">
+    <dgm:fillClrLst>
+      <a:schemeClr val="accent4"/>
+      <a:schemeClr val="accent5"/>
+    </dgm:fillClrLst>
+    <dgm:linClrLst meth="repeat">
+      <a:schemeClr val="lt1"/>
+    </dgm:linClrLst>
+    <dgm:effectClrLst/>
+    <dgm:txLinClrLst/>
+    <dgm:txFillClrLst/>
+    <dgm:txEffectClrLst/>
+  </dgm:styleLbl>
+  <dgm:styleLbl name="alignNode1">
+    <dgm:fillClrLst>
+      <a:schemeClr val="accent4"/>
+      <a:schemeClr val="accent5"/>
+    </dgm:fillClrLst>
+    <dgm:linClrLst>
+      <a:schemeClr val="accent4"/>
+      <a:schemeClr val="accent5"/>
+    </dgm:linClrLst>
+    <dgm:effectClrLst/>
+    <dgm:txLinClrLst/>
+    <dgm:txFillClrLst/>
+    <dgm:txEffectClrLst/>
+  </dgm:styleLbl>
+  <dgm:styleLbl name="lnNode1">
+    <dgm:fillClrLst>
+      <a:schemeClr val="accent4"/>
+      <a:schemeClr val="accent5"/>
+    </dgm:fillClrLst>
+    <dgm:linClrLst meth="repeat">
+      <a:schemeClr val="lt1"/>
+    </dgm:linClrLst>
+    <dgm:effectClrLst/>
+    <dgm:txLinClrLst/>
+    <dgm:txFillClrLst/>
+    <dgm:txEffectClrLst/>
+  </dgm:styleLbl>
+  <dgm:styleLbl name="vennNode1">
+    <dgm:fillClrLst>
+      <a:schemeClr val="accent4">
+        <a:alpha val="50000"/>
+      </a:schemeClr>
+      <a:schemeClr val="accent5">
+        <a:alpha val="50000"/>
+      </a:schemeClr>
+    </dgm:fillClrLst>
+    <dgm:linClrLst meth="repeat">
+      <a:schemeClr val="lt1"/>
+    </dgm:linClrLst>
+    <dgm:effectClrLst/>
+    <dgm:txLinClrLst/>
+    <dgm:txFillClrLst/>
+    <dgm:txEffectClrLst/>
+  </dgm:styleLbl>
+  <dgm:styleLbl name="node2">
+    <dgm:fillClrLst>
+      <a:schemeClr val="accent5"/>
+    </dgm:fillClrLst>
+    <dgm:linClrLst meth="repeat">
+      <a:schemeClr val="lt1"/>
+    </dgm:linClrLst>
+    <dgm:effectClrLst/>
+    <dgm:txLinClrLst/>
+    <dgm:txFillClrLst/>
+    <dgm:txEffectClrLst/>
+  </dgm:styleLbl>
+  <dgm:styleLbl name="node3">
+    <dgm:fillClrLst>
+      <a:schemeClr val="accent6"/>
+    </dgm:fillClrLst>
+    <dgm:linClrLst meth="repeat">
+      <a:schemeClr val="lt1"/>
+    </dgm:linClrLst>
+    <dgm:effectClrLst/>
+    <dgm:txLinClrLst/>
+    <dgm:txFillClrLst/>
+    <dgm:txEffectClrLst/>
+  </dgm:styleLbl>
+  <dgm:styleLbl name="node4">
+    <dgm:fillClrLst>
+      <a:schemeClr val="accent1"/>
+    </dgm:fillClrLst>
+    <dgm:linClrLst meth="repeat">
+      <a:schemeClr val="lt1"/>
+    </dgm:linClrLst>
+    <dgm:effectClrLst/>
+    <dgm:txLinClrLst/>
+    <dgm:txFillClrLst/>
+    <dgm:txEffectClrLst/>
+  </dgm:styleLbl>
+  <dgm:styleLbl name="fgImgPlace1">
+    <dgm:fillClrLst>
+      <a:schemeClr val="accent4">
+        <a:tint val="50000"/>
+      </a:schemeClr>
+      <a:schemeClr val="accent5">
+        <a:tint val="50000"/>
+      </a:schemeClr>
+    </dgm:fillClrLst>
+    <dgm:linClrLst meth="repeat">
+      <a:schemeClr val="lt1"/>
+    </dgm:linClrLst>
+    <dgm:effectClrLst/>
+    <dgm:txLinClrLst/>
+    <dgm:txFillClrLst meth="repeat">
+      <a:schemeClr val="lt1"/>
+    </dgm:txFillClrLst>
+    <dgm:txEffectClrLst/>
+  </dgm:styleLbl>
+  <dgm:styleLbl name="alignImgPlace1">
+    <dgm:fillClrLst>
+      <a:schemeClr val="accent4">
+        <a:tint val="50000"/>
+      </a:schemeClr>
+      <a:schemeClr val="accent5">
+        <a:tint val="20000"/>
+      </a:schemeClr>
+    </dgm:fillClrLst>
+    <dgm:linClrLst meth="repeat">
+      <a:schemeClr val="lt1"/>
+    </dgm:linClrLst>
+    <dgm:effectClrLst/>
+    <dgm:txLinClrLst/>
+    <dgm:txFillClrLst meth="repeat">
+      <a:schemeClr val="lt1"/>
+    </dgm:txFillClrLst>
+    <dgm:txEffectClrLst/>
+  </dgm:styleLbl>
+  <dgm:styleLbl name="bgImgPlace1">
+    <dgm:fillClrLst>
+      <a:schemeClr val="accent4">
+        <a:tint val="50000"/>
+      </a:schemeClr>
+      <a:schemeClr val="accent5">
+        <a:tint val="20000"/>
+      </a:schemeClr>
+    </dgm:fillClrLst>
+    <dgm:linClrLst meth="repeat">
+      <a:schemeClr val="lt1"/>
+    </dgm:linClrLst>
+    <dgm:effectClrLst/>
+    <dgm:txLinClrLst/>
+    <dgm:txFillClrLst meth="repeat">
+      <a:schemeClr val="lt1"/>
+    </dgm:txFillClrLst>
+    <dgm:txEffectClrLst/>
+  </dgm:styleLbl>
+  <dgm:styleLbl name="sibTrans2D1">
+    <dgm:fillClrLst>
+      <a:schemeClr val="accent4"/>
+      <a:schemeClr val="accent5"/>
+    </dgm:fillClrLst>
+    <dgm:linClrLst meth="repeat">
+      <a:schemeClr val="lt1"/>
+    </dgm:linClrLst>
+    <dgm:effectClrLst/>
+    <dgm:txLinClrLst/>
+    <dgm:txFillClrLst/>
+    <dgm:txEffectClrLst/>
+  </dgm:styleLbl>
+  <dgm:styleLbl name="fgSibTrans2D1">
+    <dgm:fillClrLst>
+      <a:schemeClr val="accent4"/>
+      <a:schemeClr val="accent5"/>
+    </dgm:fillClrLst>
+    <dgm:linClrLst meth="repeat">
+      <a:schemeClr val="lt1"/>
+    </dgm:linClrLst>
+    <dgm:effectClrLst/>
+    <dgm:txLinClrLst/>
+    <dgm:txFillClrLst meth="repeat">
+      <a:schemeClr val="lt1"/>
+    </dgm:txFillClrLst>
+    <dgm:txEffectClrLst/>
+  </dgm:styleLbl>
+  <dgm:styleLbl name="bgSibTrans2D1">
+    <dgm:fillClrLst>
+      <a:schemeClr val="accent4"/>
+      <a:schemeClr val="accent5"/>
+    </dgm:fillClrLst>
+    <dgm:linClrLst meth="repeat">
+      <a:schemeClr val="lt1"/>
+    </dgm:linClrLst>
+    <dgm:effectClrLst/>
+    <dgm:txLinClrLst/>
+    <dgm:txFillClrLst meth="repeat">
+      <a:schemeClr val="lt1"/>
+    </dgm:txFillClrLst>
+    <dgm:txEffectClrLst/>
+  </dgm:styleLbl>
+  <dgm:styleLbl name="sibTrans1D1">
+    <dgm:fillClrLst/>
+    <dgm:linClrLst>
+      <a:schemeClr val="accent4"/>
+      <a:schemeClr val="accent5"/>
+    </dgm:linClrLst>
+    <dgm:effectClrLst/>
+    <dgm:txLinClrLst/>
+    <dgm:txFillClrLst meth="repeat">
+      <a:schemeClr val="tx1"/>
+    </dgm:txFillClrLst>
+    <dgm:txEffectClrLst/>
+  </dgm:styleLbl>
+  <dgm:styleLbl name="callout">
+    <dgm:fillClrLst meth="repeat">
+      <a:schemeClr val="accent4"/>
+    </dgm:fillClrLst>
+    <dgm:linClrLst meth="repeat">
+      <a:schemeClr val="accent4">
+        <a:tint val="50000"/>
+      </a:schemeClr>
+    </dgm:linClrLst>
+    <dgm:effectClrLst/>
+    <dgm:txLinClrLst/>
+    <dgm:txFillClrLst meth="repeat">
+      <a:schemeClr val="tx1"/>
+    </dgm:txFillClrLst>
+    <dgm:txEffectClrLst/>
+  </dgm:styleLbl>
+  <dgm:styleLbl name="asst0">
+    <dgm:fillClrLst meth="repeat">
+      <a:schemeClr val="accent4"/>
+    </dgm:fillClrLst>
+    <dgm:linClrLst meth="repeat">
+      <a:schemeClr val="lt1">
+        <a:shade val="80000"/>
+      </a:schemeClr>
+    </dgm:linClrLst>
+    <dgm:effectClrLst/>
+    <dgm:txLinClrLst/>
+    <dgm:txFillClrLst/>
+    <dgm:txEffectClrLst/>
+  </dgm:styleLbl>
+  <dgm:styleLbl name="asst1">
+    <dgm:fillClrLst meth="repeat">
+      <a:schemeClr val="accent5"/>
+    </dgm:fillClrLst>
+    <dgm:linClrLst meth="repeat">
+      <a:schemeClr val="lt1">
+        <a:shade val="80000"/>
+      </a:schemeClr>
+    </dgm:linClrLst>
+    <dgm:effectClrLst/>
+    <dgm:txLinClrLst/>
+    <dgm:txFillClrLst/>
+    <dgm:txEffectClrLst/>
+  </dgm:styleLbl>
+  <dgm:styleLbl name="asst2">
+    <dgm:fillClrLst>
+      <a:schemeClr val="accent6"/>
+    </dgm:fillClrLst>
+    <dgm:linClrLst meth="repeat">
+      <a:schemeClr val="lt1"/>
+    </dgm:linClrLst>
+    <dgm:effectClrLst/>
+    <dgm:txLinClrLst/>
+    <dgm:txFillClrLst/>
+    <dgm:txEffectClrLst/>
+  </dgm:styleLbl>
+  <dgm:styleLbl name="asst3">
+    <dgm:fillClrLst>
+      <a:schemeClr val="accent1"/>
+    </dgm:fillClrLst>
+    <dgm:linClrLst meth="repeat">
+      <a:schemeClr val="lt1"/>
+    </dgm:linClrLst>
+    <dgm:effectClrLst/>
+    <dgm:txLinClrLst/>
+    <dgm:txFillClrLst/>
+    <dgm:txEffectClrLst/>
+  </dgm:styleLbl>
+  <dgm:styleLbl name="asst4">
+    <dgm:fillClrLst>
+      <a:schemeClr val="accent2"/>
+    </dgm:fillClrLst>
+    <dgm:linClrLst meth="repeat">
+      <a:schemeClr val="lt1"/>
+    </dgm:linClrLst>
+    <dgm:effectClrLst/>
+    <dgm:txLinClrLst/>
+    <dgm:txFillClrLst/>
+    <dgm:txEffectClrLst/>
+  </dgm:styleLbl>
+  <dgm:styleLbl name="parChTrans2D1">
+    <dgm:fillClrLst meth="repeat">
+      <a:schemeClr val="accent4"/>
+    </dgm:fillClrLst>
+    <dgm:linClrLst meth="repeat">
+      <a:schemeClr val="lt1"/>
+    </dgm:linClrLst>
+    <dgm:effectClrLst/>
+    <dgm:txLinClrLst/>
+    <dgm:txFillClrLst meth="repeat">
+      <a:schemeClr val="lt1"/>
+    </dgm:txFillClrLst>
+    <dgm:txEffectClrLst/>
+  </dgm:styleLbl>
+  <dgm:styleLbl name="parChTrans2D2">
+    <dgm:fillClrLst meth="repeat">
+      <a:schemeClr val="accent5"/>
+    </dgm:fillClrLst>
+    <dgm:linClrLst meth="repeat">
+      <a:schemeClr val="lt1"/>
+    </dgm:linClrLst>
+    <dgm:effectClrLst/>
+    <dgm:txLinClrLst/>
+    <dgm:txFillClrLst/>
+    <dgm:txEffectClrLst/>
+  </dgm:styleLbl>
+  <dgm:styleLbl name="parChTrans2D3">
+    <dgm:fillClrLst meth="repeat">
+      <a:schemeClr val="accent5"/>
+    </dgm:fillClrLst>
+    <dgm:linClrLst meth="repeat">
+      <a:schemeClr val="lt1"/>
+    </dgm:linClrLst>
+    <dgm:effectClrLst/>
+    <dgm:txLinClrLst/>
+    <dgm:txFillClrLst/>
+    <dgm:txEffectClrLst/>
+  </dgm:styleLbl>
+  <dgm:styleLbl name="parChTrans2D4">
+    <dgm:fillClrLst meth="repeat">
+      <a:schemeClr val="accent6"/>
+    </dgm:fillClrLst>
+    <dgm:linClrLst meth="repeat">
+      <a:schemeClr val="lt1"/>
+    </dgm:linClrLst>
+    <dgm:effectClrLst/>
+    <dgm:txLinClrLst/>
+    <dgm:txFillClrLst meth="repeat">
+      <a:schemeClr val="lt1"/>
+    </dgm:txFillClrLst>
+    <dgm:txEffectClrLst/>
+  </dgm:styleLbl>
+  <dgm:styleLbl name="parChTrans1D1">
+    <dgm:fillClrLst meth="repeat">
+      <a:schemeClr val="accent4"/>
+    </dgm:fillClrLst>
+    <dgm:linClrLst meth="repeat">
+      <a:schemeClr val="accent4"/>
+    </dgm:linClrLst>
+    <dgm:effectClrLst/>
+    <dgm:txLinClrLst/>
+    <dgm:txFillClrLst meth="repeat">
+      <a:schemeClr val="tx1"/>
+    </dgm:txFillClrLst>
+    <dgm:txEffectClrLst/>
+  </dgm:styleLbl>
+  <dgm:styleLbl name="parChTrans1D2">
+    <dgm:fillClrLst meth="repeat">
+      <a:schemeClr val="accent4">
+        <a:tint val="90000"/>
+      </a:schemeClr>
+    </dgm:fillClrLst>
+    <dgm:linClrLst meth="repeat">
+      <a:schemeClr val="accent5"/>
+    </dgm:linClrLst>
+    <dgm:effectClrLst/>
+    <dgm:txLinClrLst/>
+    <dgm:txFillClrLst meth="repeat">
+      <a:schemeClr val="tx1"/>
+    </dgm:txFillClrLst>
+    <dgm:txEffectClrLst/>
+  </dgm:styleLbl>
+  <dgm:styleLbl name="parChTrans1D3">
+    <dgm:fillClrLst meth="repeat">
+      <a:schemeClr val="accent4">
+        <a:tint val="70000"/>
+      </a:schemeClr>
+    </dgm:fillClrLst>
+    <dgm:linClrLst meth="repeat">
+      <a:schemeClr val="accent6"/>
+    </dgm:linClrLst>
+    <dgm:effectClrLst/>
+    <dgm:txLinClrLst/>
+    <dgm:txFillClrLst meth="repeat">
+      <a:schemeClr val="tx1"/>
+    </dgm:txFillClrLst>
+    <dgm:txEffectClrLst/>
+  </dgm:styleLbl>
+  <dgm:styleLbl name="parChTrans1D4">
+    <dgm:fillClrLst meth="repeat">
+      <a:schemeClr val="accent4">
+        <a:tint val="50000"/>
+      </a:schemeClr>
+    </dgm:fillClrLst>
+    <dgm:linClrLst meth="repeat">
+      <a:schemeClr val="accent1"/>
+    </dgm:linClrLst>
+    <dgm:effectClrLst/>
+    <dgm:txLinClrLst/>
+    <dgm:txFillClrLst meth="repeat">
+      <a:schemeClr val="tx1"/>
+    </dgm:txFillClrLst>
+    <dgm:txEffectClrLst/>
+  </dgm:styleLbl>
+  <dgm:styleLbl name="fgAcc1">
+    <dgm:fillClrLst meth="repeat">
+      <a:schemeClr val="lt1">
+        <a:alpha val="90000"/>
+      </a:schemeClr>
+    </dgm:fillClrLst>
+    <dgm:linClrLst>
+      <a:schemeClr val="accent4"/>
+      <a:schemeClr val="accent5"/>
+    </dgm:linClrLst>
+    <dgm:effectClrLst/>
+    <dgm:txLinClrLst/>
+    <dgm:txFillClrLst meth="repeat">
+      <a:schemeClr val="dk1"/>
+    </dgm:txFillClrLst>
+    <dgm:txEffectClrLst/>
+  </dgm:styleLbl>
+  <dgm:styleLbl name="conFgAcc1">
+    <dgm:fillClrLst meth="repeat">
+      <a:schemeClr val="lt1">
+        <a:alpha val="90000"/>
+      </a:schemeClr>
+    </dgm:fillClrLst>
+    <dgm:linClrLst>
+      <a:schemeClr val="accent4"/>
+      <a:schemeClr val="accent5"/>
+    </dgm:linClrLst>
+    <dgm:effectClrLst/>
+    <dgm:txLinClrLst/>
+    <dgm:txFillClrLst meth="repeat">
+      <a:schemeClr val="dk1"/>
+    </dgm:txFillClrLst>
+    <dgm:txEffectClrLst/>
+  </dgm:styleLbl>
+  <dgm:styleLbl name="alignAcc1">
+    <dgm:fillClrLst meth="repeat">
+      <a:schemeClr val="lt1">
+        <a:alpha val="90000"/>
+      </a:schemeClr>
+    </dgm:fillClrLst>
+    <dgm:linClrLst>
+      <a:schemeClr val="accent4"/>
+      <a:schemeClr val="accent5"/>
+    </dgm:linClrLst>
+    <dgm:effectClrLst/>
+    <dgm:txLinClrLst/>
+    <dgm:txFillClrLst meth="repeat">
+      <a:schemeClr val="dk1"/>
+    </dgm:txFillClrLst>
+    <dgm:txEffectClrLst/>
+  </dgm:styleLbl>
+  <dgm:styleLbl name="trAlignAcc1">
+    <dgm:fillClrLst meth="repeat">
+      <a:schemeClr val="lt1">
+        <a:alpha val="40000"/>
+      </a:schemeClr>
+    </dgm:fillClrLst>
+    <dgm:linClrLst meth="repeat">
+      <a:schemeClr val="accent4"/>
+    </dgm:linClrLst>
+    <dgm:effectClrLst/>
+    <dgm:txLinClrLst/>
+    <dgm:txFillClrLst meth="repeat">
+      <a:schemeClr val="dk1"/>
+    </dgm:txFillClrLst>
+    <dgm:txEffectClrLst/>
+  </dgm:styleLbl>
+  <dgm:styleLbl name="bgAcc1">
+    <dgm:fillClrLst meth="repeat">
+      <a:schemeClr val="lt1">
+        <a:alpha val="90000"/>
+      </a:schemeClr>
+    </dgm:fillClrLst>
+    <dgm:linClrLst>
+      <a:schemeClr val="accent4"/>
+      <a:schemeClr val="accent5"/>
+    </dgm:linClrLst>
+    <dgm:effectClrLst/>
+    <dgm:txLinClrLst/>
+    <dgm:txFillClrLst meth="repeat">
+      <a:schemeClr val="dk1"/>
+    </dgm:txFillClrLst>
+    <dgm:txEffectClrLst/>
+  </dgm:styleLbl>
+  <dgm:styleLbl name="solidFgAcc1">
+    <dgm:fillClrLst meth="repeat">
+      <a:schemeClr val="lt1"/>
+    </dgm:fillClrLst>
+    <dgm:linClrLst>
+      <a:schemeClr val="accent4"/>
+      <a:schemeClr val="accent5"/>
+    </dgm:linClrLst>
+    <dgm:effectClrLst/>
+    <dgm:txLinClrLst/>
+    <dgm:txFillClrLst meth="repeat">
+      <a:schemeClr val="dk1"/>
+    </dgm:txFillClrLst>
+    <dgm:txEffectClrLst/>
+  </dgm:styleLbl>
+  <dgm:styleLbl name="solidAlignAcc1">
+    <dgm:fillClrLst meth="repeat">
+      <a:schemeClr val="lt1"/>
+    </dgm:fillClrLst>
+    <dgm:linClrLst>
+      <a:schemeClr val="accent4"/>
+      <a:schemeClr val="accent5"/>
+    </dgm:linClrLst>
+    <dgm:effectClrLst/>
+    <dgm:txLinClrLst/>
+    <dgm:txFillClrLst meth="repeat">
+      <a:schemeClr val="dk1"/>
+    </dgm:txFillClrLst>
+    <dgm:txEffectClrLst/>
+  </dgm:styleLbl>
+  <dgm:styleLbl name="solidBgAcc1">
+    <dgm:fillClrLst meth="repeat">
+      <a:schemeClr val="lt1"/>
+    </dgm:fillClrLst>
+    <dgm:linClrLst>
+      <a:schemeClr val="accent4"/>
+      <a:schemeClr val="accent5"/>
+    </dgm:linClrLst>
+    <dgm:effectClrLst/>
+    <dgm:txLinClrLst/>
+    <dgm:txFillClrLst meth="repeat">
+      <a:schemeClr val="dk1"/>
+    </dgm:txFillClrLst>
+    <dgm:txEffectClrLst/>
+  </dgm:styleLbl>
+  <dgm:styleLbl name="fgAccFollowNode1">
+    <dgm:fillClrLst>
+      <a:schemeClr val="accent4">
+        <a:tint val="40000"/>
+        <a:alpha val="90000"/>
+      </a:schemeClr>
+      <a:schemeClr val="accent5">
+        <a:tint val="40000"/>
+        <a:alpha val="90000"/>
+      </a:schemeClr>
+    </dgm:fillClrLst>
+    <dgm:linClrLst>
+      <a:schemeClr val="accent4">
+        <a:tint val="40000"/>
+        <a:alpha val="90000"/>
+      </a:schemeClr>
+      <a:schemeClr val="accent5">
+        <a:tint val="40000"/>
+        <a:alpha val="90000"/>
+      </a:schemeClr>
+    </dgm:linClrLst>
+    <dgm:effectClrLst/>
+    <dgm:txLinClrLst/>
+    <dgm:txFillClrLst meth="repeat">
+      <a:schemeClr val="dk1"/>
+    </dgm:txFillClrLst>
+    <dgm:txEffectClrLst/>
+  </dgm:styleLbl>
+  <dgm:styleLbl name="alignAccFollowNode1">
+    <dgm:fillClrLst>
+      <a:schemeClr val="accent4">
+        <a:tint val="40000"/>
+        <a:alpha val="90000"/>
+      </a:schemeClr>
+      <a:schemeClr val="accent5">
+        <a:tint val="40000"/>
+        <a:alpha val="90000"/>
+      </a:schemeClr>
+    </dgm:fillClrLst>
+    <dgm:linClrLst>
+      <a:schemeClr val="accent4">
+        <a:tint val="40000"/>
+        <a:alpha val="90000"/>
+      </a:schemeClr>
+      <a:schemeClr val="accent5">
+        <a:tint val="40000"/>
+        <a:alpha val="90000"/>
+      </a:schemeClr>
+    </dgm:linClrLst>
+    <dgm:effectClrLst/>
+    <dgm:txLinClrLst/>
+    <dgm:txFillClrLst meth="repeat">
+      <a:schemeClr val="dk1"/>
+    </dgm:txFillClrLst>
+    <dgm:txEffectClrLst/>
+  </dgm:styleLbl>
+  <dgm:styleLbl name="bgAccFollowNode1">
+    <dgm:fillClrLst>
+      <a:schemeClr val="accent4">
+        <a:tint val="40000"/>
+        <a:alpha val="90000"/>
+      </a:schemeClr>
+      <a:schemeClr val="accent5">
+        <a:tint val="40000"/>
+        <a:alpha val="90000"/>
+      </a:schemeClr>
+    </dgm:fillClrLst>
+    <dgm:linClrLst>
+      <a:schemeClr val="accent4">
+        <a:tint val="40000"/>
+        <a:alpha val="90000"/>
+      </a:schemeClr>
+      <a:schemeClr val="accent5">
+        <a:tint val="40000"/>
+        <a:alpha val="90000"/>
+      </a:schemeClr>
+    </dgm:linClrLst>
+    <dgm:effectClrLst/>
+    <dgm:txLinClrLst/>
+    <dgm:txFillClrLst meth="repeat">
+      <a:schemeClr val="dk1"/>
+    </dgm:txFillClrLst>
+    <dgm:txEffectClrLst/>
+  </dgm:styleLbl>
+  <dgm:styleLbl name="fgAcc0">
+    <dgm:fillClrLst meth="repeat">
+      <a:schemeClr val="lt1">
+        <a:alpha val="90000"/>
+      </a:schemeClr>
+    </dgm:fillClrLst>
+    <dgm:linClrLst>
+      <a:schemeClr val="accent3"/>
+    </dgm:linClrLst>
+    <dgm:effectClrLst/>
+    <dgm:txLinClrLst/>
+    <dgm:txFillClrLst meth="repeat">
+      <a:schemeClr val="dk1"/>
+    </dgm:txFillClrLst>
+    <dgm:txEffectClrLst/>
+  </dgm:styleLbl>
+  <dgm:styleLbl name="fgAcc2">
+    <dgm:fillClrLst meth="repeat">
+      <a:schemeClr val="lt1">
+        <a:alpha val="90000"/>
+      </a:schemeClr>
+    </dgm:fillClrLst>
+    <dgm:linClrLst>
+      <a:schemeClr val="accent5"/>
+    </dgm:linClrLst>
+    <dgm:effectClrLst/>
+    <dgm:txLinClrLst/>
+    <dgm:txFillClrLst meth="repeat">
+      <a:schemeClr val="dk1"/>
+    </dgm:txFillClrLst>
+    <dgm:txEffectClrLst/>
+  </dgm:styleLbl>
+  <dgm:styleLbl name="fgAcc3">
+    <dgm:fillClrLst meth="repeat">
+      <a:schemeClr val="lt1">
+        <a:alpha val="90000"/>
+      </a:schemeClr>
+    </dgm:fillClrLst>
+    <dgm:linClrLst>
+      <a:schemeClr val="accent6"/>
+    </dgm:linClrLst>
+    <dgm:effectClrLst/>
+    <dgm:txLinClrLst/>
+    <dgm:txFillClrLst meth="repeat">
+      <a:schemeClr val="dk1"/>
+    </dgm:txFillClrLst>
+    <dgm:txEffectClrLst/>
+  </dgm:styleLbl>
+  <dgm:styleLbl name="fgAcc4">
+    <dgm:fillClrLst meth="repeat">
+      <a:schemeClr val="lt1">
+        <a:alpha val="90000"/>
+      </a:schemeClr>
+    </dgm:fillClrLst>
+    <dgm:linClrLst>
+      <a:schemeClr val="accent1"/>
+    </dgm:linClrLst>
+    <dgm:effectClrLst/>
+    <dgm:txLinClrLst/>
+    <dgm:txFillClrLst meth="repeat">
+      <a:schemeClr val="dk1"/>
+    </dgm:txFillClrLst>
+    <dgm:txEffectClrLst/>
+  </dgm:styleLbl>
+  <dgm:styleLbl name="bgShp">
+    <dgm:fillClrLst meth="repeat">
+      <a:schemeClr val="accent4">
+        <a:tint val="40000"/>
+      </a:schemeClr>
+    </dgm:fillClrLst>
+    <dgm:linClrLst meth="repeat">
+      <a:schemeClr val="dk1"/>
+    </dgm:linClrLst>
+    <dgm:effectClrLst/>
+    <dgm:txLinClrLst/>
+    <dgm:txFillClrLst meth="repeat">
+      <a:schemeClr val="dk1"/>
+    </dgm:txFillClrLst>
+    <dgm:txEffectClrLst/>
+  </dgm:styleLbl>
+  <dgm:styleLbl name="dkBgShp">
+    <dgm:fillClrLst meth="repeat">
+      <a:schemeClr val="accent4">
+        <a:shade val="90000"/>
+      </a:schemeClr>
+    </dgm:fillClrLst>
+    <dgm:linClrLst meth="repeat">
+      <a:schemeClr val="dk1"/>
+    </dgm:linClrLst>
+    <dgm:effectClrLst/>
+    <dgm:txLinClrLst/>
+    <dgm:txFillClrLst meth="repeat">
+      <a:schemeClr val="lt1"/>
+    </dgm:txFillClrLst>
+    <dgm:txEffectClrLst/>
+  </dgm:styleLbl>
+  <dgm:styleLbl name="trBgShp">
+    <dgm:fillClrLst meth="repeat">
+      <a:schemeClr val="accent4">
+        <a:tint val="50000"/>
+        <a:alpha val="40000"/>
+      </a:schemeClr>
+    </dgm:fillClrLst>
+    <dgm:linClrLst meth="repeat">
+      <a:schemeClr val="accent4"/>
+    </dgm:linClrLst>
+    <dgm:effectClrLst/>
+    <dgm:txLinClrLst/>
+    <dgm:txFillClrLst meth="repeat">
+      <a:schemeClr val="lt1"/>
+    </dgm:txFillClrLst>
+    <dgm:txEffectClrLst/>
+  </dgm:styleLbl>
+  <dgm:styleLbl name="fgShp">
+    <dgm:fillClrLst meth="repeat">
+      <a:schemeClr val="accent4">
+        <a:tint val="40000"/>
+      </a:schemeClr>
+    </dgm:fillClrLst>
+    <dgm:linClrLst meth="repeat">
+      <a:schemeClr val="lt1"/>
+    </dgm:linClrLst>
+    <dgm:effectClrLst/>
+    <dgm:txLinClrLst/>
+    <dgm:txFillClrLst meth="repeat">
+      <a:schemeClr val="dk1"/>
+    </dgm:txFillClrLst>
+    <dgm:txEffectClrLst/>
+  </dgm:styleLbl>
+  <dgm:styleLbl name="revTx">
+    <dgm:fillClrLst meth="repeat">
+      <a:schemeClr val="lt1">
+        <a:alpha val="0"/>
+      </a:schemeClr>
+    </dgm:fillClrLst>
+    <dgm:linClrLst meth="repeat">
+      <a:schemeClr val="dk1">
+        <a:alpha val="0"/>
+      </a:schemeClr>
+    </dgm:linClrLst>
+    <dgm:effectClrLst/>
+    <dgm:txLinClrLst/>
+    <dgm:txFillClrLst meth="repeat">
+      <a:schemeClr val="tx1"/>
+    </dgm:txFillClrLst>
+    <dgm:txEffectClrLst/>
+  </dgm:styleLbl>
+</dgm:colorsDef>
+</file>
+
 <file path=ppt/diagrams/data1.xml><?xml version="1.0" encoding="utf-8"?>
 <dgm:dataModel xmlns:dgm="http://schemas.openxmlformats.org/drawingml/2006/diagram" xmlns:a="http://schemas.openxmlformats.org/drawingml/2006/main">
   <dgm:ptLst>
     <dgm:pt modelId="{01D1C30B-2460-4322-80D6-442229F783E1}" type="doc">
-      <dgm:prSet loTypeId="urn:microsoft.com/office/officeart/2005/8/layout/hProcess9" loCatId="process" qsTypeId="urn:microsoft.com/office/officeart/2005/8/quickstyle/simple1" qsCatId="simple" csTypeId="urn:microsoft.com/office/officeart/2005/8/colors/accent1_2" csCatId="accent1" phldr="1"/>
+      <dgm:prSet loTypeId="urn:microsoft.com/office/officeart/2005/8/layout/hProcess9" loCatId="process" qsTypeId="urn:microsoft.com/office/officeart/2005/8/quickstyle/simple1" qsCatId="simple" csTypeId="urn:microsoft.com/office/officeart/2005/8/colors/colorful4" csCatId="colorful" phldr="1"/>
       <dgm:spPr/>
     </dgm:pt>
     <dgm:pt modelId="{678A2CAA-1DD6-41DF-B5B5-8816B6BF4317}">
@@ -5453,7 +5750,7 @@
           <a:avLst/>
         </a:prstGeom>
         <a:solidFill>
-          <a:schemeClr val="accent1">
+          <a:schemeClr val="accent4">
             <a:tint val="40000"/>
             <a:hueOff val="0"/>
             <a:satOff val="0"/>
@@ -5493,7 +5790,7 @@
           <a:avLst/>
         </a:prstGeom>
         <a:solidFill>
-          <a:schemeClr val="accent1">
+          <a:schemeClr val="accent4">
             <a:hueOff val="0"/>
             <a:satOff val="0"/>
             <a:lumOff val="0"/>
@@ -5574,10 +5871,10 @@
           <a:avLst/>
         </a:prstGeom>
         <a:solidFill>
-          <a:schemeClr val="accent1">
-            <a:hueOff val="0"/>
-            <a:satOff val="0"/>
-            <a:lumOff val="0"/>
+          <a:schemeClr val="accent4">
+            <a:hueOff val="-1450138"/>
+            <a:satOff val="21392"/>
+            <a:lumOff val="-1618"/>
             <a:alphaOff val="0"/>
           </a:schemeClr>
         </a:solidFill>
@@ -5669,10 +5966,10 @@
           <a:avLst/>
         </a:prstGeom>
         <a:solidFill>
-          <a:schemeClr val="accent1">
-            <a:hueOff val="0"/>
-            <a:satOff val="0"/>
-            <a:lumOff val="0"/>
+          <a:schemeClr val="accent4">
+            <a:hueOff val="-2900276"/>
+            <a:satOff val="42783"/>
+            <a:lumOff val="-3235"/>
             <a:alphaOff val="0"/>
           </a:schemeClr>
         </a:solidFill>
@@ -5746,10 +6043,10 @@
           <a:avLst/>
         </a:prstGeom>
         <a:solidFill>
-          <a:schemeClr val="accent1">
-            <a:hueOff val="0"/>
-            <a:satOff val="0"/>
-            <a:lumOff val="0"/>
+          <a:schemeClr val="accent4">
+            <a:hueOff val="-4350414"/>
+            <a:satOff val="64175"/>
+            <a:lumOff val="-4853"/>
             <a:alphaOff val="0"/>
           </a:schemeClr>
         </a:solidFill>
@@ -5823,10 +6120,10 @@
           <a:avLst/>
         </a:prstGeom>
         <a:solidFill>
-          <a:schemeClr val="accent1">
-            <a:hueOff val="0"/>
-            <a:satOff val="0"/>
-            <a:lumOff val="0"/>
+          <a:schemeClr val="accent4">
+            <a:hueOff val="-5800551"/>
+            <a:satOff val="85567"/>
+            <a:lumOff val="-6470"/>
             <a:alphaOff val="0"/>
           </a:schemeClr>
         </a:solidFill>
@@ -22552,7 +22849,7 @@
           <p:nvPr>
             <p:extLst>
               <p:ext uri="{D42A27DB-BD31-4B8C-83A1-F6EECF244321}">
-                <p14:modId xmlns:p14="http://schemas.microsoft.com/office/powerpoint/2010/main" val="1888231240"/>
+                <p14:modId xmlns:p14="http://schemas.microsoft.com/office/powerpoint/2010/main" val="3818285844"/>
               </p:ext>
             </p:extLst>
           </p:nvPr>
@@ -23428,6 +23725,180 @@
             </a:r>
             <a:r>
               <a:rPr lang="de-DE" dirty="0" smtClean="0"/>
+              <a:t> - Statistik</a:t>
+            </a:r>
+            <a:endParaRPr lang="de-DE" dirty="0"/>
+          </a:p>
+        </p:txBody>
+      </p:sp>
+      <p:sp>
+        <p:nvSpPr>
+          <p:cNvPr id="4" name="Datumsplatzhalter 3"/>
+          <p:cNvSpPr>
+            <a:spLocks noGrp="1"/>
+          </p:cNvSpPr>
+          <p:nvPr>
+            <p:ph type="dt" sz="half" idx="10"/>
+          </p:nvPr>
+        </p:nvSpPr>
+        <p:spPr/>
+        <p:txBody>
+          <a:bodyPr/>
+          <a:lstStyle/>
+          <a:p>
+            <a:fld id="{68341324-8F87-45CB-9D14-B0BA1C09914F}" type="datetime1">
+              <a:rPr lang="de-DE" smtClean="0"/>
+              <a:t>29.10.2012</a:t>
+            </a:fld>
+            <a:endParaRPr lang="de-DE"/>
+          </a:p>
+        </p:txBody>
+      </p:sp>
+      <p:sp>
+        <p:nvSpPr>
+          <p:cNvPr id="5" name="Fußzeilenplatzhalter 4"/>
+          <p:cNvSpPr>
+            <a:spLocks noGrp="1"/>
+          </p:cNvSpPr>
+          <p:nvPr>
+            <p:ph type="ftr" sz="quarter" idx="11"/>
+          </p:nvPr>
+        </p:nvSpPr>
+        <p:spPr/>
+        <p:txBody>
+          <a:bodyPr/>
+          <a:lstStyle/>
+          <a:p>
+            <a:r>
+              <a:rPr lang="de-DE" smtClean="0"/>
+              <a:t>Clemens Wagner &amp; Christian Wolter</a:t>
+            </a:r>
+            <a:endParaRPr lang="de-DE"/>
+          </a:p>
+        </p:txBody>
+      </p:sp>
+      <p:sp>
+        <p:nvSpPr>
+          <p:cNvPr id="6" name="Foliennummernplatzhalter 5"/>
+          <p:cNvSpPr>
+            <a:spLocks noGrp="1"/>
+          </p:cNvSpPr>
+          <p:nvPr>
+            <p:ph type="sldNum" sz="quarter" idx="12"/>
+          </p:nvPr>
+        </p:nvSpPr>
+        <p:spPr/>
+        <p:txBody>
+          <a:bodyPr/>
+          <a:lstStyle/>
+          <a:p>
+            <a:fld id="{6C6AE60A-B69C-4790-82F7-3882EDF23186}" type="slidenum">
+              <a:rPr lang="de-DE" smtClean="0"/>
+              <a:pPr/>
+              <a:t>15</a:t>
+            </a:fld>
+            <a:r>
+              <a:rPr lang="de-DE" smtClean="0"/>
+              <a:t> </a:t>
+            </a:r>
+            <a:endParaRPr lang="de-DE" dirty="0"/>
+          </a:p>
+        </p:txBody>
+      </p:sp>
+      <p:graphicFrame>
+        <p:nvGraphicFramePr>
+          <p:cNvPr id="7" name="Diagramm 6"/>
+          <p:cNvGraphicFramePr>
+            <a:graphicFrameLocks/>
+          </p:cNvGraphicFramePr>
+          <p:nvPr>
+            <p:extLst>
+              <p:ext uri="{D42A27DB-BD31-4B8C-83A1-F6EECF244321}">
+                <p14:modId xmlns:p14="http://schemas.microsoft.com/office/powerpoint/2010/main" val="3307368552"/>
+              </p:ext>
+            </p:extLst>
+          </p:nvPr>
+        </p:nvGraphicFramePr>
+        <p:xfrm>
+          <a:off x="611560" y="1628800"/>
+          <a:ext cx="8352928" cy="4608512"/>
+        </p:xfrm>
+        <a:graphic>
+          <a:graphicData uri="http://schemas.openxmlformats.org/drawingml/2006/chart">
+            <c:chart xmlns:c="http://schemas.openxmlformats.org/drawingml/2006/chart" xmlns:r="http://schemas.openxmlformats.org/officeDocument/2006/relationships" r:id="rId2"/>
+          </a:graphicData>
+        </a:graphic>
+      </p:graphicFrame>
+    </p:spTree>
+    <p:extLst>
+      <p:ext uri="{BB962C8B-B14F-4D97-AF65-F5344CB8AC3E}">
+        <p14:creationId xmlns:p14="http://schemas.microsoft.com/office/powerpoint/2010/main" val="468436284"/>
+      </p:ext>
+    </p:extLst>
+  </p:cSld>
+  <p:clrMapOvr>
+    <a:masterClrMapping/>
+  </p:clrMapOvr>
+  <p:timing>
+    <p:tnLst>
+      <p:par>
+        <p:cTn id="1" dur="indefinite" restart="never" nodeType="tmRoot"/>
+      </p:par>
+    </p:tnLst>
+  </p:timing>
+</p:sld>
+</file>
+
+<file path=ppt/slides/slide16.xml><?xml version="1.0" encoding="utf-8"?>
+<p:sld xmlns:a="http://schemas.openxmlformats.org/drawingml/2006/main" xmlns:r="http://schemas.openxmlformats.org/officeDocument/2006/relationships" xmlns:p="http://schemas.openxmlformats.org/presentationml/2006/main">
+  <p:cSld>
+    <p:spTree>
+      <p:nvGrpSpPr>
+        <p:cNvPr id="1" name=""/>
+        <p:cNvGrpSpPr/>
+        <p:nvPr/>
+      </p:nvGrpSpPr>
+      <p:grpSpPr>
+        <a:xfrm>
+          <a:off x="0" y="0"/>
+          <a:ext cx="0" cy="0"/>
+          <a:chOff x="0" y="0"/>
+          <a:chExt cx="0" cy="0"/>
+        </a:xfrm>
+      </p:grpSpPr>
+      <p:sp>
+        <p:nvSpPr>
+          <p:cNvPr id="2" name="Titel 1"/>
+          <p:cNvSpPr>
+            <a:spLocks noGrp="1"/>
+          </p:cNvSpPr>
+          <p:nvPr>
+            <p:ph type="title"/>
+          </p:nvPr>
+        </p:nvSpPr>
+        <p:spPr/>
+        <p:txBody>
+          <a:bodyPr/>
+          <a:lstStyle/>
+          <a:p>
+            <a:r>
+              <a:rPr lang="de-DE" dirty="0" smtClean="0"/>
+              <a:t>3. </a:t>
+            </a:r>
+            <a:r>
+              <a:rPr lang="de-DE" dirty="0" err="1" smtClean="0"/>
+              <a:t>eXtreme</a:t>
+            </a:r>
+            <a:r>
+              <a:rPr lang="de-DE" dirty="0" smtClean="0"/>
+              <a:t> </a:t>
+            </a:r>
+            <a:r>
+              <a:rPr lang="de-DE" dirty="0" err="1" smtClean="0"/>
+              <a:t>Programming</a:t>
+            </a:r>
+            <a:r>
+              <a:rPr lang="de-DE" dirty="0" smtClean="0"/>
               <a:t> - Umsetzung</a:t>
             </a:r>
             <a:endParaRPr lang="de-DE" dirty="0"/>
@@ -23539,7 +24010,7 @@
           <a:p>
             <a:fld id="{6C6AE60A-B69C-4790-82F7-3882EDF23186}" type="slidenum">
               <a:rPr lang="de-DE" smtClean="0"/>
-              <a:t>15</a:t>
+              <a:t>16</a:t>
             </a:fld>
             <a:endParaRPr lang="de-DE"/>
           </a:p>
@@ -23629,7 +24100,7 @@
 </p:sld>
 </file>
 
-<file path=ppt/slides/slide16.xml><?xml version="1.0" encoding="utf-8"?>
+<file path=ppt/slides/slide17.xml><?xml version="1.0" encoding="utf-8"?>
 <p:sld xmlns:a="http://schemas.openxmlformats.org/drawingml/2006/main" xmlns:r="http://schemas.openxmlformats.org/officeDocument/2006/relationships" xmlns:p="http://schemas.openxmlformats.org/presentationml/2006/main">
   <p:cSld>
     <p:spTree>
@@ -23767,7 +24238,7 @@
           <a:p>
             <a:fld id="{6C6AE60A-B69C-4790-82F7-3882EDF23186}" type="slidenum">
               <a:rPr lang="de-DE" smtClean="0"/>
-              <a:t>16</a:t>
+              <a:t>17</a:t>
             </a:fld>
             <a:endParaRPr lang="de-DE"/>
           </a:p>
@@ -23793,7 +24264,7 @@
 </p:sld>
 </file>
 
-<file path=ppt/slides/slide17.xml><?xml version="1.0" encoding="utf-8"?>
+<file path=ppt/slides/slide18.xml><?xml version="1.0" encoding="utf-8"?>
 <p:sld xmlns:a="http://schemas.openxmlformats.org/drawingml/2006/main" xmlns:r="http://schemas.openxmlformats.org/officeDocument/2006/relationships" xmlns:p="http://schemas.openxmlformats.org/presentationml/2006/main">
   <p:cSld>
     <p:spTree>
@@ -23923,7 +24394,7 @@
           <a:p>
             <a:fld id="{6C6AE60A-B69C-4790-82F7-3882EDF23186}" type="slidenum">
               <a:rPr lang="de-DE" smtClean="0"/>
-              <a:t>17</a:t>
+              <a:t>18</a:t>
             </a:fld>
             <a:endParaRPr lang="de-DE"/>
           </a:p>
@@ -23949,7 +24420,7 @@
 </p:sld>
 </file>
 
-<file path=ppt/slides/slide18.xml><?xml version="1.0" encoding="utf-8"?>
+<file path=ppt/slides/slide19.xml><?xml version="1.0" encoding="utf-8"?>
 <p:sld xmlns:a="http://schemas.openxmlformats.org/drawingml/2006/main" xmlns:r="http://schemas.openxmlformats.org/officeDocument/2006/relationships" xmlns:p="http://schemas.openxmlformats.org/presentationml/2006/main">
   <p:cSld>
     <p:spTree>
@@ -24079,7 +24550,7 @@
           <a:p>
             <a:fld id="{6C6AE60A-B69C-4790-82F7-3882EDF23186}" type="slidenum">
               <a:rPr lang="de-DE" smtClean="0"/>
-              <a:t>18</a:t>
+              <a:t>19</a:t>
             </a:fld>
             <a:endParaRPr lang="de-DE"/>
           </a:p>
@@ -24089,203 +24560,6 @@
     <p:extLst>
       <p:ext uri="{BB962C8B-B14F-4D97-AF65-F5344CB8AC3E}">
         <p14:creationId xmlns:p14="http://schemas.microsoft.com/office/powerpoint/2010/main" val="3535810884"/>
-      </p:ext>
-    </p:extLst>
-  </p:cSld>
-  <p:clrMapOvr>
-    <a:masterClrMapping/>
-  </p:clrMapOvr>
-  <p:timing>
-    <p:tnLst>
-      <p:par>
-        <p:cTn id="1" dur="indefinite" restart="never" nodeType="tmRoot"/>
-      </p:par>
-    </p:tnLst>
-  </p:timing>
-</p:sld>
-</file>
-
-<file path=ppt/slides/slide19.xml><?xml version="1.0" encoding="utf-8"?>
-<p:sld xmlns:a="http://schemas.openxmlformats.org/drawingml/2006/main" xmlns:r="http://schemas.openxmlformats.org/officeDocument/2006/relationships" xmlns:p="http://schemas.openxmlformats.org/presentationml/2006/main">
-  <p:cSld>
-    <p:spTree>
-      <p:nvGrpSpPr>
-        <p:cNvPr id="1" name=""/>
-        <p:cNvGrpSpPr/>
-        <p:nvPr/>
-      </p:nvGrpSpPr>
-      <p:grpSpPr>
-        <a:xfrm>
-          <a:off x="0" y="0"/>
-          <a:ext cx="0" cy="0"/>
-          <a:chOff x="0" y="0"/>
-          <a:chExt cx="0" cy="0"/>
-        </a:xfrm>
-      </p:grpSpPr>
-      <p:sp>
-        <p:nvSpPr>
-          <p:cNvPr id="2" name="Titel 1"/>
-          <p:cNvSpPr>
-            <a:spLocks noGrp="1"/>
-          </p:cNvSpPr>
-          <p:nvPr>
-            <p:ph type="title"/>
-          </p:nvPr>
-        </p:nvSpPr>
-        <p:spPr/>
-        <p:txBody>
-          <a:bodyPr/>
-          <a:lstStyle/>
-          <a:p>
-            <a:r>
-              <a:rPr lang="de-DE" dirty="0" smtClean="0"/>
-              <a:t>4. Implementierung - Besonderheiten</a:t>
-            </a:r>
-            <a:endParaRPr lang="de-DE" dirty="0"/>
-          </a:p>
-        </p:txBody>
-      </p:sp>
-      <p:sp>
-        <p:nvSpPr>
-          <p:cNvPr id="3" name="Inhaltsplatzhalter 2"/>
-          <p:cNvSpPr>
-            <a:spLocks noGrp="1"/>
-          </p:cNvSpPr>
-          <p:nvPr>
-            <p:ph idx="1"/>
-          </p:nvPr>
-        </p:nvSpPr>
-        <p:spPr/>
-        <p:txBody>
-          <a:bodyPr/>
-          <a:lstStyle/>
-          <a:p>
-            <a:r>
-              <a:rPr lang="de-DE" dirty="0" smtClean="0"/>
-              <a:t>Klasse </a:t>
-            </a:r>
-            <a:r>
-              <a:rPr lang="de-DE" dirty="0" err="1" smtClean="0"/>
-              <a:t>Paintpanel</a:t>
-            </a:r>
-            <a:r>
-              <a:rPr lang="de-DE" dirty="0" smtClean="0"/>
-              <a:t>:</a:t>
-            </a:r>
-          </a:p>
-          <a:p>
-            <a:pPr lvl="1"/>
-            <a:r>
-              <a:rPr lang="de-DE" dirty="0" smtClean="0"/>
-              <a:t>Zeichnet Routen, Städte und Pheromone</a:t>
-            </a:r>
-          </a:p>
-          <a:p>
-            <a:pPr lvl="1"/>
-            <a:r>
-              <a:rPr lang="de-DE" dirty="0" smtClean="0"/>
-              <a:t>Darstellung optimal skaliert</a:t>
-            </a:r>
-          </a:p>
-          <a:p>
-            <a:pPr lvl="1"/>
-            <a:r>
-              <a:rPr lang="de-DE" dirty="0" smtClean="0"/>
-              <a:t>Zoomfunktion</a:t>
-            </a:r>
-          </a:p>
-          <a:p>
-            <a:pPr lvl="1"/>
-            <a:r>
-              <a:rPr lang="de-DE" dirty="0" smtClean="0"/>
-              <a:t>Freies Scrollen</a:t>
-            </a:r>
-          </a:p>
-          <a:p>
-            <a:pPr lvl="1"/>
-            <a:r>
-              <a:rPr lang="de-DE" dirty="0" smtClean="0"/>
-              <a:t>TSP bearbeiten</a:t>
-            </a:r>
-            <a:endParaRPr lang="de-DE" dirty="0"/>
-          </a:p>
-        </p:txBody>
-      </p:sp>
-      <p:sp>
-        <p:nvSpPr>
-          <p:cNvPr id="4" name="Datumsplatzhalter 3"/>
-          <p:cNvSpPr>
-            <a:spLocks noGrp="1"/>
-          </p:cNvSpPr>
-          <p:nvPr>
-            <p:ph type="dt" sz="half" idx="10"/>
-          </p:nvPr>
-        </p:nvSpPr>
-        <p:spPr/>
-        <p:txBody>
-          <a:bodyPr/>
-          <a:lstStyle/>
-          <a:p>
-            <a:fld id="{54909B47-53CE-4A48-B031-A50C91643E80}" type="datetime1">
-              <a:rPr lang="de-DE" smtClean="0"/>
-              <a:t>29.10.2012</a:t>
-            </a:fld>
-            <a:endParaRPr lang="de-DE"/>
-          </a:p>
-        </p:txBody>
-      </p:sp>
-      <p:sp>
-        <p:nvSpPr>
-          <p:cNvPr id="5" name="Fußzeilenplatzhalter 4"/>
-          <p:cNvSpPr>
-            <a:spLocks noGrp="1"/>
-          </p:cNvSpPr>
-          <p:nvPr>
-            <p:ph type="ftr" sz="quarter" idx="11"/>
-          </p:nvPr>
-        </p:nvSpPr>
-        <p:spPr/>
-        <p:txBody>
-          <a:bodyPr/>
-          <a:lstStyle/>
-          <a:p>
-            <a:r>
-              <a:rPr lang="de-DE" smtClean="0"/>
-              <a:t>Clemens Wagner &amp; Christian Wolter</a:t>
-            </a:r>
-            <a:endParaRPr lang="de-DE"/>
-          </a:p>
-        </p:txBody>
-      </p:sp>
-      <p:sp>
-        <p:nvSpPr>
-          <p:cNvPr id="6" name="Foliennummernplatzhalter 5"/>
-          <p:cNvSpPr>
-            <a:spLocks noGrp="1"/>
-          </p:cNvSpPr>
-          <p:nvPr>
-            <p:ph type="sldNum" sz="quarter" idx="12"/>
-          </p:nvPr>
-        </p:nvSpPr>
-        <p:spPr/>
-        <p:txBody>
-          <a:bodyPr>
-            <a:normAutofit/>
-          </a:bodyPr>
-          <a:lstStyle/>
-          <a:p>
-            <a:fld id="{6C6AE60A-B69C-4790-82F7-3882EDF23186}" type="slidenum">
-              <a:rPr lang="de-DE" smtClean="0"/>
-              <a:t>19</a:t>
-            </a:fld>
-            <a:endParaRPr lang="de-DE"/>
-          </a:p>
-        </p:txBody>
-      </p:sp>
-    </p:spTree>
-    <p:extLst>
-      <p:ext uri="{BB962C8B-B14F-4D97-AF65-F5344CB8AC3E}">
-        <p14:creationId xmlns:p14="http://schemas.microsoft.com/office/powerpoint/2010/main" val="799708026"/>
       </p:ext>
     </p:extLst>
   </p:cSld>
@@ -24580,6 +24854,203 @@
           <a:p>
             <a:r>
               <a:rPr lang="de-DE" dirty="0" smtClean="0"/>
+              <a:t>Klasse </a:t>
+            </a:r>
+            <a:r>
+              <a:rPr lang="de-DE" dirty="0" err="1" smtClean="0"/>
+              <a:t>Paintpanel</a:t>
+            </a:r>
+            <a:r>
+              <a:rPr lang="de-DE" dirty="0" smtClean="0"/>
+              <a:t>:</a:t>
+            </a:r>
+          </a:p>
+          <a:p>
+            <a:pPr lvl="1"/>
+            <a:r>
+              <a:rPr lang="de-DE" dirty="0" smtClean="0"/>
+              <a:t>Zeichnet Routen, Städte und Pheromone</a:t>
+            </a:r>
+          </a:p>
+          <a:p>
+            <a:pPr lvl="1"/>
+            <a:r>
+              <a:rPr lang="de-DE" dirty="0" smtClean="0"/>
+              <a:t>Darstellung optimal skaliert</a:t>
+            </a:r>
+          </a:p>
+          <a:p>
+            <a:pPr lvl="1"/>
+            <a:r>
+              <a:rPr lang="de-DE" dirty="0" smtClean="0"/>
+              <a:t>Zoomfunktion</a:t>
+            </a:r>
+          </a:p>
+          <a:p>
+            <a:pPr lvl="1"/>
+            <a:r>
+              <a:rPr lang="de-DE" dirty="0" smtClean="0"/>
+              <a:t>Freies Scrollen</a:t>
+            </a:r>
+          </a:p>
+          <a:p>
+            <a:pPr lvl="1"/>
+            <a:r>
+              <a:rPr lang="de-DE" dirty="0" smtClean="0"/>
+              <a:t>TSP bearbeiten</a:t>
+            </a:r>
+            <a:endParaRPr lang="de-DE" dirty="0"/>
+          </a:p>
+        </p:txBody>
+      </p:sp>
+      <p:sp>
+        <p:nvSpPr>
+          <p:cNvPr id="4" name="Datumsplatzhalter 3"/>
+          <p:cNvSpPr>
+            <a:spLocks noGrp="1"/>
+          </p:cNvSpPr>
+          <p:nvPr>
+            <p:ph type="dt" sz="half" idx="10"/>
+          </p:nvPr>
+        </p:nvSpPr>
+        <p:spPr/>
+        <p:txBody>
+          <a:bodyPr/>
+          <a:lstStyle/>
+          <a:p>
+            <a:fld id="{54909B47-53CE-4A48-B031-A50C91643E80}" type="datetime1">
+              <a:rPr lang="de-DE" smtClean="0"/>
+              <a:t>29.10.2012</a:t>
+            </a:fld>
+            <a:endParaRPr lang="de-DE"/>
+          </a:p>
+        </p:txBody>
+      </p:sp>
+      <p:sp>
+        <p:nvSpPr>
+          <p:cNvPr id="5" name="Fußzeilenplatzhalter 4"/>
+          <p:cNvSpPr>
+            <a:spLocks noGrp="1"/>
+          </p:cNvSpPr>
+          <p:nvPr>
+            <p:ph type="ftr" sz="quarter" idx="11"/>
+          </p:nvPr>
+        </p:nvSpPr>
+        <p:spPr/>
+        <p:txBody>
+          <a:bodyPr/>
+          <a:lstStyle/>
+          <a:p>
+            <a:r>
+              <a:rPr lang="de-DE" smtClean="0"/>
+              <a:t>Clemens Wagner &amp; Christian Wolter</a:t>
+            </a:r>
+            <a:endParaRPr lang="de-DE"/>
+          </a:p>
+        </p:txBody>
+      </p:sp>
+      <p:sp>
+        <p:nvSpPr>
+          <p:cNvPr id="6" name="Foliennummernplatzhalter 5"/>
+          <p:cNvSpPr>
+            <a:spLocks noGrp="1"/>
+          </p:cNvSpPr>
+          <p:nvPr>
+            <p:ph type="sldNum" sz="quarter" idx="12"/>
+          </p:nvPr>
+        </p:nvSpPr>
+        <p:spPr/>
+        <p:txBody>
+          <a:bodyPr>
+            <a:normAutofit/>
+          </a:bodyPr>
+          <a:lstStyle/>
+          <a:p>
+            <a:fld id="{6C6AE60A-B69C-4790-82F7-3882EDF23186}" type="slidenum">
+              <a:rPr lang="de-DE" smtClean="0"/>
+              <a:t>20</a:t>
+            </a:fld>
+            <a:endParaRPr lang="de-DE"/>
+          </a:p>
+        </p:txBody>
+      </p:sp>
+    </p:spTree>
+    <p:extLst>
+      <p:ext uri="{BB962C8B-B14F-4D97-AF65-F5344CB8AC3E}">
+        <p14:creationId xmlns:p14="http://schemas.microsoft.com/office/powerpoint/2010/main" val="799708026"/>
+      </p:ext>
+    </p:extLst>
+  </p:cSld>
+  <p:clrMapOvr>
+    <a:masterClrMapping/>
+  </p:clrMapOvr>
+  <p:timing>
+    <p:tnLst>
+      <p:par>
+        <p:cTn id="1" dur="indefinite" restart="never" nodeType="tmRoot"/>
+      </p:par>
+    </p:tnLst>
+  </p:timing>
+</p:sld>
+</file>
+
+<file path=ppt/slides/slide21.xml><?xml version="1.0" encoding="utf-8"?>
+<p:sld xmlns:a="http://schemas.openxmlformats.org/drawingml/2006/main" xmlns:r="http://schemas.openxmlformats.org/officeDocument/2006/relationships" xmlns:p="http://schemas.openxmlformats.org/presentationml/2006/main">
+  <p:cSld>
+    <p:spTree>
+      <p:nvGrpSpPr>
+        <p:cNvPr id="1" name=""/>
+        <p:cNvGrpSpPr/>
+        <p:nvPr/>
+      </p:nvGrpSpPr>
+      <p:grpSpPr>
+        <a:xfrm>
+          <a:off x="0" y="0"/>
+          <a:ext cx="0" cy="0"/>
+          <a:chOff x="0" y="0"/>
+          <a:chExt cx="0" cy="0"/>
+        </a:xfrm>
+      </p:grpSpPr>
+      <p:sp>
+        <p:nvSpPr>
+          <p:cNvPr id="2" name="Titel 1"/>
+          <p:cNvSpPr>
+            <a:spLocks noGrp="1"/>
+          </p:cNvSpPr>
+          <p:nvPr>
+            <p:ph type="title"/>
+          </p:nvPr>
+        </p:nvSpPr>
+        <p:spPr/>
+        <p:txBody>
+          <a:bodyPr/>
+          <a:lstStyle/>
+          <a:p>
+            <a:r>
+              <a:rPr lang="de-DE" dirty="0" smtClean="0"/>
+              <a:t>4. Implementierung - Besonderheiten</a:t>
+            </a:r>
+            <a:endParaRPr lang="de-DE" dirty="0"/>
+          </a:p>
+        </p:txBody>
+      </p:sp>
+      <p:sp>
+        <p:nvSpPr>
+          <p:cNvPr id="3" name="Inhaltsplatzhalter 2"/>
+          <p:cNvSpPr>
+            <a:spLocks noGrp="1"/>
+          </p:cNvSpPr>
+          <p:nvPr>
+            <p:ph idx="1"/>
+          </p:nvPr>
+        </p:nvSpPr>
+        <p:spPr/>
+        <p:txBody>
+          <a:bodyPr/>
+          <a:lstStyle/>
+          <a:p>
+            <a:r>
+              <a:rPr lang="de-DE" dirty="0" smtClean="0"/>
               <a:t>Besonderheiten Algorithmus:</a:t>
             </a:r>
           </a:p>
@@ -24693,7 +25164,7 @@
           <a:p>
             <a:fld id="{6C6AE60A-B69C-4790-82F7-3882EDF23186}" type="slidenum">
               <a:rPr lang="de-DE" smtClean="0"/>
-              <a:t>20</a:t>
+              <a:t>21</a:t>
             </a:fld>
             <a:endParaRPr lang="de-DE"/>
           </a:p>
@@ -24719,7 +25190,7 @@
 </p:sld>
 </file>
 
-<file path=ppt/slides/slide21.xml><?xml version="1.0" encoding="utf-8"?>
+<file path=ppt/slides/slide22.xml><?xml version="1.0" encoding="utf-8"?>
 <p:sld xmlns:a="http://schemas.openxmlformats.org/drawingml/2006/main" xmlns:r="http://schemas.openxmlformats.org/officeDocument/2006/relationships" xmlns:p="http://schemas.openxmlformats.org/presentationml/2006/main">
   <p:cSld>
     <p:spTree>
@@ -24827,7 +25298,7 @@
           <a:p>
             <a:fld id="{6C6AE60A-B69C-4790-82F7-3882EDF23186}" type="slidenum">
               <a:rPr lang="de-DE" smtClean="0"/>
-              <a:t>21</a:t>
+              <a:t>22</a:t>
             </a:fld>
             <a:endParaRPr lang="de-DE"/>
           </a:p>
@@ -24853,7 +25324,7 @@
 </p:sld>
 </file>
 
-<file path=ppt/slides/slide22.xml><?xml version="1.0" encoding="utf-8"?>
+<file path=ppt/slides/slide23.xml><?xml version="1.0" encoding="utf-8"?>
 <p:sld xmlns:a="http://schemas.openxmlformats.org/drawingml/2006/main" xmlns:r="http://schemas.openxmlformats.org/officeDocument/2006/relationships" xmlns:p="http://schemas.openxmlformats.org/presentationml/2006/main">
   <p:cSld>
     <p:spTree>
@@ -24961,7 +25432,7 @@
           <a:p>
             <a:fld id="{6C6AE60A-B69C-4790-82F7-3882EDF23186}" type="slidenum">
               <a:rPr lang="de-DE" smtClean="0"/>
-              <a:t>22</a:t>
+              <a:t>23</a:t>
             </a:fld>
             <a:endParaRPr lang="de-DE"/>
           </a:p>
@@ -24987,7 +25458,7 @@
 </p:sld>
 </file>
 
-<file path=ppt/slides/slide23.xml><?xml version="1.0" encoding="utf-8"?>
+<file path=ppt/slides/slide24.xml><?xml version="1.0" encoding="utf-8"?>
 <p:sld xmlns:a="http://schemas.openxmlformats.org/drawingml/2006/main" xmlns:r="http://schemas.openxmlformats.org/officeDocument/2006/relationships" xmlns:p="http://schemas.openxmlformats.org/presentationml/2006/main">
   <p:cSld>
     <p:spTree>
@@ -25143,7 +25614,7 @@
           <a:p>
             <a:fld id="{6C6AE60A-B69C-4790-82F7-3882EDF23186}" type="slidenum">
               <a:rPr lang="de-DE" smtClean="0"/>
-              <a:t>23</a:t>
+              <a:t>24</a:t>
             </a:fld>
             <a:endParaRPr lang="de-DE"/>
           </a:p>

</xml_diff>